<commit_message>
updated slides for part 1 and part 2, updated .net references in sample projects
</commit_message>
<xml_diff>
--- a/01/01.pptx
+++ b/01/01.pptx
@@ -283,7 +283,7 @@
           <a:p>
             <a:fld id="{B5389E1E-C654-E943-9883-792E99AD7287}" type="datetimeFigureOut">
               <a:rPr lang="en-US" smtClean="0"/>
-              <a:t>2/13/2017</a:t>
+              <a:t>2/17/2017</a:t>
             </a:fld>
             <a:endParaRPr lang="en-US"/>
           </a:p>
@@ -449,7 +449,7 @@
           <a:p>
             <a:fld id="{9920D99B-2862-464A-984E-65BFC5FC0BBC}" type="datetimeFigureOut">
               <a:rPr lang="en-US" smtClean="0"/>
-              <a:t>2/13/2017</a:t>
+              <a:t>2/17/2017</a:t>
             </a:fld>
             <a:endParaRPr lang="en-US"/>
           </a:p>
@@ -1253,7 +1253,15 @@
             </a:r>
             <a:r>
               <a:rPr lang="en-US" baseline="0" dirty="0"/>
-              <a:t> the version that we just loaded with couchbase:4.5.1 this should work.</a:t>
+              <a:t> the version that we just loaded with </a:t>
+            </a:r>
+            <a:r>
+              <a:rPr lang="en-US" baseline="0" dirty="0" smtClean="0"/>
+              <a:t>couchbase:4.6.0 </a:t>
+            </a:r>
+            <a:r>
+              <a:rPr lang="en-US" baseline="0" dirty="0"/>
+              <a:t>this should work.</a:t>
             </a:r>
           </a:p>
           <a:p>
@@ -1326,6 +1334,25 @@
             </a:r>
           </a:p>
           <a:p>
+            <a:endParaRPr lang="en-US" dirty="0" smtClean="0"/>
+          </a:p>
+          <a:p>
+            <a:r>
+              <a:rPr lang="en-US" dirty="0" smtClean="0"/>
+              <a:t>You can use </a:t>
+            </a:r>
+            <a:r>
+              <a:rPr lang="en-US" dirty="0" err="1" smtClean="0"/>
+              <a:t>docker</a:t>
+            </a:r>
+            <a:r>
+              <a:rPr lang="en-US" dirty="0" smtClean="0"/>
+              <a:t>-compose</a:t>
+            </a:r>
+            <a:r>
+              <a:rPr lang="en-US" baseline="0" dirty="0" smtClean="0"/>
+              <a:t> to do this as well, but we’re just doing the one image so it doesn’t make much difference.</a:t>
+            </a:r>
             <a:endParaRPr lang="en-US" dirty="0"/>
           </a:p>
         </p:txBody>
@@ -1441,6 +1468,104 @@
     <p:extLst>
       <p:ext uri="{BB962C8B-B14F-4D97-AF65-F5344CB8AC3E}">
         <p14:creationId xmlns:p14="http://schemas.microsoft.com/office/powerpoint/2010/main" val="865596325"/>
+      </p:ext>
+    </p:extLst>
+  </p:cSld>
+  <p:clrMapOvr>
+    <a:masterClrMapping/>
+  </p:clrMapOvr>
+</p:notes>
+</file>
+
+<file path=ppt/notesSlides/notesSlide7.xml><?xml version="1.0" encoding="utf-8"?>
+<p:notes xmlns:a="http://schemas.openxmlformats.org/drawingml/2006/main" xmlns:r="http://schemas.openxmlformats.org/officeDocument/2006/relationships" xmlns:p="http://schemas.openxmlformats.org/presentationml/2006/main">
+  <p:cSld>
+    <p:spTree>
+      <p:nvGrpSpPr>
+        <p:cNvPr id="1" name=""/>
+        <p:cNvGrpSpPr/>
+        <p:nvPr/>
+      </p:nvGrpSpPr>
+      <p:grpSpPr>
+        <a:xfrm>
+          <a:off x="0" y="0"/>
+          <a:ext cx="0" cy="0"/>
+          <a:chOff x="0" y="0"/>
+          <a:chExt cx="0" cy="0"/>
+        </a:xfrm>
+      </p:grpSpPr>
+      <p:sp>
+        <p:nvSpPr>
+          <p:cNvPr id="2" name="Slide Image Placeholder 1"/>
+          <p:cNvSpPr>
+            <a:spLocks noGrp="1" noRot="1" noChangeAspect="1"/>
+          </p:cNvSpPr>
+          <p:nvPr>
+            <p:ph type="sldImg"/>
+          </p:nvPr>
+        </p:nvSpPr>
+        <p:spPr/>
+      </p:sp>
+      <p:sp>
+        <p:nvSpPr>
+          <p:cNvPr id="3" name="Notes Placeholder 2"/>
+          <p:cNvSpPr>
+            <a:spLocks noGrp="1"/>
+          </p:cNvSpPr>
+          <p:nvPr>
+            <p:ph type="body" idx="1"/>
+          </p:nvPr>
+        </p:nvSpPr>
+        <p:spPr/>
+        <p:txBody>
+          <a:bodyPr/>
+          <a:lstStyle/>
+          <a:p>
+            <a:r>
+              <a:rPr lang="en-US" dirty="0" smtClean="0"/>
+              <a:t>Full Text</a:t>
+            </a:r>
+            <a:r>
+              <a:rPr lang="en-US" baseline="0" dirty="0" smtClean="0"/>
+              <a:t> is optional</a:t>
+            </a:r>
+          </a:p>
+          <a:p>
+            <a:r>
+              <a:rPr lang="en-US" baseline="0" dirty="0" smtClean="0"/>
+              <a:t>Not using it in this workshop, but if you want to check it out later, you may as well install it now</a:t>
+            </a:r>
+            <a:endParaRPr lang="en-US" dirty="0"/>
+          </a:p>
+        </p:txBody>
+      </p:sp>
+      <p:sp>
+        <p:nvSpPr>
+          <p:cNvPr id="4" name="Slide Number Placeholder 3"/>
+          <p:cNvSpPr>
+            <a:spLocks noGrp="1"/>
+          </p:cNvSpPr>
+          <p:nvPr>
+            <p:ph type="sldNum" sz="quarter" idx="10"/>
+          </p:nvPr>
+        </p:nvSpPr>
+        <p:spPr/>
+        <p:txBody>
+          <a:bodyPr/>
+          <a:lstStyle/>
+          <a:p>
+            <a:fld id="{F39351FC-18D6-4741-8EEB-9FDB1F020AAC}" type="slidenum">
+              <a:rPr lang="en-US" smtClean="0"/>
+              <a:t>15</a:t>
+            </a:fld>
+            <a:endParaRPr lang="en-US"/>
+          </a:p>
+        </p:txBody>
+      </p:sp>
+    </p:spTree>
+    <p:extLst>
+      <p:ext uri="{BB962C8B-B14F-4D97-AF65-F5344CB8AC3E}">
+        <p14:creationId xmlns:p14="http://schemas.microsoft.com/office/powerpoint/2010/main" val="177541439"/>
       </p:ext>
     </p:extLst>
   </p:cSld>
@@ -3815,12 +3940,20 @@
           <a:lstStyle/>
           <a:p>
             <a:r>
+              <a:rPr lang="en-US" sz="850" dirty="0" smtClean="0">
+                <a:solidFill>
+                  <a:srgbClr val="CCCCCC"/>
+                </a:solidFill>
+              </a:rPr>
+              <a:t>©2017 </a:t>
+            </a:r>
+            <a:r>
               <a:rPr lang="en-US" sz="850" dirty="0">
                 <a:solidFill>
                   <a:srgbClr val="CCCCCC"/>
                 </a:solidFill>
               </a:rPr>
-              <a:t>©2016 Couchbase</a:t>
+              <a:t>Couchbase</a:t>
             </a:r>
             <a:r>
               <a:rPr lang="en-US" sz="850" baseline="0" dirty="0">
@@ -4278,12 +4411,20 @@
           <a:lstStyle/>
           <a:p>
             <a:r>
+              <a:rPr lang="en-US" sz="850" dirty="0" smtClean="0">
+                <a:solidFill>
+                  <a:srgbClr val="CCCCCC"/>
+                </a:solidFill>
+              </a:rPr>
+              <a:t>©2017 </a:t>
+            </a:r>
+            <a:r>
               <a:rPr lang="en-US" sz="850" dirty="0">
                 <a:solidFill>
                   <a:srgbClr val="CCCCCC"/>
                 </a:solidFill>
               </a:rPr>
-              <a:t>©2016 Couchbase</a:t>
+              <a:t>Couchbase</a:t>
             </a:r>
             <a:r>
               <a:rPr lang="en-US" sz="850" baseline="0" dirty="0">
@@ -4603,12 +4744,20 @@
           <a:lstStyle/>
           <a:p>
             <a:r>
+              <a:rPr lang="en-US" sz="850" dirty="0" smtClean="0">
+                <a:solidFill>
+                  <a:srgbClr val="CCCCCC"/>
+                </a:solidFill>
+              </a:rPr>
+              <a:t>©2017 </a:t>
+            </a:r>
+            <a:r>
               <a:rPr lang="en-US" sz="850" dirty="0">
                 <a:solidFill>
                   <a:srgbClr val="CCCCCC"/>
                 </a:solidFill>
               </a:rPr>
-              <a:t>©2016 Couchbase</a:t>
+              <a:t>Couchbase</a:t>
             </a:r>
             <a:r>
               <a:rPr lang="en-US" sz="850" baseline="0" dirty="0">
@@ -5045,12 +5194,20 @@
           <a:lstStyle/>
           <a:p>
             <a:r>
+              <a:rPr lang="en-US" sz="850" dirty="0" smtClean="0">
+                <a:solidFill>
+                  <a:srgbClr val="CCCCCC"/>
+                </a:solidFill>
+              </a:rPr>
+              <a:t>©2017 </a:t>
+            </a:r>
+            <a:r>
               <a:rPr lang="en-US" sz="850" dirty="0">
                 <a:solidFill>
                   <a:srgbClr val="CCCCCC"/>
                 </a:solidFill>
               </a:rPr>
-              <a:t>©2016 Couchbase</a:t>
+              <a:t>Couchbase</a:t>
             </a:r>
             <a:r>
               <a:rPr lang="en-US" sz="850" baseline="0" dirty="0">
@@ -5495,12 +5652,20 @@
           <a:lstStyle/>
           <a:p>
             <a:r>
+              <a:rPr lang="en-US" sz="850" dirty="0" smtClean="0">
+                <a:solidFill>
+                  <a:srgbClr val="CCCCCC"/>
+                </a:solidFill>
+              </a:rPr>
+              <a:t>©2017 </a:t>
+            </a:r>
+            <a:r>
               <a:rPr lang="en-US" sz="850" dirty="0">
                 <a:solidFill>
                   <a:srgbClr val="CCCCCC"/>
                 </a:solidFill>
               </a:rPr>
-              <a:t>©2016 Couchbase</a:t>
+              <a:t>Couchbase</a:t>
             </a:r>
             <a:r>
               <a:rPr lang="en-US" sz="850" baseline="0" dirty="0">
@@ -6843,13 +7008,40 @@
               <a:t> </a:t>
             </a:r>
             <a:r>
-              <a:rPr lang="en-US" sz="750" b="1" dirty="0">
+              <a:rPr lang="en-US" sz="750" b="1" dirty="0" err="1">
                 <a:solidFill>
                   <a:schemeClr val="tx1"/>
                 </a:solidFill>
                 <a:latin typeface="+mj-lt"/>
               </a:rPr>
-              <a:t>TechFest 2016              |                Fri, Aug  5</a:t>
+              <a:t>TechFest</a:t>
+            </a:r>
+            <a:r>
+              <a:rPr lang="en-US" sz="750" b="1" dirty="0">
+                <a:solidFill>
+                  <a:schemeClr val="tx1"/>
+                </a:solidFill>
+                <a:latin typeface="+mj-lt"/>
+              </a:rPr>
+              <a:t> </a:t>
+            </a:r>
+            <a:r>
+              <a:rPr lang="en-US" sz="750" b="1" dirty="0" smtClean="0">
+                <a:solidFill>
+                  <a:schemeClr val="tx1"/>
+                </a:solidFill>
+                <a:latin typeface="+mj-lt"/>
+              </a:rPr>
+              <a:t>2017              </a:t>
+            </a:r>
+            <a:r>
+              <a:rPr lang="en-US" sz="750" b="1" dirty="0">
+                <a:solidFill>
+                  <a:schemeClr val="tx1"/>
+                </a:solidFill>
+                <a:latin typeface="+mj-lt"/>
+              </a:rPr>
+              <a:t>|                Fri, Aug  5</a:t>
             </a:r>
             <a:r>
               <a:rPr lang="en-US" sz="750" b="1" baseline="30000" dirty="0">
@@ -6867,7 +7059,25 @@
                 </a:solidFill>
                 <a:latin typeface="+mj-lt"/>
               </a:rPr>
-              <a:t>, 2016              |                OSU - Tulsa                |          70+ Speakers, 20+ Tracks &amp; 85+</a:t>
+              <a:t>, </a:t>
+            </a:r>
+            <a:r>
+              <a:rPr lang="en-US" sz="750" b="1" dirty="0" smtClean="0">
+                <a:solidFill>
+                  <a:schemeClr val="tx1"/>
+                </a:solidFill>
+                <a:latin typeface="+mj-lt"/>
+              </a:rPr>
+              <a:t>2017              </a:t>
+            </a:r>
+            <a:r>
+              <a:rPr lang="en-US" sz="750" b="1" dirty="0">
+                <a:solidFill>
+                  <a:schemeClr val="tx1"/>
+                </a:solidFill>
+                <a:latin typeface="+mj-lt"/>
+              </a:rPr>
+              <a:t>|                OSU - Tulsa                |          70+ Speakers, 20+ Tracks &amp; 85+</a:t>
             </a:r>
             <a:r>
               <a:rPr lang="en-US" sz="750" b="1" baseline="0" dirty="0">
@@ -7293,11 +7503,7 @@
           <a:p>
             <a:r>
               <a:rPr lang="en-US" sz="3600" dirty="0" smtClean="0"/>
-              <a:t>Workshop</a:t>
-            </a:r>
-            <a:r>
-              <a:rPr lang="en-US" sz="3600" dirty="0" smtClean="0"/>
-              <a:t> A </a:t>
+              <a:t>Workshop A </a:t>
             </a:r>
             <a:r>
               <a:rPr lang="en-US" sz="3600" dirty="0"/>
@@ -7559,10 +7765,10 @@
               <a:buChar char="•"/>
             </a:pPr>
             <a:r>
-              <a:rPr lang="en-US" dirty="0">
+              <a:rPr lang="en-US" dirty="0" smtClean="0">
                 <a:cs typeface="Courier New" panose="02070309020205020404" pitchFamily="49" charset="0"/>
               </a:rPr>
-              <a:t>couchbase451.tar </a:t>
+              <a:t>couchbase460.tar </a:t>
             </a:r>
             <a:r>
               <a:rPr lang="en-US" dirty="0"/>
@@ -7600,28 +7806,19 @@
                 <a:latin typeface="Courier New" panose="02070309020205020404" pitchFamily="49" charset="0"/>
                 <a:cs typeface="Courier New" panose="02070309020205020404" pitchFamily="49" charset="0"/>
               </a:rPr>
-              <a:t> /the/path/to/couchbase451.tar</a:t>
-            </a:r>
-          </a:p>
-          <a:p>
-            <a:pPr marL="342900" indent="-342900">
-              <a:buFont typeface="Arial" charset="0"/>
-              <a:buChar char="•"/>
-            </a:pPr>
-            <a:r>
-              <a:rPr lang="en-US" sz="2000" dirty="0" err="1">
+              <a:t> /</a:t>
+            </a:r>
+            <a:r>
+              <a:rPr lang="en-US" sz="2000" dirty="0" smtClean="0">
                 <a:latin typeface="Courier New" panose="02070309020205020404" pitchFamily="49" charset="0"/>
                 <a:cs typeface="Courier New" panose="02070309020205020404" pitchFamily="49" charset="0"/>
               </a:rPr>
-              <a:t>docker</a:t>
-            </a:r>
-            <a:r>
-              <a:rPr lang="en-US" sz="2000" dirty="0">
-                <a:latin typeface="Courier New" panose="02070309020205020404" pitchFamily="49" charset="0"/>
-                <a:cs typeface="Courier New" panose="02070309020205020404" pitchFamily="49" charset="0"/>
-              </a:rPr>
-              <a:t> tag c62ee511b6d1 couchbase:4.5.1</a:t>
-            </a:r>
+              <a:t>the/path/to/couchbase460.tar</a:t>
+            </a:r>
+            <a:endParaRPr lang="en-US" sz="2000" dirty="0">
+              <a:latin typeface="Courier New" panose="02070309020205020404" pitchFamily="49" charset="0"/>
+              <a:cs typeface="Courier New" panose="02070309020205020404" pitchFamily="49" charset="0"/>
+            </a:endParaRPr>
           </a:p>
           <a:p>
             <a:pPr marL="342900" indent="-342900">
@@ -7647,7 +7844,7 @@
       </p:sp>
       <p:pic>
         <p:nvPicPr>
-          <p:cNvPr id="5" name="Picture 4"/>
+          <p:cNvPr id="4" name="Picture 3"/>
           <p:cNvPicPr>
             <a:picLocks noChangeAspect="1"/>
           </p:cNvPicPr>
@@ -7661,14 +7858,104 @@
         </p:blipFill>
         <p:spPr>
           <a:xfrm>
-            <a:off x="1857801" y="1900424"/>
-            <a:ext cx="6819048" cy="2980952"/>
+            <a:off x="569943" y="1535874"/>
+            <a:ext cx="8318437" cy="3054055"/>
           </a:xfrm>
           <a:prstGeom prst="rect">
             <a:avLst/>
           </a:prstGeom>
         </p:spPr>
       </p:pic>
+      <p:sp>
+        <p:nvSpPr>
+          <p:cNvPr id="6" name="Rectangle 5"/>
+          <p:cNvSpPr/>
+          <p:nvPr/>
+        </p:nvSpPr>
+        <p:spPr>
+          <a:xfrm>
+            <a:off x="3478306" y="1499067"/>
+            <a:ext cx="2913529" cy="213192"/>
+          </a:xfrm>
+          <a:prstGeom prst="rect">
+            <a:avLst/>
+          </a:prstGeom>
+          <a:noFill/>
+          <a:ln w="50800">
+            <a:solidFill>
+              <a:schemeClr val="accent2"/>
+            </a:solidFill>
+          </a:ln>
+          <a:effectLst/>
+        </p:spPr>
+        <p:style>
+          <a:lnRef idx="1">
+            <a:schemeClr val="accent1"/>
+          </a:lnRef>
+          <a:fillRef idx="3">
+            <a:schemeClr val="accent1"/>
+          </a:fillRef>
+          <a:effectRef idx="2">
+            <a:schemeClr val="accent1"/>
+          </a:effectRef>
+          <a:fontRef idx="minor">
+            <a:schemeClr val="lt1"/>
+          </a:fontRef>
+        </p:style>
+        <p:txBody>
+          <a:bodyPr rtlCol="0" anchor="ctr"/>
+          <a:lstStyle/>
+          <a:p>
+            <a:pPr algn="ctr"/>
+            <a:endParaRPr lang="en-US"/>
+          </a:p>
+        </p:txBody>
+      </p:sp>
+      <p:sp>
+        <p:nvSpPr>
+          <p:cNvPr id="7" name="Rectangle 6"/>
+          <p:cNvSpPr/>
+          <p:nvPr/>
+        </p:nvSpPr>
+        <p:spPr>
+          <a:xfrm>
+            <a:off x="564777" y="3062901"/>
+            <a:ext cx="4338917" cy="213192"/>
+          </a:xfrm>
+          <a:prstGeom prst="rect">
+            <a:avLst/>
+          </a:prstGeom>
+          <a:noFill/>
+          <a:ln w="50800">
+            <a:solidFill>
+              <a:schemeClr val="accent2"/>
+            </a:solidFill>
+          </a:ln>
+          <a:effectLst/>
+        </p:spPr>
+        <p:style>
+          <a:lnRef idx="1">
+            <a:schemeClr val="accent1"/>
+          </a:lnRef>
+          <a:fillRef idx="3">
+            <a:schemeClr val="accent1"/>
+          </a:fillRef>
+          <a:effectRef idx="2">
+            <a:schemeClr val="accent1"/>
+          </a:effectRef>
+          <a:fontRef idx="minor">
+            <a:schemeClr val="lt1"/>
+          </a:fontRef>
+        </p:style>
+        <p:txBody>
+          <a:bodyPr rtlCol="0" anchor="ctr"/>
+          <a:lstStyle/>
+          <a:p>
+            <a:pPr algn="ctr"/>
+            <a:endParaRPr lang="en-US"/>
+          </a:p>
+        </p:txBody>
+      </p:sp>
     </p:spTree>
     <p:extLst>
       <p:ext uri="{BB962C8B-B14F-4D97-AF65-F5344CB8AC3E}">
@@ -7949,21 +8236,19 @@
                 <a:latin typeface="Courier New" panose="02070309020205020404" pitchFamily="49" charset="0"/>
                 <a:cs typeface="Courier New" panose="02070309020205020404" pitchFamily="49" charset="0"/>
               </a:rPr>
-              <a:t> -p 8091-8094:8091-8094 -p 11207:11207 -p 11210-11211:11210-11211 -p 18091-18093:</a:t>
-            </a:r>
-            <a:br>
-              <a:rPr lang="en-US" dirty="0">
+              <a:t> -p 8091-8094:8091-8094 </a:t>
+            </a:r>
+            <a:r>
+              <a:rPr lang="en-US" dirty="0" smtClean="0">
                 <a:latin typeface="Courier New" panose="02070309020205020404" pitchFamily="49" charset="0"/>
                 <a:cs typeface="Courier New" panose="02070309020205020404" pitchFamily="49" charset="0"/>
               </a:rPr>
-            </a:br>
-            <a:r>
-              <a:rPr lang="en-US" dirty="0">
-                <a:latin typeface="Courier New" panose="02070309020205020404" pitchFamily="49" charset="0"/>
-                <a:cs typeface="Courier New" panose="02070309020205020404" pitchFamily="49" charset="0"/>
-              </a:rPr>
-              <a:t>18091-18093 couchbase:4.5.1</a:t>
-            </a:r>
+              <a:t>–p 11210:11210 couchbase:enterprise-4.6.0</a:t>
+            </a:r>
+            <a:endParaRPr lang="en-US" dirty="0">
+              <a:latin typeface="Courier New" panose="02070309020205020404" pitchFamily="49" charset="0"/>
+              <a:cs typeface="Courier New" panose="02070309020205020404" pitchFamily="49" charset="0"/>
+            </a:endParaRPr>
           </a:p>
           <a:p>
             <a:pPr marL="342900" indent="-342900">
@@ -8434,7 +8719,7 @@
           <p:nvPr/>
         </p:nvPicPr>
         <p:blipFill>
-          <a:blip r:embed="rId2">
+          <a:blip r:embed="rId3">
             <a:extLst>
               <a:ext uri="{28A0092B-C50C-407E-A947-70E740481C1C}">
                 <a14:useLocalDpi xmlns:a14="http://schemas.microsoft.com/office/drawing/2010/main" val="0"/>
@@ -9346,7 +9631,7 @@
       </p:sp>
       <p:pic>
         <p:nvPicPr>
-          <p:cNvPr id="3" name="Picture 2"/>
+          <p:cNvPr id="4" name="Picture 3"/>
           <p:cNvPicPr>
             <a:picLocks noChangeAspect="1"/>
           </p:cNvPicPr>
@@ -9360,12 +9645,17 @@
         </p:blipFill>
         <p:spPr>
           <a:xfrm>
-            <a:off x="1881328" y="1463024"/>
-            <a:ext cx="5596739" cy="3585226"/>
+            <a:off x="1737165" y="1458065"/>
+            <a:ext cx="5634596" cy="3589123"/>
           </a:xfrm>
           <a:prstGeom prst="rect">
             <a:avLst/>
           </a:prstGeom>
+          <a:ln>
+            <a:solidFill>
+              <a:schemeClr val="accent1"/>
+            </a:solidFill>
+          </a:ln>
         </p:spPr>
       </p:pic>
     </p:spTree>
@@ -9698,23 +9988,16 @@
               <a:buChar char="•"/>
             </a:pPr>
             <a:r>
+              <a:rPr lang="en-US" sz="2000" dirty="0" smtClean="0">
+                <a:hlinkClick r:id="rId3"/>
+              </a:rPr>
+              <a:t>https</a:t>
+            </a:r>
+            <a:r>
               <a:rPr lang="en-US" sz="2000" dirty="0">
                 <a:hlinkClick r:id="rId3"/>
               </a:rPr>
-              <a:t>https://azure.microsoft.com/en-us/marketplace/partners/couchbase/</a:t>
-            </a:r>
-            <a:endParaRPr lang="en-US" sz="2000" dirty="0"/>
-          </a:p>
-          <a:p>
-            <a:pPr marL="342900" indent="-342900">
-              <a:buFont typeface="Arial" charset="0"/>
-              <a:buChar char="•"/>
-            </a:pPr>
-            <a:r>
-              <a:rPr lang="en-US" sz="2000" dirty="0">
-                <a:hlinkClick r:id="rId4"/>
-              </a:rPr>
-              <a:t>https://portal.azure.com</a:t>
+              <a:t>://portal.azure.com</a:t>
             </a:r>
             <a:endParaRPr lang="en-US" sz="2000" dirty="0"/>
           </a:p>
@@ -9739,22 +10022,22 @@
       </p:sp>
       <p:pic>
         <p:nvPicPr>
-          <p:cNvPr id="3" name="Picture 2"/>
+          <p:cNvPr id="5" name="Picture 4"/>
           <p:cNvPicPr>
             <a:picLocks noChangeAspect="1"/>
           </p:cNvPicPr>
           <p:nvPr/>
         </p:nvPicPr>
         <p:blipFill>
-          <a:blip r:embed="rId5"/>
+          <a:blip r:embed="rId4"/>
           <a:stretch>
             <a:fillRect/>
           </a:stretch>
         </p:blipFill>
         <p:spPr>
           <a:xfrm>
-            <a:off x="198158" y="1469151"/>
-            <a:ext cx="8469593" cy="2561566"/>
+            <a:off x="664851" y="1229805"/>
+            <a:ext cx="7531901" cy="3331667"/>
           </a:xfrm>
           <a:prstGeom prst="rect">
             <a:avLst/>
@@ -10131,7 +10414,13 @@
               <a:rPr lang="en-US" sz="1800" dirty="0">
                 <a:hlinkClick r:id="rId3"/>
               </a:rPr>
-              <a:t>http://blog.couchbase.com/2016/june/couchbase-on-the-microsoft-azure-marketplace-video</a:t>
+              <a:t>http://</a:t>
+            </a:r>
+            <a:r>
+              <a:rPr lang="en-US" sz="1800" dirty="0" smtClean="0">
+                <a:hlinkClick r:id="rId3"/>
+              </a:rPr>
+              <a:t>blog.couchbase.com/2017/june/couchbase-on-the-microsoft-azure-marketplace-video</a:t>
             </a:r>
             <a:endParaRPr lang="en-US" sz="1800" dirty="0"/>
           </a:p>
@@ -10592,26 +10881,6 @@
               <a:buFont typeface="Arial" charset="0"/>
               <a:buChar char="•"/>
             </a:pPr>
-            <a:r>
-              <a:rPr lang="en-US" sz="2000" dirty="0">
-                <a:hlinkClick r:id="rId3"/>
-              </a:rPr>
-              <a:t>https://aws.amazon.com/marketplace/seller-profile?id=1a064a14-5ac2-4980-9167-15746aabde72</a:t>
-            </a:r>
-            <a:endParaRPr lang="en-US" sz="2000" dirty="0"/>
-          </a:p>
-          <a:p>
-            <a:pPr marL="342900" indent="-342900">
-              <a:buFont typeface="Arial" charset="0"/>
-              <a:buChar char="•"/>
-            </a:pPr>
-            <a:endParaRPr lang="en-US" sz="2000" dirty="0"/>
-          </a:p>
-          <a:p>
-            <a:pPr marL="342900" indent="-342900">
-              <a:buFont typeface="Arial" charset="0"/>
-              <a:buChar char="•"/>
-            </a:pPr>
             <a:endParaRPr lang="en-US" sz="2000" dirty="0"/>
           </a:p>
           <a:p>
@@ -10642,15 +10911,15 @@
           <p:nvPr/>
         </p:nvPicPr>
         <p:blipFill>
-          <a:blip r:embed="rId4"/>
+          <a:blip r:embed="rId3"/>
           <a:stretch>
             <a:fillRect/>
           </a:stretch>
         </p:blipFill>
         <p:spPr>
           <a:xfrm>
-            <a:off x="2277934" y="1738237"/>
-            <a:ext cx="4227641" cy="3300488"/>
+            <a:off x="1942229" y="1182670"/>
+            <a:ext cx="4911057" cy="3834026"/>
           </a:xfrm>
           <a:prstGeom prst="rect">
             <a:avLst/>

</xml_diff>

<commit_message>
01 and 02 - proofreading, adding details and tweaks to slides
</commit_message>
<xml_diff>
--- a/01/01.pptx
+++ b/01/01.pptx
@@ -6,10 +6,10 @@
     <p:sldMasterId id="2147483684" r:id="rId2"/>
   </p:sldMasterIdLst>
   <p:notesMasterIdLst>
-    <p:notesMasterId r:id="rId23"/>
+    <p:notesMasterId r:id="rId24"/>
   </p:notesMasterIdLst>
   <p:handoutMasterIdLst>
-    <p:handoutMasterId r:id="rId24"/>
+    <p:handoutMasterId r:id="rId25"/>
   </p:handoutMasterIdLst>
   <p:sldIdLst>
     <p:sldId id="444" r:id="rId3"/>
@@ -29,9 +29,10 @@
     <p:sldId id="490" r:id="rId17"/>
     <p:sldId id="491" r:id="rId18"/>
     <p:sldId id="492" r:id="rId19"/>
-    <p:sldId id="493" r:id="rId20"/>
-    <p:sldId id="494" r:id="rId21"/>
-    <p:sldId id="484" r:id="rId22"/>
+    <p:sldId id="501" r:id="rId20"/>
+    <p:sldId id="493" r:id="rId21"/>
+    <p:sldId id="494" r:id="rId22"/>
+    <p:sldId id="484" r:id="rId23"/>
   </p:sldIdLst>
   <p:sldSz cx="9144000" cy="5143500" type="screen16x9"/>
   <p:notesSz cx="6858000" cy="9144000"/>
@@ -152,6 +153,7 @@
             <p14:sldId id="490"/>
             <p14:sldId id="491"/>
             <p14:sldId id="492"/>
+            <p14:sldId id="501"/>
             <p14:sldId id="493"/>
             <p14:sldId id="494"/>
             <p14:sldId id="484"/>
@@ -873,6 +875,407 @@
 </p:notes>
 </file>
 
+<file path=ppt/notesSlides/notesSlide10.xml><?xml version="1.0" encoding="utf-8"?>
+<p:notes xmlns:a="http://schemas.openxmlformats.org/drawingml/2006/main" xmlns:r="http://schemas.openxmlformats.org/officeDocument/2006/relationships" xmlns:p="http://schemas.openxmlformats.org/presentationml/2006/main">
+  <p:cSld>
+    <p:spTree>
+      <p:nvGrpSpPr>
+        <p:cNvPr id="1" name=""/>
+        <p:cNvGrpSpPr/>
+        <p:nvPr/>
+      </p:nvGrpSpPr>
+      <p:grpSpPr>
+        <a:xfrm>
+          <a:off x="0" y="0"/>
+          <a:ext cx="0" cy="0"/>
+          <a:chOff x="0" y="0"/>
+          <a:chExt cx="0" cy="0"/>
+        </a:xfrm>
+      </p:grpSpPr>
+      <p:sp>
+        <p:nvSpPr>
+          <p:cNvPr id="2" name="Slide Image Placeholder 1"/>
+          <p:cNvSpPr>
+            <a:spLocks noGrp="1" noRot="1" noChangeAspect="1"/>
+          </p:cNvSpPr>
+          <p:nvPr>
+            <p:ph type="sldImg"/>
+          </p:nvPr>
+        </p:nvSpPr>
+        <p:spPr/>
+      </p:sp>
+      <p:sp>
+        <p:nvSpPr>
+          <p:cNvPr id="3" name="Notes Placeholder 2"/>
+          <p:cNvSpPr>
+            <a:spLocks noGrp="1"/>
+          </p:cNvSpPr>
+          <p:nvPr>
+            <p:ph type="body" idx="1"/>
+          </p:nvPr>
+        </p:nvSpPr>
+        <p:spPr/>
+        <p:txBody>
+          <a:bodyPr/>
+          <a:lstStyle/>
+          <a:p>
+            <a:r>
+              <a:rPr lang="en-US" dirty="0"/>
+              <a:t>You can optionally create a bucket called 'default'. You can skip this, and I recommend not using a bucket named 'default' in production. But for this lab it's fine.</a:t>
+            </a:r>
+          </a:p>
+          <a:p>
+            <a:r>
+              <a:rPr lang="en-US" dirty="0"/>
+              <a:t>I'd recommend not using the full RAM quota, but it can be changed later</a:t>
+            </a:r>
+          </a:p>
+          <a:p>
+            <a:r>
+              <a:rPr lang="en-US" dirty="0"/>
+              <a:t>Recommend sticking with the default settings otherwise</a:t>
+            </a:r>
+          </a:p>
+        </p:txBody>
+      </p:sp>
+      <p:sp>
+        <p:nvSpPr>
+          <p:cNvPr id="4" name="Slide Number Placeholder 3"/>
+          <p:cNvSpPr>
+            <a:spLocks noGrp="1"/>
+          </p:cNvSpPr>
+          <p:nvPr>
+            <p:ph type="sldNum" sz="quarter" idx="10"/>
+          </p:nvPr>
+        </p:nvSpPr>
+        <p:spPr/>
+        <p:txBody>
+          <a:bodyPr/>
+          <a:lstStyle/>
+          <a:p>
+            <a:fld id="{F39351FC-18D6-4741-8EEB-9FDB1F020AAC}" type="slidenum">
+              <a:rPr lang="en-US" smtClean="0"/>
+              <a:t>17</a:t>
+            </a:fld>
+            <a:endParaRPr lang="en-US"/>
+          </a:p>
+        </p:txBody>
+      </p:sp>
+    </p:spTree>
+    <p:extLst>
+      <p:ext uri="{BB962C8B-B14F-4D97-AF65-F5344CB8AC3E}">
+        <p14:creationId xmlns:p14="http://schemas.microsoft.com/office/powerpoint/2010/main" val="3982358819"/>
+      </p:ext>
+    </p:extLst>
+  </p:cSld>
+  <p:clrMapOvr>
+    <a:masterClrMapping/>
+  </p:clrMapOvr>
+</p:notes>
+</file>
+
+<file path=ppt/notesSlides/notesSlide11.xml><?xml version="1.0" encoding="utf-8"?>
+<p:notes xmlns:a="http://schemas.openxmlformats.org/drawingml/2006/main" xmlns:r="http://schemas.openxmlformats.org/officeDocument/2006/relationships" xmlns:p="http://schemas.openxmlformats.org/presentationml/2006/main">
+  <p:cSld>
+    <p:spTree>
+      <p:nvGrpSpPr>
+        <p:cNvPr id="1" name=""/>
+        <p:cNvGrpSpPr/>
+        <p:nvPr/>
+      </p:nvGrpSpPr>
+      <p:grpSpPr>
+        <a:xfrm>
+          <a:off x="0" y="0"/>
+          <a:ext cx="0" cy="0"/>
+          <a:chOff x="0" y="0"/>
+          <a:chExt cx="0" cy="0"/>
+        </a:xfrm>
+      </p:grpSpPr>
+      <p:sp>
+        <p:nvSpPr>
+          <p:cNvPr id="2" name="Slide Image Placeholder 1"/>
+          <p:cNvSpPr>
+            <a:spLocks noGrp="1" noRot="1" noChangeAspect="1"/>
+          </p:cNvSpPr>
+          <p:nvPr>
+            <p:ph type="sldImg"/>
+          </p:nvPr>
+        </p:nvSpPr>
+        <p:spPr/>
+      </p:sp>
+      <p:sp>
+        <p:nvSpPr>
+          <p:cNvPr id="3" name="Notes Placeholder 2"/>
+          <p:cNvSpPr>
+            <a:spLocks noGrp="1"/>
+          </p:cNvSpPr>
+          <p:nvPr>
+            <p:ph type="body" idx="1"/>
+          </p:nvPr>
+        </p:nvSpPr>
+        <p:spPr/>
+        <p:txBody>
+          <a:bodyPr/>
+          <a:lstStyle/>
+          <a:p>
+            <a:r>
+              <a:rPr lang="en-US" dirty="0"/>
+              <a:t>Enterprise Edition is what we're using today. You need a license to go into production with it, but for development it's totally fine.</a:t>
+            </a:r>
+          </a:p>
+          <a:p>
+            <a:endParaRPr lang="en-US" dirty="0"/>
+          </a:p>
+          <a:p>
+            <a:r>
+              <a:rPr lang="en-US" dirty="0"/>
+              <a:t>There's also a free Community Edition that you can go into production with, it's usually one release behind, and there are some features that will always be enterprise only.</a:t>
+            </a:r>
+          </a:p>
+          <a:p>
+            <a:br>
+              <a:rPr lang="en-US" dirty="0"/>
+            </a:br>
+            <a:r>
+              <a:rPr lang="en-US" dirty="0"/>
+              <a:t>I don't think we're using any enterprise features in today's lab, but I will call them out if I see them.</a:t>
+            </a:r>
+          </a:p>
+          <a:p>
+            <a:endParaRPr lang="en-US" dirty="0"/>
+          </a:p>
+          <a:p>
+            <a:r>
+              <a:rPr lang="en-US" dirty="0"/>
+              <a:t>If you have licensing questions, come talk to me later.</a:t>
+            </a:r>
+          </a:p>
+          <a:p>
+            <a:endParaRPr lang="en-US" dirty="0"/>
+          </a:p>
+        </p:txBody>
+      </p:sp>
+      <p:sp>
+        <p:nvSpPr>
+          <p:cNvPr id="4" name="Slide Number Placeholder 3"/>
+          <p:cNvSpPr>
+            <a:spLocks noGrp="1"/>
+          </p:cNvSpPr>
+          <p:nvPr>
+            <p:ph type="sldNum" sz="quarter" idx="10"/>
+          </p:nvPr>
+        </p:nvSpPr>
+        <p:spPr/>
+        <p:txBody>
+          <a:bodyPr/>
+          <a:lstStyle/>
+          <a:p>
+            <a:fld id="{F39351FC-18D6-4741-8EEB-9FDB1F020AAC}" type="slidenum">
+              <a:rPr lang="en-US" smtClean="0"/>
+              <a:t>18</a:t>
+            </a:fld>
+            <a:endParaRPr lang="en-US"/>
+          </a:p>
+        </p:txBody>
+      </p:sp>
+    </p:spTree>
+    <p:extLst>
+      <p:ext uri="{BB962C8B-B14F-4D97-AF65-F5344CB8AC3E}">
+        <p14:creationId xmlns:p14="http://schemas.microsoft.com/office/powerpoint/2010/main" val="4176839581"/>
+      </p:ext>
+    </p:extLst>
+  </p:cSld>
+  <p:clrMapOvr>
+    <a:masterClrMapping/>
+  </p:clrMapOvr>
+</p:notes>
+</file>
+
+<file path=ppt/notesSlides/notesSlide12.xml><?xml version="1.0" encoding="utf-8"?>
+<p:notes xmlns:a="http://schemas.openxmlformats.org/drawingml/2006/main" xmlns:r="http://schemas.openxmlformats.org/officeDocument/2006/relationships" xmlns:p="http://schemas.openxmlformats.org/presentationml/2006/main">
+  <p:cSld>
+    <p:spTree>
+      <p:nvGrpSpPr>
+        <p:cNvPr id="1" name=""/>
+        <p:cNvGrpSpPr/>
+        <p:nvPr/>
+      </p:nvGrpSpPr>
+      <p:grpSpPr>
+        <a:xfrm>
+          <a:off x="0" y="0"/>
+          <a:ext cx="0" cy="0"/>
+          <a:chOff x="0" y="0"/>
+          <a:chExt cx="0" cy="0"/>
+        </a:xfrm>
+      </p:grpSpPr>
+      <p:sp>
+        <p:nvSpPr>
+          <p:cNvPr id="2" name="Slide Image Placeholder 1"/>
+          <p:cNvSpPr>
+            <a:spLocks noGrp="1" noRot="1" noChangeAspect="1"/>
+          </p:cNvSpPr>
+          <p:nvPr>
+            <p:ph type="sldImg"/>
+          </p:nvPr>
+        </p:nvSpPr>
+        <p:spPr/>
+      </p:sp>
+      <p:sp>
+        <p:nvSpPr>
+          <p:cNvPr id="3" name="Notes Placeholder 2"/>
+          <p:cNvSpPr>
+            <a:spLocks noGrp="1"/>
+          </p:cNvSpPr>
+          <p:nvPr>
+            <p:ph type="body" idx="1"/>
+          </p:nvPr>
+        </p:nvSpPr>
+        <p:spPr/>
+        <p:txBody>
+          <a:bodyPr/>
+          <a:lstStyle/>
+          <a:p>
+            <a:r>
+              <a:rPr lang="en-US" dirty="0"/>
+              <a:t>Enter a username/password for admin</a:t>
+            </a:r>
+          </a:p>
+          <a:p>
+            <a:r>
+              <a:rPr lang="en-US" dirty="0"/>
+              <a:t>Don't forget these credentials, write them down if you have to.</a:t>
+            </a:r>
+          </a:p>
+        </p:txBody>
+      </p:sp>
+      <p:sp>
+        <p:nvSpPr>
+          <p:cNvPr id="4" name="Slide Number Placeholder 3"/>
+          <p:cNvSpPr>
+            <a:spLocks noGrp="1"/>
+          </p:cNvSpPr>
+          <p:nvPr>
+            <p:ph type="sldNum" sz="quarter" idx="10"/>
+          </p:nvPr>
+        </p:nvSpPr>
+        <p:spPr/>
+        <p:txBody>
+          <a:bodyPr/>
+          <a:lstStyle/>
+          <a:p>
+            <a:fld id="{F39351FC-18D6-4741-8EEB-9FDB1F020AAC}" type="slidenum">
+              <a:rPr lang="en-US" smtClean="0"/>
+              <a:t>19</a:t>
+            </a:fld>
+            <a:endParaRPr lang="en-US"/>
+          </a:p>
+        </p:txBody>
+      </p:sp>
+    </p:spTree>
+    <p:extLst>
+      <p:ext uri="{BB962C8B-B14F-4D97-AF65-F5344CB8AC3E}">
+        <p14:creationId xmlns:p14="http://schemas.microsoft.com/office/powerpoint/2010/main" val="1156317746"/>
+      </p:ext>
+    </p:extLst>
+  </p:cSld>
+  <p:clrMapOvr>
+    <a:masterClrMapping/>
+  </p:clrMapOvr>
+</p:notes>
+</file>
+
+<file path=ppt/notesSlides/notesSlide13.xml><?xml version="1.0" encoding="utf-8"?>
+<p:notes xmlns:a="http://schemas.openxmlformats.org/drawingml/2006/main" xmlns:r="http://schemas.openxmlformats.org/officeDocument/2006/relationships" xmlns:p="http://schemas.openxmlformats.org/presentationml/2006/main">
+  <p:cSld>
+    <p:spTree>
+      <p:nvGrpSpPr>
+        <p:cNvPr id="1" name=""/>
+        <p:cNvGrpSpPr/>
+        <p:nvPr/>
+      </p:nvGrpSpPr>
+      <p:grpSpPr>
+        <a:xfrm>
+          <a:off x="0" y="0"/>
+          <a:ext cx="0" cy="0"/>
+          <a:chOff x="0" y="0"/>
+          <a:chExt cx="0" cy="0"/>
+        </a:xfrm>
+      </p:grpSpPr>
+      <p:sp>
+        <p:nvSpPr>
+          <p:cNvPr id="2" name="Slide Image Placeholder 1"/>
+          <p:cNvSpPr>
+            <a:spLocks noGrp="1" noRot="1" noChangeAspect="1"/>
+          </p:cNvSpPr>
+          <p:nvPr>
+            <p:ph type="sldImg"/>
+          </p:nvPr>
+        </p:nvSpPr>
+        <p:spPr/>
+      </p:sp>
+      <p:sp>
+        <p:nvSpPr>
+          <p:cNvPr id="3" name="Notes Placeholder 2"/>
+          <p:cNvSpPr>
+            <a:spLocks noGrp="1"/>
+          </p:cNvSpPr>
+          <p:nvPr>
+            <p:ph type="body" idx="1"/>
+          </p:nvPr>
+        </p:nvSpPr>
+        <p:spPr/>
+        <p:txBody>
+          <a:bodyPr/>
+          <a:lstStyle/>
+          <a:p>
+            <a:r>
+              <a:rPr lang="en-US" dirty="0"/>
+              <a:t>If you see this screen, </a:t>
+            </a:r>
+            <a:r>
+              <a:rPr lang="en-US"/>
+              <a:t>you've completed the workshop!</a:t>
+            </a:r>
+            <a:endParaRPr lang="en-US"/>
+          </a:p>
+        </p:txBody>
+      </p:sp>
+      <p:sp>
+        <p:nvSpPr>
+          <p:cNvPr id="4" name="Slide Number Placeholder 3"/>
+          <p:cNvSpPr>
+            <a:spLocks noGrp="1"/>
+          </p:cNvSpPr>
+          <p:nvPr>
+            <p:ph type="sldNum" sz="quarter" idx="10"/>
+          </p:nvPr>
+        </p:nvSpPr>
+        <p:spPr/>
+        <p:txBody>
+          <a:bodyPr/>
+          <a:lstStyle/>
+          <a:p>
+            <a:fld id="{F39351FC-18D6-4741-8EEB-9FDB1F020AAC}" type="slidenum">
+              <a:rPr lang="en-US" smtClean="0"/>
+              <a:t>20</a:t>
+            </a:fld>
+            <a:endParaRPr lang="en-US"/>
+          </a:p>
+        </p:txBody>
+      </p:sp>
+    </p:spTree>
+    <p:extLst>
+      <p:ext uri="{BB962C8B-B14F-4D97-AF65-F5344CB8AC3E}">
+        <p14:creationId xmlns:p14="http://schemas.microsoft.com/office/powerpoint/2010/main" val="347027653"/>
+      </p:ext>
+    </p:extLst>
+  </p:cSld>
+  <p:clrMapOvr>
+    <a:masterClrMapping/>
+  </p:clrMapOvr>
+</p:notes>
+</file>
+
 <file path=ppt/notesSlides/notesSlide2.xml><?xml version="1.0" encoding="utf-8"?>
 <p:notes xmlns:a="http://schemas.openxmlformats.org/drawingml/2006/main" xmlns:r="http://schemas.openxmlformats.org/officeDocument/2006/relationships" xmlns:p="http://schemas.openxmlformats.org/presentationml/2006/main">
   <p:cSld>
@@ -1009,6 +1412,15 @@
               <a:rPr lang="en-US" baseline="0" dirty="0"/>
               <a:t> for going into production. They are simplified for this lab.</a:t>
             </a:r>
+          </a:p>
+          <a:p>
+            <a:endParaRPr lang="en-US" baseline="0" dirty="0"/>
+          </a:p>
+          <a:p>
+            <a:r>
+              <a:rPr lang="en-US" baseline="0" dirty="0"/>
+              <a:t>Azure will be getting easier soon, especially when it comes to multi-node clusters.</a:t>
+            </a:r>
             <a:endParaRPr lang="en-US" dirty="0"/>
           </a:p>
         </p:txBody>
@@ -1095,75 +1507,8 @@
           <a:p>
             <a:r>
               <a:rPr lang="en-US" dirty="0"/>
-              <a:t>If you</a:t>
-            </a:r>
-            <a:r>
-              <a:rPr lang="en-US" baseline="0" dirty="0"/>
-              <a:t> have not already installed </a:t>
-            </a:r>
-            <a:r>
-              <a:rPr lang="en-US" baseline="0" dirty="0" err="1"/>
-              <a:t>couchbase</a:t>
-            </a:r>
-            <a:r>
-              <a:rPr lang="en-US" baseline="0" dirty="0"/>
-              <a:t> with </a:t>
-            </a:r>
-            <a:r>
-              <a:rPr lang="en-US" baseline="0" dirty="0" err="1"/>
-              <a:t>docker</a:t>
-            </a:r>
-            <a:r>
-              <a:rPr lang="en-US" baseline="0" dirty="0"/>
-              <a:t>, I recommend that you do it this way</a:t>
-            </a:r>
-          </a:p>
-          <a:p>
-            <a:r>
-              <a:rPr lang="en-US" baseline="0" dirty="0"/>
-              <a:t>Normally, you don’t have to take these steps, and </a:t>
-            </a:r>
-            <a:r>
-              <a:rPr lang="en-US" baseline="0" dirty="0" err="1"/>
-              <a:t>docker</a:t>
-            </a:r>
-            <a:r>
-              <a:rPr lang="en-US" baseline="0" dirty="0"/>
-              <a:t> will find the image online at </a:t>
-            </a:r>
-            <a:r>
-              <a:rPr lang="en-US" baseline="0" dirty="0" err="1"/>
-              <a:t>docker</a:t>
-            </a:r>
-            <a:r>
-              <a:rPr lang="en-US" baseline="0" dirty="0"/>
-              <a:t> hub</a:t>
-            </a:r>
-          </a:p>
-          <a:p>
-            <a:r>
-              <a:rPr lang="en-US" baseline="0" dirty="0"/>
-              <a:t>But since we are all on hotel </a:t>
-            </a:r>
-            <a:r>
-              <a:rPr lang="en-US" baseline="0" dirty="0" err="1"/>
-              <a:t>wifi</a:t>
-            </a:r>
-            <a:r>
-              <a:rPr lang="en-US" baseline="0" dirty="0"/>
-              <a:t> at the same time, I recommend you do this (unless the </a:t>
-            </a:r>
-            <a:r>
-              <a:rPr lang="en-US" baseline="0" dirty="0" err="1"/>
-              <a:t>wifi</a:t>
-            </a:r>
-            <a:r>
-              <a:rPr lang="en-US" baseline="0" dirty="0"/>
-              <a:t> is really good)</a:t>
-            </a:r>
-          </a:p>
-          <a:p>
-            <a:endParaRPr lang="en-US" dirty="0"/>
+              <a:t>Amazon will be getting easier soon, especially when it comes to multi-node clusters</a:t>
+            </a:r>
           </a:p>
         </p:txBody>
       </p:sp>
@@ -1184,7 +1529,7 @@
           <a:p>
             <a:fld id="{F39351FC-18D6-4741-8EEB-9FDB1F020AAC}" type="slidenum">
               <a:rPr lang="en-US" smtClean="0"/>
-              <a:t>10</a:t>
+              <a:t>9</a:t>
             </a:fld>
             <a:endParaRPr lang="en-US"/>
           </a:p>
@@ -1193,7 +1538,7 @@
     </p:spTree>
     <p:extLst>
       <p:ext uri="{BB962C8B-B14F-4D97-AF65-F5344CB8AC3E}">
-        <p14:creationId xmlns:p14="http://schemas.microsoft.com/office/powerpoint/2010/main" val="409809660"/>
+        <p14:creationId xmlns:p14="http://schemas.microsoft.com/office/powerpoint/2010/main" val="3390216368"/>
       </p:ext>
     </p:extLst>
   </p:cSld>
@@ -1249,56 +1594,36 @@
           <a:p>
             <a:r>
               <a:rPr lang="en-US" dirty="0"/>
-              <a:t>Because we tagged</a:t>
+              <a:t>I'm not going to teach you </a:t>
+            </a:r>
+            <a:r>
+              <a:rPr lang="en-US" dirty="0" err="1"/>
+              <a:t>docker</a:t>
+            </a:r>
+            <a:r>
+              <a:rPr lang="en-US" dirty="0"/>
+              <a:t> in this workshop, but using </a:t>
+            </a:r>
+            <a:r>
+              <a:rPr lang="en-US" dirty="0" err="1"/>
+              <a:t>docker</a:t>
+            </a:r>
+            <a:r>
+              <a:rPr lang="en-US" dirty="0"/>
+              <a:t> is an option.</a:t>
+            </a:r>
+          </a:p>
+          <a:p>
+            <a:endParaRPr lang="en-US" dirty="0"/>
+          </a:p>
+          <a:p>
+            <a:r>
+              <a:rPr lang="en-US" dirty="0"/>
+              <a:t>If you</a:t>
             </a:r>
             <a:r>
               <a:rPr lang="en-US" baseline="0" dirty="0"/>
-              <a:t> the version that we just loaded with couchbase:4.6.0 this should work.</a:t>
-            </a:r>
-          </a:p>
-          <a:p>
-            <a:r>
-              <a:rPr lang="en-US" baseline="0" dirty="0"/>
-              <a:t>Normally, when you are trying this at home, you can skip that previous slide and just do this.</a:t>
-            </a:r>
-          </a:p>
-          <a:p>
-            <a:endParaRPr lang="en-US" dirty="0"/>
-          </a:p>
-          <a:p>
-            <a:r>
-              <a:rPr lang="en-US" dirty="0"/>
-              <a:t>-d run detached so</a:t>
-            </a:r>
-            <a:r>
-              <a:rPr lang="en-US" baseline="0" dirty="0"/>
-              <a:t> we get returned to the command line</a:t>
-            </a:r>
-          </a:p>
-          <a:p>
-            <a:r>
-              <a:rPr lang="en-US" baseline="0" dirty="0"/>
-              <a:t>--name to give it a friendly name of “</a:t>
-            </a:r>
-            <a:r>
-              <a:rPr lang="en-US" baseline="0" dirty="0" err="1"/>
-              <a:t>db</a:t>
-            </a:r>
-            <a:r>
-              <a:rPr lang="en-US" baseline="0" dirty="0"/>
-              <a:t>”</a:t>
-            </a:r>
-          </a:p>
-          <a:p>
-            <a:r>
-              <a:rPr lang="en-US" baseline="0" dirty="0"/>
-              <a:t>-p to specify which ports to publish</a:t>
-            </a:r>
-          </a:p>
-          <a:p>
-            <a:r>
-              <a:rPr lang="en-US" baseline="0" dirty="0"/>
-              <a:t>And finally ‘</a:t>
+              <a:t> have not already installed </a:t>
             </a:r>
             <a:r>
               <a:rPr lang="en-US" baseline="0" dirty="0" err="1"/>
@@ -1306,15 +1631,7 @@
             </a:r>
             <a:r>
               <a:rPr lang="en-US" baseline="0" dirty="0"/>
-              <a:t>’ to pull the </a:t>
-            </a:r>
-            <a:r>
-              <a:rPr lang="en-US" baseline="0" dirty="0" err="1"/>
-              <a:t>couchbase</a:t>
-            </a:r>
-            <a:r>
-              <a:rPr lang="en-US" baseline="0" dirty="0"/>
-              <a:t> image from </a:t>
+              <a:t> with </a:t>
             </a:r>
             <a:r>
               <a:rPr lang="en-US" baseline="0" dirty="0" err="1"/>
@@ -1322,29 +1639,71 @@
             </a:r>
             <a:r>
               <a:rPr lang="en-US" baseline="0" dirty="0"/>
+              <a:t>, I recommend that you do it this way</a:t>
+            </a:r>
+          </a:p>
+          <a:p>
+            <a:r>
+              <a:rPr lang="en-US" baseline="0" dirty="0"/>
+              <a:t>Normally, you don’t have to take these steps, and </a:t>
+            </a:r>
+            <a:r>
+              <a:rPr lang="en-US" baseline="0" dirty="0" err="1"/>
+              <a:t>docker</a:t>
+            </a:r>
+            <a:r>
+              <a:rPr lang="en-US" baseline="0" dirty="0"/>
+              <a:t> will find the image online at </a:t>
+            </a:r>
+            <a:r>
+              <a:rPr lang="en-US" baseline="0" dirty="0" err="1"/>
+              <a:t>docker</a:t>
+            </a:r>
+            <a:r>
+              <a:rPr lang="en-US" baseline="0" dirty="0"/>
               <a:t> hub</a:t>
             </a:r>
           </a:p>
           <a:p>
-            <a:endParaRPr lang="en-US" dirty="0"/>
-          </a:p>
-          <a:p>
-            <a:r>
-              <a:rPr lang="en-US" dirty="0"/>
-              <a:t>You can use </a:t>
-            </a:r>
-            <a:r>
-              <a:rPr lang="en-US" dirty="0" err="1"/>
+            <a:r>
+              <a:rPr lang="en-US" baseline="0" dirty="0"/>
+              <a:t>But since we are all on hotel </a:t>
+            </a:r>
+            <a:r>
+              <a:rPr lang="en-US" baseline="0" dirty="0" err="1"/>
+              <a:t>wifi</a:t>
+            </a:r>
+            <a:r>
+              <a:rPr lang="en-US" baseline="0" dirty="0"/>
+              <a:t> at the same time, I recommend you do this (unless the </a:t>
+            </a:r>
+            <a:r>
+              <a:rPr lang="en-US" baseline="0" dirty="0" err="1"/>
+              <a:t>wifi</a:t>
+            </a:r>
+            <a:r>
+              <a:rPr lang="en-US" baseline="0" dirty="0"/>
+              <a:t> is really good)</a:t>
+            </a:r>
+          </a:p>
+          <a:p>
+            <a:endParaRPr lang="en-US" baseline="0" dirty="0"/>
+          </a:p>
+          <a:p>
+            <a:r>
+              <a:rPr lang="en-US" baseline="0" dirty="0"/>
+              <a:t>(I used </a:t>
+            </a:r>
+            <a:r>
+              <a:rPr lang="en-US" baseline="0" dirty="0" err="1"/>
               <a:t>docker</a:t>
             </a:r>
             <a:r>
-              <a:rPr lang="en-US" dirty="0"/>
-              <a:t>-compose</a:t>
-            </a:r>
-            <a:r>
               <a:rPr lang="en-US" baseline="0" dirty="0"/>
-              <a:t> to do this as well, but we’re just doing the one image so it doesn’t make much difference.</a:t>
-            </a:r>
+              <a:t> save couchbase:4.6.1 –o couchbase461.tar to create the tar file)</a:t>
+            </a:r>
+          </a:p>
+          <a:p>
             <a:endParaRPr lang="en-US" dirty="0"/>
           </a:p>
         </p:txBody>
@@ -1366,7 +1725,7 @@
           <a:p>
             <a:fld id="{F39351FC-18D6-4741-8EEB-9FDB1F020AAC}" type="slidenum">
               <a:rPr lang="en-US" smtClean="0"/>
-              <a:t>11</a:t>
+              <a:t>10</a:t>
             </a:fld>
             <a:endParaRPr lang="en-US"/>
           </a:p>
@@ -1375,7 +1734,7 @@
     </p:spTree>
     <p:extLst>
       <p:ext uri="{BB962C8B-B14F-4D97-AF65-F5344CB8AC3E}">
-        <p14:creationId xmlns:p14="http://schemas.microsoft.com/office/powerpoint/2010/main" val="2203849020"/>
+        <p14:creationId xmlns:p14="http://schemas.microsoft.com/office/powerpoint/2010/main" val="409809660"/>
       </p:ext>
     </p:extLst>
   </p:cSld>
@@ -1429,6 +1788,104 @@
           <a:bodyPr/>
           <a:lstStyle/>
           <a:p>
+            <a:r>
+              <a:rPr lang="en-US" dirty="0"/>
+              <a:t>Because we tagged</a:t>
+            </a:r>
+            <a:r>
+              <a:rPr lang="en-US" baseline="0" dirty="0"/>
+              <a:t> the version that we just loaded with couchbase:4.6.0 this should work.</a:t>
+            </a:r>
+          </a:p>
+          <a:p>
+            <a:r>
+              <a:rPr lang="en-US" baseline="0" dirty="0"/>
+              <a:t>Normally, when you are trying this at home, you can skip that previous slide and just do this.</a:t>
+            </a:r>
+          </a:p>
+          <a:p>
+            <a:endParaRPr lang="en-US" dirty="0"/>
+          </a:p>
+          <a:p>
+            <a:r>
+              <a:rPr lang="en-US" dirty="0"/>
+              <a:t>-d run detached so</a:t>
+            </a:r>
+            <a:r>
+              <a:rPr lang="en-US" baseline="0" dirty="0"/>
+              <a:t> we get returned to the command line</a:t>
+            </a:r>
+          </a:p>
+          <a:p>
+            <a:r>
+              <a:rPr lang="en-US" baseline="0" dirty="0"/>
+              <a:t>--name to give it a friendly name of “</a:t>
+            </a:r>
+            <a:r>
+              <a:rPr lang="en-US" baseline="0" dirty="0" err="1"/>
+              <a:t>db</a:t>
+            </a:r>
+            <a:r>
+              <a:rPr lang="en-US" baseline="0" dirty="0"/>
+              <a:t>”</a:t>
+            </a:r>
+          </a:p>
+          <a:p>
+            <a:r>
+              <a:rPr lang="en-US" baseline="0" dirty="0"/>
+              <a:t>-p to specify which ports to publish</a:t>
+            </a:r>
+          </a:p>
+          <a:p>
+            <a:r>
+              <a:rPr lang="en-US" baseline="0" dirty="0"/>
+              <a:t>And finally ‘</a:t>
+            </a:r>
+            <a:r>
+              <a:rPr lang="en-US" baseline="0" dirty="0" err="1"/>
+              <a:t>couchbase</a:t>
+            </a:r>
+            <a:r>
+              <a:rPr lang="en-US" baseline="0" dirty="0"/>
+              <a:t>’ to pull the </a:t>
+            </a:r>
+            <a:r>
+              <a:rPr lang="en-US" baseline="0" dirty="0" err="1"/>
+              <a:t>couchbase</a:t>
+            </a:r>
+            <a:r>
+              <a:rPr lang="en-US" baseline="0" dirty="0"/>
+              <a:t> image from </a:t>
+            </a:r>
+            <a:r>
+              <a:rPr lang="en-US" baseline="0" dirty="0" err="1"/>
+              <a:t>docker</a:t>
+            </a:r>
+            <a:r>
+              <a:rPr lang="en-US" baseline="0" dirty="0"/>
+              <a:t> hub</a:t>
+            </a:r>
+          </a:p>
+          <a:p>
+            <a:endParaRPr lang="en-US" dirty="0"/>
+          </a:p>
+          <a:p>
+            <a:r>
+              <a:rPr lang="en-US" dirty="0"/>
+              <a:t>You can use </a:t>
+            </a:r>
+            <a:r>
+              <a:rPr lang="en-US" dirty="0" err="1"/>
+              <a:t>docker</a:t>
+            </a:r>
+            <a:r>
+              <a:rPr lang="en-US" dirty="0"/>
+              <a:t>-compose</a:t>
+            </a:r>
+            <a:r>
+              <a:rPr lang="en-US" baseline="0" dirty="0"/>
+              <a:t> to do this as well, but we’re just doing the one image so it doesn’t make much difference.</a:t>
+            </a:r>
             <a:endParaRPr lang="en-US" dirty="0"/>
           </a:p>
         </p:txBody>
@@ -1450,7 +1907,7 @@
           <a:p>
             <a:fld id="{F39351FC-18D6-4741-8EEB-9FDB1F020AAC}" type="slidenum">
               <a:rPr lang="en-US" smtClean="0"/>
-              <a:t>12</a:t>
+              <a:t>11</a:t>
             </a:fld>
             <a:endParaRPr lang="en-US"/>
           </a:p>
@@ -1459,7 +1916,7 @@
     </p:spTree>
     <p:extLst>
       <p:ext uri="{BB962C8B-B14F-4D97-AF65-F5344CB8AC3E}">
-        <p14:creationId xmlns:p14="http://schemas.microsoft.com/office/powerpoint/2010/main" val="865596325"/>
+        <p14:creationId xmlns:p14="http://schemas.microsoft.com/office/powerpoint/2010/main" val="2203849020"/>
       </p:ext>
     </p:extLst>
   </p:cSld>
@@ -1515,19 +1972,8 @@
           <a:p>
             <a:r>
               <a:rPr lang="en-US" dirty="0"/>
-              <a:t>Full Text</a:t>
-            </a:r>
-            <a:r>
-              <a:rPr lang="en-US" baseline="0" dirty="0"/>
-              <a:t> is optional</a:t>
-            </a:r>
-          </a:p>
-          <a:p>
-            <a:r>
-              <a:rPr lang="en-US" baseline="0" dirty="0"/>
-              <a:t>Not using it in this workshop, but if you want to check it out later, you may as well install it now</a:t>
-            </a:r>
-            <a:endParaRPr lang="en-US" dirty="0"/>
+              <a:t>If you see this, then you've completed the first part of the lab!</a:t>
+            </a:r>
           </a:p>
         </p:txBody>
       </p:sp>
@@ -1548,6 +1994,121 @@
           <a:p>
             <a:fld id="{F39351FC-18D6-4741-8EEB-9FDB1F020AAC}" type="slidenum">
               <a:rPr lang="en-US" smtClean="0"/>
+              <a:t>12</a:t>
+            </a:fld>
+            <a:endParaRPr lang="en-US"/>
+          </a:p>
+        </p:txBody>
+      </p:sp>
+    </p:spTree>
+    <p:extLst>
+      <p:ext uri="{BB962C8B-B14F-4D97-AF65-F5344CB8AC3E}">
+        <p14:creationId xmlns:p14="http://schemas.microsoft.com/office/powerpoint/2010/main" val="865596325"/>
+      </p:ext>
+    </p:extLst>
+  </p:cSld>
+  <p:clrMapOvr>
+    <a:masterClrMapping/>
+  </p:clrMapOvr>
+</p:notes>
+</file>
+
+<file path=ppt/notesSlides/notesSlide8.xml><?xml version="1.0" encoding="utf-8"?>
+<p:notes xmlns:a="http://schemas.openxmlformats.org/drawingml/2006/main" xmlns:r="http://schemas.openxmlformats.org/officeDocument/2006/relationships" xmlns:p="http://schemas.openxmlformats.org/presentationml/2006/main">
+  <p:cSld>
+    <p:spTree>
+      <p:nvGrpSpPr>
+        <p:cNvPr id="1" name=""/>
+        <p:cNvGrpSpPr/>
+        <p:nvPr/>
+      </p:nvGrpSpPr>
+      <p:grpSpPr>
+        <a:xfrm>
+          <a:off x="0" y="0"/>
+          <a:ext cx="0" cy="0"/>
+          <a:chOff x="0" y="0"/>
+          <a:chExt cx="0" cy="0"/>
+        </a:xfrm>
+      </p:grpSpPr>
+      <p:sp>
+        <p:nvSpPr>
+          <p:cNvPr id="2" name="Slide Image Placeholder 1"/>
+          <p:cNvSpPr>
+            <a:spLocks noGrp="1" noRot="1" noChangeAspect="1"/>
+          </p:cNvSpPr>
+          <p:nvPr>
+            <p:ph type="sldImg"/>
+          </p:nvPr>
+        </p:nvSpPr>
+        <p:spPr/>
+      </p:sp>
+      <p:sp>
+        <p:nvSpPr>
+          <p:cNvPr id="3" name="Notes Placeholder 2"/>
+          <p:cNvSpPr>
+            <a:spLocks noGrp="1"/>
+          </p:cNvSpPr>
+          <p:nvPr>
+            <p:ph type="body" idx="1"/>
+          </p:nvPr>
+        </p:nvSpPr>
+        <p:spPr/>
+        <p:txBody>
+          <a:bodyPr/>
+          <a:lstStyle/>
+          <a:p>
+            <a:r>
+              <a:rPr lang="en-US" dirty="0"/>
+              <a:t>Full Text</a:t>
+            </a:r>
+            <a:r>
+              <a:rPr lang="en-US" baseline="0" dirty="0"/>
+              <a:t> is optional</a:t>
+            </a:r>
+          </a:p>
+          <a:p>
+            <a:r>
+              <a:rPr lang="en-US" baseline="0" dirty="0"/>
+              <a:t>Not using it in this workshop, but if you want to check it out later install it now</a:t>
+            </a:r>
+          </a:p>
+          <a:p>
+            <a:endParaRPr lang="en-US" baseline="0" dirty="0"/>
+          </a:p>
+          <a:p>
+            <a:r>
+              <a:rPr lang="en-US" baseline="0" dirty="0"/>
+              <a:t>The RAM available will vary; if you are on </a:t>
+            </a:r>
+            <a:r>
+              <a:rPr lang="en-US" baseline="0" dirty="0" err="1"/>
+              <a:t>docker</a:t>
+            </a:r>
+            <a:r>
+              <a:rPr lang="en-US" baseline="0" dirty="0"/>
+              <a:t> it will be low, but that's fine</a:t>
+            </a:r>
+            <a:endParaRPr lang="en-US" dirty="0"/>
+          </a:p>
+        </p:txBody>
+      </p:sp>
+      <p:sp>
+        <p:nvSpPr>
+          <p:cNvPr id="4" name="Slide Number Placeholder 3"/>
+          <p:cNvSpPr>
+            <a:spLocks noGrp="1"/>
+          </p:cNvSpPr>
+          <p:nvPr>
+            <p:ph type="sldNum" sz="quarter" idx="10"/>
+          </p:nvPr>
+        </p:nvSpPr>
+        <p:spPr/>
+        <p:txBody>
+          <a:bodyPr/>
+          <a:lstStyle/>
+          <a:p>
+            <a:fld id="{F39351FC-18D6-4741-8EEB-9FDB1F020AAC}" type="slidenum">
+              <a:rPr lang="en-US" smtClean="0"/>
               <a:t>15</a:t>
             </a:fld>
             <a:endParaRPr lang="en-US"/>
@@ -1558,6 +2119,102 @@
     <p:extLst>
       <p:ext uri="{BB962C8B-B14F-4D97-AF65-F5344CB8AC3E}">
         <p14:creationId xmlns:p14="http://schemas.microsoft.com/office/powerpoint/2010/main" val="177541439"/>
+      </p:ext>
+    </p:extLst>
+  </p:cSld>
+  <p:clrMapOvr>
+    <a:masterClrMapping/>
+  </p:clrMapOvr>
+</p:notes>
+</file>
+
+<file path=ppt/notesSlides/notesSlide9.xml><?xml version="1.0" encoding="utf-8"?>
+<p:notes xmlns:a="http://schemas.openxmlformats.org/drawingml/2006/main" xmlns:r="http://schemas.openxmlformats.org/officeDocument/2006/relationships" xmlns:p="http://schemas.openxmlformats.org/presentationml/2006/main">
+  <p:cSld>
+    <p:spTree>
+      <p:nvGrpSpPr>
+        <p:cNvPr id="1" name=""/>
+        <p:cNvGrpSpPr/>
+        <p:nvPr/>
+      </p:nvGrpSpPr>
+      <p:grpSpPr>
+        <a:xfrm>
+          <a:off x="0" y="0"/>
+          <a:ext cx="0" cy="0"/>
+          <a:chOff x="0" y="0"/>
+          <a:chExt cx="0" cy="0"/>
+        </a:xfrm>
+      </p:grpSpPr>
+      <p:sp>
+        <p:nvSpPr>
+          <p:cNvPr id="2" name="Slide Image Placeholder 1"/>
+          <p:cNvSpPr>
+            <a:spLocks noGrp="1" noRot="1" noChangeAspect="1"/>
+          </p:cNvSpPr>
+          <p:nvPr>
+            <p:ph type="sldImg"/>
+          </p:nvPr>
+        </p:nvSpPr>
+        <p:spPr/>
+      </p:sp>
+      <p:sp>
+        <p:nvSpPr>
+          <p:cNvPr id="3" name="Notes Placeholder 2"/>
+          <p:cNvSpPr>
+            <a:spLocks noGrp="1"/>
+          </p:cNvSpPr>
+          <p:nvPr>
+            <p:ph type="body" idx="1"/>
+          </p:nvPr>
+        </p:nvSpPr>
+        <p:spPr/>
+        <p:txBody>
+          <a:bodyPr/>
+          <a:lstStyle/>
+          <a:p>
+            <a:r>
+              <a:rPr lang="en-US" dirty="0"/>
+              <a:t>Step 2 is sample data buckets</a:t>
+            </a:r>
+          </a:p>
+          <a:p>
+            <a:r>
+              <a:rPr lang="en-US" dirty="0"/>
+              <a:t>We aren't using them, and they can be installed later, so just hit next</a:t>
+            </a:r>
+          </a:p>
+          <a:p>
+            <a:endParaRPr lang="en-US" dirty="0"/>
+          </a:p>
+        </p:txBody>
+      </p:sp>
+      <p:sp>
+        <p:nvSpPr>
+          <p:cNvPr id="4" name="Slide Number Placeholder 3"/>
+          <p:cNvSpPr>
+            <a:spLocks noGrp="1"/>
+          </p:cNvSpPr>
+          <p:nvPr>
+            <p:ph type="sldNum" sz="quarter" idx="10"/>
+          </p:nvPr>
+        </p:nvSpPr>
+        <p:spPr/>
+        <p:txBody>
+          <a:bodyPr/>
+          <a:lstStyle/>
+          <a:p>
+            <a:fld id="{F39351FC-18D6-4741-8EEB-9FDB1F020AAC}" type="slidenum">
+              <a:rPr lang="en-US" smtClean="0"/>
+              <a:t>16</a:t>
+            </a:fld>
+            <a:endParaRPr lang="en-US"/>
+          </a:p>
+        </p:txBody>
+      </p:sp>
+    </p:spTree>
+    <p:extLst>
+      <p:ext uri="{BB962C8B-B14F-4D97-AF65-F5344CB8AC3E}">
+        <p14:creationId xmlns:p14="http://schemas.microsoft.com/office/powerpoint/2010/main" val="2160737452"/>
       </p:ext>
     </p:extLst>
   </p:cSld>
@@ -7478,6 +8135,30 @@
           <a:chExt cx="0" cy="0"/>
         </a:xfrm>
       </p:grpSpPr>
+      <p:pic>
+        <p:nvPicPr>
+          <p:cNvPr id="8" name="Picture 7"/>
+          <p:cNvPicPr>
+            <a:picLocks noChangeAspect="1"/>
+          </p:cNvPicPr>
+          <p:nvPr/>
+        </p:nvPicPr>
+        <p:blipFill>
+          <a:blip r:embed="rId3"/>
+          <a:stretch>
+            <a:fillRect/>
+          </a:stretch>
+        </p:blipFill>
+        <p:spPr>
+          <a:xfrm>
+            <a:off x="300877" y="1481137"/>
+            <a:ext cx="8504005" cy="3181527"/>
+          </a:xfrm>
+          <a:prstGeom prst="rect">
+            <a:avLst/>
+          </a:prstGeom>
+        </p:spPr>
+      </p:pic>
       <p:sp>
         <p:nvSpPr>
           <p:cNvPr id="2" name="Title 1"/>
@@ -7718,7 +8399,7 @@
                 <a:latin typeface="Courier New" panose="02070309020205020404" pitchFamily="49" charset="0"/>
                 <a:cs typeface="Courier New" panose="02070309020205020404" pitchFamily="49" charset="0"/>
               </a:rPr>
-              <a:t> /the/path/to/couchbase460.tar</a:t>
+              <a:t> /the/path/to/couchbase461.tar</a:t>
             </a:r>
           </a:p>
           <a:p>
@@ -7743,30 +8424,6 @@
           </a:p>
         </p:txBody>
       </p:sp>
-      <p:pic>
-        <p:nvPicPr>
-          <p:cNvPr id="4" name="Picture 3"/>
-          <p:cNvPicPr>
-            <a:picLocks noChangeAspect="1"/>
-          </p:cNvPicPr>
-          <p:nvPr/>
-        </p:nvPicPr>
-        <p:blipFill>
-          <a:blip r:embed="rId3"/>
-          <a:stretch>
-            <a:fillRect/>
-          </a:stretch>
-        </p:blipFill>
-        <p:spPr>
-          <a:xfrm>
-            <a:off x="569943" y="1535874"/>
-            <a:ext cx="8318437" cy="3054055"/>
-          </a:xfrm>
-          <a:prstGeom prst="rect">
-            <a:avLst/>
-          </a:prstGeom>
-        </p:spPr>
-      </p:pic>
       <p:sp>
         <p:nvSpPr>
           <p:cNvPr id="6" name="Rectangle 5"/>
@@ -7775,7 +8432,7 @@
         </p:nvSpPr>
         <p:spPr>
           <a:xfrm>
-            <a:off x="3478306" y="1499067"/>
+            <a:off x="3154456" y="1784817"/>
             <a:ext cx="2913529" cy="213192"/>
           </a:xfrm>
           <a:prstGeom prst="rect">
@@ -7820,8 +8477,8 @@
         </p:nvSpPr>
         <p:spPr>
           <a:xfrm>
-            <a:off x="564777" y="3062901"/>
-            <a:ext cx="4338917" cy="213192"/>
+            <a:off x="272303" y="4215426"/>
+            <a:ext cx="4433047" cy="213192"/>
           </a:xfrm>
           <a:prstGeom prst="rect">
             <a:avLst/>
@@ -8103,7 +8760,7 @@
                 <a:latin typeface="Courier New" panose="02070309020205020404" pitchFamily="49" charset="0"/>
                 <a:cs typeface="Courier New" panose="02070309020205020404" pitchFamily="49" charset="0"/>
               </a:rPr>
-              <a:t>couchbase:4.5.1</a:t>
+              <a:t>couchbase:4.6.1</a:t>
             </a:r>
           </a:p>
           <a:p>
@@ -8137,7 +8794,7 @@
                 <a:latin typeface="Courier New" panose="02070309020205020404" pitchFamily="49" charset="0"/>
                 <a:cs typeface="Courier New" panose="02070309020205020404" pitchFamily="49" charset="0"/>
               </a:rPr>
-              <a:t> -p 8091-8094:8091-8094 –p 11210:11210 couchbase:enterprise-4.6.0</a:t>
+              <a:t> -p 8091-8094:8091-8094 –p 11210:11210 couchbase:4.6.1</a:t>
             </a:r>
           </a:p>
           <a:p>
@@ -8188,7 +8845,7 @@
       </p:sp>
       <p:pic>
         <p:nvPicPr>
-          <p:cNvPr id="4" name="Picture 3"/>
+          <p:cNvPr id="5" name="Picture 4"/>
           <p:cNvPicPr>
             <a:picLocks noChangeAspect="1"/>
           </p:cNvPicPr>
@@ -8202,8 +8859,8 @@
         </p:blipFill>
         <p:spPr>
           <a:xfrm>
-            <a:off x="198157" y="3423692"/>
-            <a:ext cx="8658225" cy="988025"/>
+            <a:off x="198157" y="3400425"/>
+            <a:ext cx="8820150" cy="895350"/>
           </a:xfrm>
           <a:prstGeom prst="rect">
             <a:avLst/>
@@ -8262,47 +8919,6 @@
           </a:p>
         </p:txBody>
       </p:sp>
-      <p:pic>
-        <p:nvPicPr>
-          <p:cNvPr id="2050" name="Picture 2" descr="Couchbase Server Console"/>
-          <p:cNvPicPr>
-            <a:picLocks noChangeAspect="1" noChangeArrowheads="1"/>
-          </p:cNvPicPr>
-          <p:nvPr/>
-        </p:nvPicPr>
-        <p:blipFill>
-          <a:blip r:embed="rId3">
-            <a:extLst>
-              <a:ext uri="{28A0092B-C50C-407E-A947-70E740481C1C}">
-                <a14:useLocalDpi xmlns:a14="http://schemas.microsoft.com/office/drawing/2010/main" val="0"/>
-              </a:ext>
-            </a:extLst>
-          </a:blip>
-          <a:srcRect/>
-          <a:stretch>
-            <a:fillRect/>
-          </a:stretch>
-        </p:blipFill>
-        <p:spPr bwMode="auto">
-          <a:xfrm>
-            <a:off x="2390775" y="1019483"/>
-            <a:ext cx="4505325" cy="3923992"/>
-          </a:xfrm>
-          <a:prstGeom prst="rect">
-            <a:avLst/>
-          </a:prstGeom>
-          <a:noFill/>
-          <a:extLst>
-            <a:ext uri="{909E8E84-426E-40DD-AFC4-6F175D3DCCD1}">
-              <a14:hiddenFill xmlns:a14="http://schemas.microsoft.com/office/drawing/2010/main">
-                <a:solidFill>
-                  <a:srgbClr val="FFFFFF"/>
-                </a:solidFill>
-              </a14:hiddenFill>
-            </a:ext>
-          </a:extLst>
-        </p:spPr>
-      </p:pic>
       <p:sp>
         <p:nvSpPr>
           <p:cNvPr id="3" name="Rectangle 2"/>
@@ -8330,7 +8946,7 @@
             </a:pPr>
             <a:r>
               <a:rPr lang="en-US" dirty="0">
-                <a:hlinkClick r:id="rId4"/>
+                <a:hlinkClick r:id="rId3"/>
               </a:rPr>
               <a:t>http://localhost:8091</a:t>
             </a:r>
@@ -8345,6 +8961,30 @@
           </a:p>
         </p:txBody>
       </p:sp>
+      <p:pic>
+        <p:nvPicPr>
+          <p:cNvPr id="4" name="Picture 3"/>
+          <p:cNvPicPr>
+            <a:picLocks noChangeAspect="1"/>
+          </p:cNvPicPr>
+          <p:nvPr/>
+        </p:nvPicPr>
+        <p:blipFill>
+          <a:blip r:embed="rId4"/>
+          <a:stretch>
+            <a:fillRect/>
+          </a:stretch>
+        </p:blipFill>
+        <p:spPr>
+          <a:xfrm>
+            <a:off x="2422799" y="1060737"/>
+            <a:ext cx="4149452" cy="3977987"/>
+          </a:xfrm>
+          <a:prstGeom prst="rect">
+            <a:avLst/>
+          </a:prstGeom>
+        </p:spPr>
+      </p:pic>
     </p:spTree>
     <p:extLst>
       <p:ext uri="{BB962C8B-B14F-4D97-AF65-F5344CB8AC3E}">
@@ -8462,47 +9102,6 @@
           </a:p>
         </p:txBody>
       </p:sp>
-      <p:pic>
-        <p:nvPicPr>
-          <p:cNvPr id="2050" name="Picture 2" descr="Couchbase Server Console"/>
-          <p:cNvPicPr>
-            <a:picLocks noChangeAspect="1" noChangeArrowheads="1"/>
-          </p:cNvPicPr>
-          <p:nvPr/>
-        </p:nvPicPr>
-        <p:blipFill>
-          <a:blip r:embed="rId2">
-            <a:extLst>
-              <a:ext uri="{28A0092B-C50C-407E-A947-70E740481C1C}">
-                <a14:useLocalDpi xmlns:a14="http://schemas.microsoft.com/office/drawing/2010/main" val="0"/>
-              </a:ext>
-            </a:extLst>
-          </a:blip>
-          <a:srcRect/>
-          <a:stretch>
-            <a:fillRect/>
-          </a:stretch>
-        </p:blipFill>
-        <p:spPr bwMode="auto">
-          <a:xfrm>
-            <a:off x="2390775" y="1019483"/>
-            <a:ext cx="4505325" cy="3923992"/>
-          </a:xfrm>
-          <a:prstGeom prst="rect">
-            <a:avLst/>
-          </a:prstGeom>
-          <a:noFill/>
-          <a:extLst>
-            <a:ext uri="{909E8E84-426E-40DD-AFC4-6F175D3DCCD1}">
-              <a14:hiddenFill xmlns:a14="http://schemas.microsoft.com/office/drawing/2010/main">
-                <a:solidFill>
-                  <a:srgbClr val="FFFFFF"/>
-                </a:solidFill>
-              </a14:hiddenFill>
-            </a:ext>
-          </a:extLst>
-        </p:spPr>
-      </p:pic>
       <p:sp>
         <p:nvSpPr>
           <p:cNvPr id="3" name="Rectangle 2"/>
@@ -8530,7 +9129,7 @@
             </a:pPr>
             <a:r>
               <a:rPr lang="en-US" dirty="0">
-                <a:hlinkClick r:id="rId3"/>
+                <a:hlinkClick r:id="rId2"/>
               </a:rPr>
               <a:t>http://localhost:8091</a:t>
             </a:r>
@@ -8545,6 +9144,30 @@
           </a:p>
         </p:txBody>
       </p:sp>
+      <p:pic>
+        <p:nvPicPr>
+          <p:cNvPr id="5" name="Picture 4"/>
+          <p:cNvPicPr>
+            <a:picLocks noChangeAspect="1"/>
+          </p:cNvPicPr>
+          <p:nvPr/>
+        </p:nvPicPr>
+        <p:blipFill>
+          <a:blip r:embed="rId3"/>
+          <a:stretch>
+            <a:fillRect/>
+          </a:stretch>
+        </p:blipFill>
+        <p:spPr>
+          <a:xfrm>
+            <a:off x="2422799" y="1060737"/>
+            <a:ext cx="4149452" cy="3977987"/>
+          </a:xfrm>
+          <a:prstGeom prst="rect">
+            <a:avLst/>
+          </a:prstGeom>
+        </p:spPr>
+      </p:pic>
     </p:spTree>
     <p:extLst>
       <p:ext uri="{BB962C8B-B14F-4D97-AF65-F5344CB8AC3E}">
@@ -8699,7 +9322,7 @@
           <p:nvPr/>
         </p:nvPicPr>
         <p:blipFill>
-          <a:blip r:embed="rId2">
+          <a:blip r:embed="rId3">
             <a:extLst>
               <a:ext uri="{28A0092B-C50C-407E-A947-70E740481C1C}">
                 <a14:useLocalDpi xmlns:a14="http://schemas.microsoft.com/office/drawing/2010/main" val="0"/>
@@ -8792,7 +9415,7 @@
           <p:nvPr/>
         </p:nvPicPr>
         <p:blipFill>
-          <a:blip r:embed="rId2">
+          <a:blip r:embed="rId3">
             <a:extLst>
               <a:ext uri="{28A0092B-C50C-407E-A947-70E740481C1C}">
                 <a14:useLocalDpi xmlns:a14="http://schemas.microsoft.com/office/drawing/2010/main" val="0"/>
@@ -8878,49 +9501,32 @@
       </p:sp>
       <p:pic>
         <p:nvPicPr>
-          <p:cNvPr id="6146" name="Picture 2" descr="Couchbase Server Setup Wizard Admin Credentials"/>
+          <p:cNvPr id="3" name="Picture 2"/>
           <p:cNvPicPr>
-            <a:picLocks noChangeAspect="1" noChangeArrowheads="1"/>
+            <a:picLocks noChangeAspect="1"/>
           </p:cNvPicPr>
           <p:nvPr/>
         </p:nvPicPr>
         <p:blipFill>
-          <a:blip r:embed="rId2">
-            <a:extLst>
-              <a:ext uri="{28A0092B-C50C-407E-A947-70E740481C1C}">
-                <a14:useLocalDpi xmlns:a14="http://schemas.microsoft.com/office/drawing/2010/main" val="0"/>
-              </a:ext>
-            </a:extLst>
-          </a:blip>
-          <a:srcRect/>
+          <a:blip r:embed="rId3"/>
           <a:stretch>
             <a:fillRect/>
           </a:stretch>
         </p:blipFill>
-        <p:spPr bwMode="auto">
+        <p:spPr>
           <a:xfrm>
-            <a:off x="852489" y="943485"/>
-            <a:ext cx="7110412" cy="3728528"/>
+            <a:off x="1706523" y="721187"/>
+            <a:ext cx="5684877" cy="4184187"/>
           </a:xfrm>
           <a:prstGeom prst="rect">
             <a:avLst/>
           </a:prstGeom>
-          <a:noFill/>
-          <a:extLst>
-            <a:ext uri="{909E8E84-426E-40DD-AFC4-6F175D3DCCD1}">
-              <a14:hiddenFill xmlns:a14="http://schemas.microsoft.com/office/drawing/2010/main">
-                <a:solidFill>
-                  <a:srgbClr val="FFFFFF"/>
-                </a:solidFill>
-              </a14:hiddenFill>
-            </a:ext>
-          </a:extLst>
         </p:spPr>
       </p:pic>
     </p:spTree>
     <p:extLst>
       <p:ext uri="{BB962C8B-B14F-4D97-AF65-F5344CB8AC3E}">
-        <p14:creationId xmlns:p14="http://schemas.microsoft.com/office/powerpoint/2010/main" val="4101536371"/>
+        <p14:creationId xmlns:p14="http://schemas.microsoft.com/office/powerpoint/2010/main" val="1638936398"/>
       </p:ext>
     </p:extLst>
   </p:cSld>
@@ -8971,32 +9577,49 @@
       </p:sp>
       <p:pic>
         <p:nvPicPr>
-          <p:cNvPr id="3" name="Picture 2"/>
+          <p:cNvPr id="6146" name="Picture 2" descr="Couchbase Server Setup Wizard Admin Credentials"/>
           <p:cNvPicPr>
-            <a:picLocks noChangeAspect="1"/>
+            <a:picLocks noChangeAspect="1" noChangeArrowheads="1"/>
           </p:cNvPicPr>
           <p:nvPr/>
         </p:nvPicPr>
         <p:blipFill>
-          <a:blip r:embed="rId2"/>
+          <a:blip r:embed="rId3">
+            <a:extLst>
+              <a:ext uri="{28A0092B-C50C-407E-A947-70E740481C1C}">
+                <a14:useLocalDpi xmlns:a14="http://schemas.microsoft.com/office/drawing/2010/main" val="0"/>
+              </a:ext>
+            </a:extLst>
+          </a:blip>
+          <a:srcRect/>
           <a:stretch>
             <a:fillRect/>
           </a:stretch>
         </p:blipFill>
-        <p:spPr>
+        <p:spPr bwMode="auto">
           <a:xfrm>
-            <a:off x="2009764" y="666634"/>
-            <a:ext cx="4991111" cy="4305416"/>
+            <a:off x="852489" y="943485"/>
+            <a:ext cx="7110412" cy="3728528"/>
           </a:xfrm>
           <a:prstGeom prst="rect">
             <a:avLst/>
           </a:prstGeom>
+          <a:noFill/>
+          <a:extLst>
+            <a:ext uri="{909E8E84-426E-40DD-AFC4-6F175D3DCCD1}">
+              <a14:hiddenFill xmlns:a14="http://schemas.microsoft.com/office/drawing/2010/main">
+                <a:solidFill>
+                  <a:srgbClr val="FFFFFF"/>
+                </a:solidFill>
+              </a14:hiddenFill>
+            </a:ext>
+          </a:extLst>
         </p:spPr>
       </p:pic>
     </p:spTree>
     <p:extLst>
       <p:ext uri="{BB962C8B-B14F-4D97-AF65-F5344CB8AC3E}">
-        <p14:creationId xmlns:p14="http://schemas.microsoft.com/office/powerpoint/2010/main" val="4099160036"/>
+        <p14:creationId xmlns:p14="http://schemas.microsoft.com/office/powerpoint/2010/main" val="4101536371"/>
       </p:ext>
     </p:extLst>
   </p:cSld>
@@ -9173,6 +9796,82 @@
             <a:spLocks noGrp="1"/>
           </p:cNvSpPr>
           <p:nvPr>
+            <p:ph type="title"/>
+          </p:nvPr>
+        </p:nvSpPr>
+        <p:spPr/>
+        <p:txBody>
+          <a:bodyPr/>
+          <a:lstStyle/>
+          <a:p>
+            <a:r>
+              <a:rPr lang="en-US" dirty="0"/>
+              <a:t>Configuration</a:t>
+            </a:r>
+          </a:p>
+        </p:txBody>
+      </p:sp>
+      <p:pic>
+        <p:nvPicPr>
+          <p:cNvPr id="3" name="Picture 2"/>
+          <p:cNvPicPr>
+            <a:picLocks noChangeAspect="1"/>
+          </p:cNvPicPr>
+          <p:nvPr/>
+        </p:nvPicPr>
+        <p:blipFill>
+          <a:blip r:embed="rId3"/>
+          <a:stretch>
+            <a:fillRect/>
+          </a:stretch>
+        </p:blipFill>
+        <p:spPr>
+          <a:xfrm>
+            <a:off x="2009764" y="666634"/>
+            <a:ext cx="4991111" cy="4305416"/>
+          </a:xfrm>
+          <a:prstGeom prst="rect">
+            <a:avLst/>
+          </a:prstGeom>
+        </p:spPr>
+      </p:pic>
+    </p:spTree>
+    <p:extLst>
+      <p:ext uri="{BB962C8B-B14F-4D97-AF65-F5344CB8AC3E}">
+        <p14:creationId xmlns:p14="http://schemas.microsoft.com/office/powerpoint/2010/main" val="4099160036"/>
+      </p:ext>
+    </p:extLst>
+  </p:cSld>
+  <p:clrMapOvr>
+    <a:masterClrMapping/>
+  </p:clrMapOvr>
+</p:sld>
+</file>
+
+<file path=ppt/slides/slide21.xml><?xml version="1.0" encoding="utf-8"?>
+<p:sld xmlns:a="http://schemas.openxmlformats.org/drawingml/2006/main" xmlns:r="http://schemas.openxmlformats.org/officeDocument/2006/relationships" xmlns:p="http://schemas.openxmlformats.org/presentationml/2006/main">
+  <p:cSld>
+    <p:spTree>
+      <p:nvGrpSpPr>
+        <p:cNvPr id="1" name=""/>
+        <p:cNvGrpSpPr/>
+        <p:nvPr/>
+      </p:nvGrpSpPr>
+      <p:grpSpPr>
+        <a:xfrm>
+          <a:off x="0" y="0"/>
+          <a:ext cx="0" cy="0"/>
+          <a:chOff x="0" y="0"/>
+          <a:chExt cx="0" cy="0"/>
+        </a:xfrm>
+      </p:grpSpPr>
+      <p:sp>
+        <p:nvSpPr>
+          <p:cNvPr id="2" name="Title 1"/>
+          <p:cNvSpPr>
+            <a:spLocks noGrp="1"/>
+          </p:cNvSpPr>
+          <p:nvPr>
             <p:ph type="ctrTitle"/>
           </p:nvPr>
         </p:nvSpPr>
@@ -9518,7 +10217,7 @@
       </p:sp>
       <p:pic>
         <p:nvPicPr>
-          <p:cNvPr id="4" name="Picture 3"/>
+          <p:cNvPr id="3" name="Picture 2"/>
           <p:cNvPicPr>
             <a:picLocks noChangeAspect="1"/>
           </p:cNvPicPr>
@@ -9532,8 +10231,8 @@
         </p:blipFill>
         <p:spPr>
           <a:xfrm>
-            <a:off x="1737165" y="1458065"/>
-            <a:ext cx="5634596" cy="3589123"/>
+            <a:off x="2037463" y="1721259"/>
+            <a:ext cx="4847211" cy="3117441"/>
           </a:xfrm>
           <a:prstGeom prst="rect">
             <a:avLst/>
@@ -9903,7 +10602,7 @@
       </p:sp>
       <p:pic>
         <p:nvPicPr>
-          <p:cNvPr id="5" name="Picture 4"/>
+          <p:cNvPr id="3" name="Picture 2"/>
           <p:cNvPicPr>
             <a:picLocks noChangeAspect="1"/>
           </p:cNvPicPr>
@@ -9917,8 +10616,8 @@
         </p:blipFill>
         <p:spPr>
           <a:xfrm>
-            <a:off x="664851" y="1229805"/>
-            <a:ext cx="7531901" cy="3331667"/>
+            <a:off x="323850" y="1228725"/>
+            <a:ext cx="8679754" cy="3260490"/>
           </a:xfrm>
           <a:prstGeom prst="rect">
             <a:avLst/>
@@ -11111,7 +11810,7 @@
             </a:r>
             <a:r>
               <a:rPr lang="en-US" sz="1800" dirty="0">
-                <a:hlinkClick r:id="rId2"/>
+                <a:hlinkClick r:id="rId3"/>
               </a:rPr>
               <a:t>http://ec2-52-1-3-4.compute-1.amazonaws.com:8091</a:t>
             </a:r>

</xml_diff>

<commit_message>
tweaks for workshops part 1 and 2 - removed _workshop folders (confusing) - updated Couchbase SDK and added auth for Couchbase Server 5 - updated slide decks, with corresponding PDFs
</commit_message>
<xml_diff>
--- a/01/01.pptx
+++ b/01/01.pptx
@@ -6,33 +6,32 @@
     <p:sldMasterId id="2147483684" r:id="rId2"/>
   </p:sldMasterIdLst>
   <p:notesMasterIdLst>
-    <p:notesMasterId r:id="rId24"/>
+    <p:notesMasterId r:id="rId23"/>
   </p:notesMasterIdLst>
   <p:handoutMasterIdLst>
-    <p:handoutMasterId r:id="rId25"/>
+    <p:handoutMasterId r:id="rId24"/>
   </p:handoutMasterIdLst>
   <p:sldIdLst>
-    <p:sldId id="444" r:id="rId3"/>
-    <p:sldId id="445" r:id="rId4"/>
-    <p:sldId id="497" r:id="rId5"/>
-    <p:sldId id="472" r:id="rId6"/>
-    <p:sldId id="488" r:id="rId7"/>
-    <p:sldId id="485" r:id="rId8"/>
-    <p:sldId id="495" r:id="rId9"/>
-    <p:sldId id="486" r:id="rId10"/>
-    <p:sldId id="496" r:id="rId11"/>
-    <p:sldId id="500" r:id="rId12"/>
+    <p:sldId id="502" r:id="rId3"/>
+    <p:sldId id="504" r:id="rId4"/>
+    <p:sldId id="505" r:id="rId5"/>
+    <p:sldId id="444" r:id="rId6"/>
+    <p:sldId id="445" r:id="rId7"/>
+    <p:sldId id="497" r:id="rId8"/>
+    <p:sldId id="472" r:id="rId9"/>
+    <p:sldId id="488" r:id="rId10"/>
+    <p:sldId id="485" r:id="rId11"/>
+    <p:sldId id="486" r:id="rId12"/>
     <p:sldId id="487" r:id="rId13"/>
     <p:sldId id="489" r:id="rId14"/>
     <p:sldId id="498" r:id="rId15"/>
     <p:sldId id="499" r:id="rId16"/>
-    <p:sldId id="490" r:id="rId17"/>
-    <p:sldId id="491" r:id="rId18"/>
-    <p:sldId id="492" r:id="rId19"/>
-    <p:sldId id="501" r:id="rId20"/>
-    <p:sldId id="493" r:id="rId21"/>
-    <p:sldId id="494" r:id="rId22"/>
-    <p:sldId id="484" r:id="rId23"/>
+    <p:sldId id="506" r:id="rId17"/>
+    <p:sldId id="507" r:id="rId18"/>
+    <p:sldId id="508" r:id="rId19"/>
+    <p:sldId id="494" r:id="rId20"/>
+    <p:sldId id="509" r:id="rId21"/>
+    <p:sldId id="484" r:id="rId22"/>
   </p:sldIdLst>
   <p:sldSz cx="9144000" cy="5143500" type="screen16x9"/>
   <p:notesSz cx="6858000" cy="9144000"/>
@@ -136,26 +135,25 @@
       <p14:sectionLst xmlns:p14="http://schemas.microsoft.com/office/powerpoint/2010/main">
         <p14:section name="Default Section" id="{7CC3AC08-9A30-477B-882B-9C484112DCC2}">
           <p14:sldIdLst>
+            <p14:sldId id="502"/>
+            <p14:sldId id="504"/>
+            <p14:sldId id="505"/>
             <p14:sldId id="444"/>
             <p14:sldId id="445"/>
             <p14:sldId id="497"/>
             <p14:sldId id="472"/>
             <p14:sldId id="488"/>
             <p14:sldId id="485"/>
-            <p14:sldId id="495"/>
             <p14:sldId id="486"/>
-            <p14:sldId id="496"/>
-            <p14:sldId id="500"/>
             <p14:sldId id="487"/>
             <p14:sldId id="489"/>
             <p14:sldId id="498"/>
             <p14:sldId id="499"/>
-            <p14:sldId id="490"/>
-            <p14:sldId id="491"/>
-            <p14:sldId id="492"/>
-            <p14:sldId id="501"/>
-            <p14:sldId id="493"/>
+            <p14:sldId id="506"/>
+            <p14:sldId id="507"/>
+            <p14:sldId id="508"/>
             <p14:sldId id="494"/>
+            <p14:sldId id="509"/>
             <p14:sldId id="484"/>
           </p14:sldIdLst>
         </p14:section>
@@ -203,6 +201,10 @@
 </p:presentation>
 </file>
 
+<file path=ppt/revisionInfo.xml><?xml version="1.0" encoding="utf-8"?>
+<p1510:revInfo xmlns:a="http://schemas.openxmlformats.org/drawingml/2006/main" xmlns:r="http://schemas.openxmlformats.org/officeDocument/2006/relationships" xmlns:p1510="http://schemas.microsoft.com/office/powerpoint/2015/10/main"/>
+</file>
+
 <file path=ppt/handoutMasters/handoutMaster1.xml><?xml version="1.0" encoding="utf-8"?>
 <p:handoutMaster xmlns:a="http://schemas.openxmlformats.org/drawingml/2006/main" xmlns:r="http://schemas.openxmlformats.org/officeDocument/2006/relationships" xmlns:p="http://schemas.openxmlformats.org/presentationml/2006/main">
   <p:cSld>
@@ -285,7 +287,7 @@
           <a:p>
             <a:fld id="{B5389E1E-C654-E943-9883-792E99AD7287}" type="datetimeFigureOut">
               <a:rPr lang="en-US" smtClean="0"/>
-              <a:t>3/22/2017</a:t>
+              <a:t>11/2/2017</a:t>
             </a:fld>
             <a:endParaRPr lang="en-US"/>
           </a:p>
@@ -451,7 +453,7 @@
           <a:p>
             <a:fld id="{9920D99B-2862-464A-984E-65BFC5FC0BBC}" type="datetimeFigureOut">
               <a:rPr lang="en-US" smtClean="0"/>
-              <a:t>3/22/2017</a:t>
+              <a:t>11/2/2017</a:t>
             </a:fld>
             <a:endParaRPr lang="en-US"/>
           </a:p>
@@ -763,79 +765,7 @@
           <a:bodyPr/>
           <a:lstStyle/>
           <a:p>
-            <a:pPr marL="0" indent="0">
-              <a:lnSpc>
-                <a:spcPct val="140000"/>
-              </a:lnSpc>
-              <a:buClr>
-                <a:schemeClr val="accent2"/>
-              </a:buClr>
-              <a:buFont typeface="Arial"/>
-              <a:buNone/>
-            </a:pPr>
-            <a:r>
-              <a:rPr lang="en-US" sz="1200" dirty="0">
-                <a:latin typeface="+mn-lt"/>
-              </a:rPr>
-              <a:t>Doesn’t work on Ubuntu 16</a:t>
-            </a:r>
-          </a:p>
-          <a:p>
-            <a:pPr marL="0" indent="0">
-              <a:lnSpc>
-                <a:spcPct val="140000"/>
-              </a:lnSpc>
-              <a:buClr>
-                <a:schemeClr val="accent2"/>
-              </a:buClr>
-              <a:buFont typeface="Arial"/>
-              <a:buNone/>
-            </a:pPr>
-            <a:r>
-              <a:rPr lang="en-US" sz="1200" dirty="0">
-                <a:latin typeface="+mn-lt"/>
-              </a:rPr>
-              <a:t>Doesn’t work on Mac</a:t>
-            </a:r>
-            <a:r>
-              <a:rPr lang="en-US" sz="1200" baseline="0" dirty="0">
-                <a:latin typeface="+mn-lt"/>
-              </a:rPr>
-              <a:t> OS X “Sierra”</a:t>
-            </a:r>
-          </a:p>
-          <a:p>
-            <a:pPr marL="0" indent="0">
-              <a:lnSpc>
-                <a:spcPct val="140000"/>
-              </a:lnSpc>
-              <a:buClr>
-                <a:schemeClr val="accent2"/>
-              </a:buClr>
-              <a:buFont typeface="Arial"/>
-              <a:buNone/>
-            </a:pPr>
-            <a:r>
-              <a:rPr lang="en-US" sz="1200" baseline="0" dirty="0">
-                <a:latin typeface="+mn-lt"/>
-              </a:rPr>
-              <a:t>If you don’t have those, you can use a cloud instance, or </a:t>
-            </a:r>
-            <a:r>
-              <a:rPr lang="en-US" sz="1200" baseline="0" dirty="0" err="1">
-                <a:latin typeface="+mn-lt"/>
-              </a:rPr>
-              <a:t>docker</a:t>
-            </a:r>
-            <a:r>
-              <a:rPr lang="en-US" sz="1200" baseline="0" dirty="0">
-                <a:latin typeface="+mn-lt"/>
-              </a:rPr>
-              <a:t>, or a VM</a:t>
-            </a:r>
-            <a:endParaRPr lang="en-US" sz="1200" dirty="0">
-              <a:latin typeface="+mn-lt"/>
-            </a:endParaRPr>
+            <a:endParaRPr lang="en-US" dirty="0"/>
           </a:p>
         </p:txBody>
       </p:sp>
@@ -856,7 +786,7 @@
           <a:p>
             <a:fld id="{F39351FC-18D6-4741-8EEB-9FDB1F020AAC}" type="slidenum">
               <a:rPr lang="en-US" smtClean="0"/>
-              <a:t>4</a:t>
+              <a:t>1</a:t>
             </a:fld>
             <a:endParaRPr lang="en-US"/>
           </a:p>
@@ -865,7 +795,7 @@
     </p:spTree>
     <p:extLst>
       <p:ext uri="{BB962C8B-B14F-4D97-AF65-F5344CB8AC3E}">
-        <p14:creationId xmlns:p14="http://schemas.microsoft.com/office/powerpoint/2010/main" val="2268015358"/>
+        <p14:creationId xmlns:p14="http://schemas.microsoft.com/office/powerpoint/2010/main" val="1291721698"/>
       </p:ext>
     </p:extLst>
   </p:cSld>
@@ -921,19 +851,11 @@
           <a:p>
             <a:r>
               <a:rPr lang="en-US" dirty="0"/>
-              <a:t>You can optionally create a bucket called 'default'. You can skip this, and I recommend not using a bucket named 'default' in production. But for this lab it's fine.</a:t>
-            </a:r>
-          </a:p>
-          <a:p>
-            <a:r>
-              <a:rPr lang="en-US" dirty="0"/>
-              <a:t>I'd recommend not using the full RAM quota, but it can be changed later</a:t>
-            </a:r>
-          </a:p>
-          <a:p>
-            <a:r>
-              <a:rPr lang="en-US" dirty="0"/>
-              <a:t>Recommend sticking with the default settings otherwise</a:t>
+              <a:t>If you see this screen, </a:t>
+            </a:r>
+            <a:r>
+              <a:rPr lang="en-US"/>
+              <a:t>you've completed the workshop!</a:t>
             </a:r>
           </a:p>
         </p:txBody>
@@ -955,7 +877,7 @@
           <a:p>
             <a:fld id="{F39351FC-18D6-4741-8EEB-9FDB1F020AAC}" type="slidenum">
               <a:rPr lang="en-US" smtClean="0"/>
-              <a:t>17</a:t>
+              <a:t>18</a:t>
             </a:fld>
             <a:endParaRPr lang="en-US"/>
           </a:p>
@@ -964,7 +886,7 @@
     </p:spTree>
     <p:extLst>
       <p:ext uri="{BB962C8B-B14F-4D97-AF65-F5344CB8AC3E}">
-        <p14:creationId xmlns:p14="http://schemas.microsoft.com/office/powerpoint/2010/main" val="3982358819"/>
+        <p14:creationId xmlns:p14="http://schemas.microsoft.com/office/powerpoint/2010/main" val="347027653"/>
       </p:ext>
     </p:extLst>
   </p:cSld>
@@ -1020,131 +942,268 @@
           <a:p>
             <a:r>
               <a:rPr lang="en-US" dirty="0"/>
-              <a:t>Enterprise Edition is what we're using today. You need a license to go into production with it, but for development it's totally fine.</a:t>
-            </a:r>
-          </a:p>
-          <a:p>
+              <a:t>Tour</a:t>
+            </a:r>
+          </a:p>
+          <a:p>
+            <a:pPr marL="171450" marR="0" lvl="0" indent="-171450" algn="l" defTabSz="457200" rtl="0" eaLnBrk="1" fontAlgn="auto" latinLnBrk="0" hangingPunct="1">
+              <a:lnSpc>
+                <a:spcPct val="100000"/>
+              </a:lnSpc>
+              <a:spcBef>
+                <a:spcPts val="0"/>
+              </a:spcBef>
+              <a:spcAft>
+                <a:spcPts val="0"/>
+              </a:spcAft>
+              <a:buClrTx/>
+              <a:buSzTx/>
+              <a:buFontTx/>
+              <a:buChar char="-"/>
+              <a:tabLst/>
+              <a:defRPr/>
+            </a:pPr>
+            <a:r>
+              <a:rPr lang="en-US" dirty="0"/>
+              <a:t>Servers</a:t>
+            </a:r>
+          </a:p>
+          <a:p>
+            <a:pPr marL="171450" indent="-171450">
+              <a:buFontTx/>
+              <a:buChar char="-"/>
+            </a:pPr>
+            <a:r>
+              <a:rPr lang="en-US" dirty="0"/>
+              <a:t>Buckets, create new</a:t>
+            </a:r>
+          </a:p>
+          <a:p>
+            <a:pPr marL="171450" indent="-171450">
+              <a:buFontTx/>
+              <a:buChar char="-"/>
+            </a:pPr>
+            <a:r>
+              <a:rPr lang="en-US" dirty="0"/>
+              <a:t>Documents</a:t>
+            </a:r>
+          </a:p>
+          <a:p>
+            <a:pPr marL="171450" indent="-171450">
+              <a:buFontTx/>
+              <a:buChar char="-"/>
+            </a:pPr>
+            <a:r>
+              <a:rPr lang="en-US" dirty="0"/>
+              <a:t>Query</a:t>
+            </a:r>
+          </a:p>
+          <a:p>
+            <a:pPr marL="171450" indent="-171450">
+              <a:buFontTx/>
+              <a:buChar char="-"/>
+            </a:pPr>
+            <a:r>
+              <a:rPr lang="en-US" dirty="0"/>
+              <a:t>Settings</a:t>
+            </a:r>
+          </a:p>
+          <a:p>
+            <a:pPr marL="171450" indent="-171450">
+              <a:buFontTx/>
+              <a:buChar char="-"/>
+            </a:pPr>
+            <a:r>
+              <a:rPr lang="en-US" dirty="0"/>
+              <a:t>Sample buckets</a:t>
+            </a:r>
+          </a:p>
+          <a:p>
+            <a:pPr marL="0" indent="0">
+              <a:buFontTx/>
+              <a:buNone/>
+            </a:pPr>
+            <a:r>
+              <a:rPr lang="en-US" dirty="0"/>
+              <a:t>Create documents</a:t>
+            </a:r>
+          </a:p>
+          <a:p>
+            <a:pPr marL="171450" indent="-171450">
+              <a:buFontTx/>
+              <a:buChar char="-"/>
+            </a:pPr>
+            <a:r>
+              <a:rPr lang="en-US" dirty="0"/>
+              <a:t>Create a doc with </a:t>
+            </a:r>
+            <a:r>
+              <a:rPr lang="en-US" dirty="0" err="1"/>
+              <a:t>firstname</a:t>
+            </a:r>
+            <a:r>
+              <a:rPr lang="en-US" dirty="0"/>
+              <a:t>, </a:t>
+            </a:r>
+            <a:r>
+              <a:rPr lang="en-US" dirty="0" err="1"/>
+              <a:t>lastname</a:t>
+            </a:r>
+            <a:r>
+              <a:rPr lang="en-US" dirty="0"/>
+              <a:t>, email</a:t>
+            </a:r>
+          </a:p>
+          <a:p>
+            <a:pPr marL="171450" indent="-171450">
+              <a:buFontTx/>
+              <a:buChar char="-"/>
+            </a:pPr>
+            <a:r>
+              <a:rPr lang="en-US" dirty="0"/>
+              <a:t>Create another doc with </a:t>
+            </a:r>
+            <a:r>
+              <a:rPr lang="en-US" dirty="0" err="1"/>
+              <a:t>firstname</a:t>
+            </a:r>
+            <a:r>
+              <a:rPr lang="en-US" dirty="0"/>
+              <a:t>, </a:t>
+            </a:r>
+            <a:r>
+              <a:rPr lang="en-US" dirty="0" err="1"/>
+              <a:t>middlename</a:t>
+            </a:r>
+            <a:r>
+              <a:rPr lang="en-US" dirty="0"/>
+              <a:t>, </a:t>
+            </a:r>
+            <a:r>
+              <a:rPr lang="en-US" dirty="0" err="1"/>
+              <a:t>lastname</a:t>
+            </a:r>
+            <a:r>
+              <a:rPr lang="en-US" dirty="0"/>
+              <a:t>, email</a:t>
+            </a:r>
+          </a:p>
+          <a:p>
+            <a:pPr marL="0" indent="0">
+              <a:buFontTx/>
+              <a:buNone/>
+            </a:pPr>
+            <a:r>
+              <a:rPr lang="en-US" dirty="0"/>
+              <a:t>Modelling</a:t>
+            </a:r>
+          </a:p>
+          <a:p>
+            <a:pPr marL="171450" indent="-171450">
+              <a:buFontTx/>
+              <a:buChar char="-"/>
+            </a:pPr>
+            <a:r>
+              <a:rPr lang="en-US" dirty="0"/>
+              <a:t>Keys</a:t>
+            </a:r>
+          </a:p>
+          <a:p>
+            <a:pPr marL="171450" indent="-171450">
+              <a:buFontTx/>
+              <a:buChar char="-"/>
+            </a:pPr>
+            <a:r>
+              <a:rPr lang="en-US" dirty="0"/>
+              <a:t>Type field</a:t>
+            </a:r>
+          </a:p>
+          <a:p>
+            <a:pPr marL="171450" indent="-171450">
+              <a:buFontTx/>
+              <a:buChar char="-"/>
+            </a:pPr>
+            <a:r>
+              <a:rPr lang="en-US" dirty="0"/>
+              <a:t>Array</a:t>
+            </a:r>
+          </a:p>
+          <a:p>
+            <a:pPr marL="171450" indent="-171450">
+              <a:buFontTx/>
+              <a:buChar char="-"/>
+            </a:pPr>
+            <a:r>
+              <a:rPr lang="en-US" dirty="0"/>
+              <a:t>Hierarchy</a:t>
+            </a:r>
+          </a:p>
+          <a:p>
+            <a:pPr marL="0" indent="0">
+              <a:buFontTx/>
+              <a:buNone/>
+            </a:pPr>
+            <a:r>
+              <a:rPr lang="en-US" dirty="0"/>
+              <a:t>Security</a:t>
+            </a:r>
+          </a:p>
+          <a:p>
+            <a:pPr marL="171450" indent="-171450">
+              <a:buFontTx/>
+              <a:buChar char="-"/>
+            </a:pPr>
+            <a:r>
+              <a:rPr lang="en-US" dirty="0"/>
+              <a:t>Create user</a:t>
+            </a:r>
+          </a:p>
+          <a:p>
+            <a:pPr marL="171450" indent="-171450">
+              <a:buFontTx/>
+              <a:buChar char="-"/>
+            </a:pPr>
+            <a:r>
+              <a:rPr lang="en-US" dirty="0"/>
+              <a:t>Add roles</a:t>
+            </a:r>
+          </a:p>
+          <a:p>
+            <a:pPr marL="0" indent="0">
+              <a:buFontTx/>
+              <a:buNone/>
+            </a:pPr>
+            <a:r>
+              <a:rPr lang="en-US" dirty="0"/>
+              <a:t>Logs</a:t>
+            </a:r>
+          </a:p>
+          <a:p>
+            <a:pPr marL="0" indent="0">
+              <a:buFontTx/>
+              <a:buNone/>
+            </a:pPr>
+            <a:r>
+              <a:rPr lang="en-US" dirty="0"/>
+              <a:t>Indexes, primary index</a:t>
+            </a:r>
+          </a:p>
+          <a:p>
+            <a:pPr marL="0" indent="0">
+              <a:buFontTx/>
+              <a:buNone/>
+            </a:pPr>
+            <a:r>
+              <a:rPr lang="en-US" dirty="0"/>
+              <a:t>Search? XDCR?</a:t>
+            </a:r>
+          </a:p>
+          <a:p>
+            <a:pPr marL="171450" indent="-171450">
+              <a:buFontTx/>
+              <a:buChar char="-"/>
+            </a:pPr>
             <a:endParaRPr lang="en-US" dirty="0"/>
-          </a:p>
-          <a:p>
-            <a:r>
-              <a:rPr lang="en-US" dirty="0"/>
-              <a:t>There's also a free Community Edition that you can go into production with, it's usually one release behind, and there are some features that will always be enterprise only.</a:t>
-            </a:r>
-          </a:p>
-          <a:p>
-            <a:br>
-              <a:rPr lang="en-US" dirty="0"/>
-            </a:br>
-            <a:r>
-              <a:rPr lang="en-US" dirty="0"/>
-              <a:t>I don't think we're using any enterprise features in today's lab, but I will call them out if I see them.</a:t>
-            </a:r>
-          </a:p>
-          <a:p>
-            <a:endParaRPr lang="en-US" dirty="0"/>
-          </a:p>
-          <a:p>
-            <a:r>
-              <a:rPr lang="en-US" dirty="0"/>
-              <a:t>If you have licensing questions, come talk to me later.</a:t>
-            </a:r>
-          </a:p>
-          <a:p>
-            <a:endParaRPr lang="en-US" dirty="0"/>
-          </a:p>
-        </p:txBody>
-      </p:sp>
-      <p:sp>
-        <p:nvSpPr>
-          <p:cNvPr id="4" name="Slide Number Placeholder 3"/>
-          <p:cNvSpPr>
-            <a:spLocks noGrp="1"/>
-          </p:cNvSpPr>
-          <p:nvPr>
-            <p:ph type="sldNum" sz="quarter" idx="10"/>
-          </p:nvPr>
-        </p:nvSpPr>
-        <p:spPr/>
-        <p:txBody>
-          <a:bodyPr/>
-          <a:lstStyle/>
-          <a:p>
-            <a:fld id="{F39351FC-18D6-4741-8EEB-9FDB1F020AAC}" type="slidenum">
-              <a:rPr lang="en-US" smtClean="0"/>
-              <a:t>18</a:t>
-            </a:fld>
-            <a:endParaRPr lang="en-US"/>
-          </a:p>
-        </p:txBody>
-      </p:sp>
-    </p:spTree>
-    <p:extLst>
-      <p:ext uri="{BB962C8B-B14F-4D97-AF65-F5344CB8AC3E}">
-        <p14:creationId xmlns:p14="http://schemas.microsoft.com/office/powerpoint/2010/main" val="4176839581"/>
-      </p:ext>
-    </p:extLst>
-  </p:cSld>
-  <p:clrMapOvr>
-    <a:masterClrMapping/>
-  </p:clrMapOvr>
-</p:notes>
-</file>
-
-<file path=ppt/notesSlides/notesSlide12.xml><?xml version="1.0" encoding="utf-8"?>
-<p:notes xmlns:a="http://schemas.openxmlformats.org/drawingml/2006/main" xmlns:r="http://schemas.openxmlformats.org/officeDocument/2006/relationships" xmlns:p="http://schemas.openxmlformats.org/presentationml/2006/main">
-  <p:cSld>
-    <p:spTree>
-      <p:nvGrpSpPr>
-        <p:cNvPr id="1" name=""/>
-        <p:cNvGrpSpPr/>
-        <p:nvPr/>
-      </p:nvGrpSpPr>
-      <p:grpSpPr>
-        <a:xfrm>
-          <a:off x="0" y="0"/>
-          <a:ext cx="0" cy="0"/>
-          <a:chOff x="0" y="0"/>
-          <a:chExt cx="0" cy="0"/>
-        </a:xfrm>
-      </p:grpSpPr>
-      <p:sp>
-        <p:nvSpPr>
-          <p:cNvPr id="2" name="Slide Image Placeholder 1"/>
-          <p:cNvSpPr>
-            <a:spLocks noGrp="1" noRot="1" noChangeAspect="1"/>
-          </p:cNvSpPr>
-          <p:nvPr>
-            <p:ph type="sldImg"/>
-          </p:nvPr>
-        </p:nvSpPr>
-        <p:spPr/>
-      </p:sp>
-      <p:sp>
-        <p:nvSpPr>
-          <p:cNvPr id="3" name="Notes Placeholder 2"/>
-          <p:cNvSpPr>
-            <a:spLocks noGrp="1"/>
-          </p:cNvSpPr>
-          <p:nvPr>
-            <p:ph type="body" idx="1"/>
-          </p:nvPr>
-        </p:nvSpPr>
-        <p:spPr/>
-        <p:txBody>
-          <a:bodyPr/>
-          <a:lstStyle/>
-          <a:p>
-            <a:r>
-              <a:rPr lang="en-US" dirty="0"/>
-              <a:t>Enter a username/password for admin</a:t>
-            </a:r>
-          </a:p>
-          <a:p>
-            <a:r>
-              <a:rPr lang="en-US" dirty="0"/>
-              <a:t>Don't forget these credentials, write them down if you have to.</a:t>
-            </a:r>
           </a:p>
         </p:txBody>
       </p:sp>
@@ -1174,99 +1233,7 @@
     </p:spTree>
     <p:extLst>
       <p:ext uri="{BB962C8B-B14F-4D97-AF65-F5344CB8AC3E}">
-        <p14:creationId xmlns:p14="http://schemas.microsoft.com/office/powerpoint/2010/main" val="1156317746"/>
-      </p:ext>
-    </p:extLst>
-  </p:cSld>
-  <p:clrMapOvr>
-    <a:masterClrMapping/>
-  </p:clrMapOvr>
-</p:notes>
-</file>
-
-<file path=ppt/notesSlides/notesSlide13.xml><?xml version="1.0" encoding="utf-8"?>
-<p:notes xmlns:a="http://schemas.openxmlformats.org/drawingml/2006/main" xmlns:r="http://schemas.openxmlformats.org/officeDocument/2006/relationships" xmlns:p="http://schemas.openxmlformats.org/presentationml/2006/main">
-  <p:cSld>
-    <p:spTree>
-      <p:nvGrpSpPr>
-        <p:cNvPr id="1" name=""/>
-        <p:cNvGrpSpPr/>
-        <p:nvPr/>
-      </p:nvGrpSpPr>
-      <p:grpSpPr>
-        <a:xfrm>
-          <a:off x="0" y="0"/>
-          <a:ext cx="0" cy="0"/>
-          <a:chOff x="0" y="0"/>
-          <a:chExt cx="0" cy="0"/>
-        </a:xfrm>
-      </p:grpSpPr>
-      <p:sp>
-        <p:nvSpPr>
-          <p:cNvPr id="2" name="Slide Image Placeholder 1"/>
-          <p:cNvSpPr>
-            <a:spLocks noGrp="1" noRot="1" noChangeAspect="1"/>
-          </p:cNvSpPr>
-          <p:nvPr>
-            <p:ph type="sldImg"/>
-          </p:nvPr>
-        </p:nvSpPr>
-        <p:spPr/>
-      </p:sp>
-      <p:sp>
-        <p:nvSpPr>
-          <p:cNvPr id="3" name="Notes Placeholder 2"/>
-          <p:cNvSpPr>
-            <a:spLocks noGrp="1"/>
-          </p:cNvSpPr>
-          <p:nvPr>
-            <p:ph type="body" idx="1"/>
-          </p:nvPr>
-        </p:nvSpPr>
-        <p:spPr/>
-        <p:txBody>
-          <a:bodyPr/>
-          <a:lstStyle/>
-          <a:p>
-            <a:r>
-              <a:rPr lang="en-US" dirty="0"/>
-              <a:t>If you see this screen, </a:t>
-            </a:r>
-            <a:r>
-              <a:rPr lang="en-US"/>
-              <a:t>you've completed the workshop!</a:t>
-            </a:r>
-            <a:endParaRPr lang="en-US"/>
-          </a:p>
-        </p:txBody>
-      </p:sp>
-      <p:sp>
-        <p:nvSpPr>
-          <p:cNvPr id="4" name="Slide Number Placeholder 3"/>
-          <p:cNvSpPr>
-            <a:spLocks noGrp="1"/>
-          </p:cNvSpPr>
-          <p:nvPr>
-            <p:ph type="sldNum" sz="quarter" idx="10"/>
-          </p:nvPr>
-        </p:nvSpPr>
-        <p:spPr/>
-        <p:txBody>
-          <a:bodyPr/>
-          <a:lstStyle/>
-          <a:p>
-            <a:fld id="{F39351FC-18D6-4741-8EEB-9FDB1F020AAC}" type="slidenum">
-              <a:rPr lang="en-US" smtClean="0"/>
-              <a:t>20</a:t>
-            </a:fld>
-            <a:endParaRPr lang="en-US"/>
-          </a:p>
-        </p:txBody>
-      </p:sp>
-    </p:spTree>
-    <p:extLst>
-      <p:ext uri="{BB962C8B-B14F-4D97-AF65-F5344CB8AC3E}">
-        <p14:creationId xmlns:p14="http://schemas.microsoft.com/office/powerpoint/2010/main" val="347027653"/>
+        <p14:creationId xmlns:p14="http://schemas.microsoft.com/office/powerpoint/2010/main" val="3911004431"/>
       </p:ext>
     </p:extLst>
   </p:cSld>
@@ -1320,7 +1287,69 @@
           <a:bodyPr/>
           <a:lstStyle/>
           <a:p>
+            <a:r>
+              <a:rPr lang="en-US" dirty="0"/>
+              <a:t>Visual studio: 2015 might work if you want to use .NET full framework, Visual Studio Core might work if you want to use </a:t>
+            </a:r>
+            <a:r>
+              <a:rPr lang="en-US" dirty="0" err="1"/>
+              <a:t>.net</a:t>
+            </a:r>
+            <a:r>
+              <a:rPr lang="en-US" dirty="0"/>
+              <a:t> core. I have Visual Studio Core on USB sticks</a:t>
+            </a:r>
+          </a:p>
+          <a:p>
             <a:endParaRPr lang="en-US" dirty="0"/>
+          </a:p>
+          <a:p>
+            <a:r>
+              <a:rPr lang="en-US" dirty="0"/>
+              <a:t>Couchbase Server: 4.6 or greater will work. If you've installed Couchbase Server 5 Beta that's fine, but let me know. I have 5.x on these USB sticks.</a:t>
+            </a:r>
+          </a:p>
+          <a:p>
+            <a:endParaRPr lang="en-US" dirty="0"/>
+          </a:p>
+          <a:p>
+            <a:r>
+              <a:rPr lang="en-US" dirty="0"/>
+              <a:t>Node/</a:t>
+            </a:r>
+            <a:r>
+              <a:rPr lang="en-US" dirty="0" err="1"/>
+              <a:t>npm</a:t>
+            </a:r>
+            <a:r>
+              <a:rPr lang="en-US" dirty="0"/>
+              <a:t>/angular – the last part of this workshop is creating an Angular frontend to consume a </a:t>
+            </a:r>
+            <a:r>
+              <a:rPr lang="en-US" dirty="0" err="1"/>
+              <a:t>webapi</a:t>
+            </a:r>
+            <a:r>
+              <a:rPr lang="en-US" dirty="0"/>
+              <a:t> backend. If we run out of time, or you don't want to do that, then you can use the already finished angular source code I've created, or you can use.</a:t>
+            </a:r>
+          </a:p>
+          <a:p>
+            <a:endParaRPr lang="en-US" dirty="0"/>
+          </a:p>
+          <a:p>
+            <a:r>
+              <a:rPr lang="en-US" dirty="0"/>
+              <a:t>Source code – you can pull it down from </a:t>
+            </a:r>
+            <a:r>
+              <a:rPr lang="en-US" dirty="0" err="1"/>
+              <a:t>github</a:t>
+            </a:r>
+            <a:r>
+              <a:rPr lang="en-US" dirty="0"/>
+              <a:t> or I have it on the USB sticks. You don't need to write the whole program from scratch, I'll give you a fill-in-the-blank version as well as the completed version.</a:t>
+            </a:r>
           </a:p>
         </p:txBody>
       </p:sp>
@@ -1341,7 +1370,7 @@
           <a:p>
             <a:fld id="{F39351FC-18D6-4741-8EEB-9FDB1F020AAC}" type="slidenum">
               <a:rPr lang="en-US" smtClean="0"/>
-              <a:t>6</a:t>
+              <a:t>3</a:t>
             </a:fld>
             <a:endParaRPr lang="en-US"/>
           </a:p>
@@ -1350,7 +1379,7 @@
     </p:spTree>
     <p:extLst>
       <p:ext uri="{BB962C8B-B14F-4D97-AF65-F5344CB8AC3E}">
-        <p14:creationId xmlns:p14="http://schemas.microsoft.com/office/powerpoint/2010/main" val="1716529998"/>
+        <p14:creationId xmlns:p14="http://schemas.microsoft.com/office/powerpoint/2010/main" val="1944438320"/>
       </p:ext>
     </p:extLst>
   </p:cSld>
@@ -1404,24 +1433,79 @@
           <a:bodyPr/>
           <a:lstStyle/>
           <a:p>
-            <a:r>
-              <a:rPr lang="en-US" dirty="0"/>
-              <a:t>The network settings may not be optimal</a:t>
-            </a:r>
-            <a:r>
-              <a:rPr lang="en-US" baseline="0" dirty="0"/>
-              <a:t> for going into production. They are simplified for this lab.</a:t>
-            </a:r>
-          </a:p>
-          <a:p>
-            <a:endParaRPr lang="en-US" baseline="0" dirty="0"/>
-          </a:p>
-          <a:p>
-            <a:r>
-              <a:rPr lang="en-US" baseline="0" dirty="0"/>
-              <a:t>Azure will be getting easier soon, especially when it comes to multi-node clusters.</a:t>
-            </a:r>
-            <a:endParaRPr lang="en-US" dirty="0"/>
+            <a:pPr marL="0" indent="0">
+              <a:lnSpc>
+                <a:spcPct val="140000"/>
+              </a:lnSpc>
+              <a:buClr>
+                <a:schemeClr val="accent2"/>
+              </a:buClr>
+              <a:buFont typeface="Arial"/>
+              <a:buNone/>
+            </a:pPr>
+            <a:r>
+              <a:rPr lang="en-US" sz="1200" dirty="0">
+                <a:latin typeface="+mn-lt"/>
+              </a:rPr>
+              <a:t>Doesn’t work on Ubuntu 16</a:t>
+            </a:r>
+          </a:p>
+          <a:p>
+            <a:pPr marL="0" indent="0">
+              <a:lnSpc>
+                <a:spcPct val="140000"/>
+              </a:lnSpc>
+              <a:buClr>
+                <a:schemeClr val="accent2"/>
+              </a:buClr>
+              <a:buFont typeface="Arial"/>
+              <a:buNone/>
+            </a:pPr>
+            <a:r>
+              <a:rPr lang="en-US" sz="1200" dirty="0">
+                <a:latin typeface="+mn-lt"/>
+              </a:rPr>
+              <a:t>Doesn’t work on Mac</a:t>
+            </a:r>
+            <a:r>
+              <a:rPr lang="en-US" sz="1200" baseline="0" dirty="0">
+                <a:latin typeface="+mn-lt"/>
+              </a:rPr>
+              <a:t> OS X “Sierra”</a:t>
+            </a:r>
+          </a:p>
+          <a:p>
+            <a:pPr marL="0" indent="0">
+              <a:lnSpc>
+                <a:spcPct val="140000"/>
+              </a:lnSpc>
+              <a:buClr>
+                <a:schemeClr val="accent2"/>
+              </a:buClr>
+              <a:buFont typeface="Arial"/>
+              <a:buNone/>
+            </a:pPr>
+            <a:r>
+              <a:rPr lang="en-US" sz="1200" baseline="0" dirty="0">
+                <a:latin typeface="+mn-lt"/>
+              </a:rPr>
+              <a:t>If you don’t have those, you can use a cloud instance, or </a:t>
+            </a:r>
+            <a:r>
+              <a:rPr lang="en-US" sz="1200" baseline="0" dirty="0" err="1">
+                <a:latin typeface="+mn-lt"/>
+              </a:rPr>
+              <a:t>docker</a:t>
+            </a:r>
+            <a:r>
+              <a:rPr lang="en-US" sz="1200" baseline="0" dirty="0">
+                <a:latin typeface="+mn-lt"/>
+              </a:rPr>
+              <a:t>, or a VM</a:t>
+            </a:r>
+            <a:endParaRPr lang="en-US" sz="1200" dirty="0">
+              <a:latin typeface="+mn-lt"/>
+            </a:endParaRPr>
           </a:p>
         </p:txBody>
       </p:sp>
@@ -1451,7 +1535,7 @@
     </p:spTree>
     <p:extLst>
       <p:ext uri="{BB962C8B-B14F-4D97-AF65-F5344CB8AC3E}">
-        <p14:creationId xmlns:p14="http://schemas.microsoft.com/office/powerpoint/2010/main" val="642023318"/>
+        <p14:creationId xmlns:p14="http://schemas.microsoft.com/office/powerpoint/2010/main" val="2268015358"/>
       </p:ext>
     </p:extLst>
   </p:cSld>
@@ -1507,8 +1591,55 @@
           <a:p>
             <a:r>
               <a:rPr lang="en-US" dirty="0"/>
-              <a:t>Amazon will be getting easier soon, especially when it comes to multi-node clusters</a:t>
-            </a:r>
+              <a:t>You can install on Azure</a:t>
+            </a:r>
+          </a:p>
+          <a:p>
+            <a:r>
+              <a:rPr lang="en-US" dirty="0"/>
+              <a:t>I also want to point out the "Test Drive" option</a:t>
+            </a:r>
+          </a:p>
+          <a:p>
+            <a:r>
+              <a:rPr lang="en-US" dirty="0"/>
+              <a:t>This will run a Couchbase cluster on Azure VMs but it won't cost you anything</a:t>
+            </a:r>
+          </a:p>
+          <a:p>
+            <a:r>
+              <a:rPr lang="en-US" dirty="0"/>
+              <a:t>It stays up for 3 hours</a:t>
+            </a:r>
+          </a:p>
+          <a:p>
+            <a:r>
+              <a:rPr lang="en-US" dirty="0"/>
+              <a:t>You do need an azure account to use it</a:t>
+            </a:r>
+          </a:p>
+          <a:p>
+            <a:r>
+              <a:rPr lang="en-US" dirty="0"/>
+              <a:t>If anyone is struggling with installing it locally, this can be a backup plan</a:t>
+            </a:r>
+          </a:p>
+          <a:p>
+            <a:r>
+              <a:rPr lang="en-US" dirty="0"/>
+              <a:t>But it relies on </a:t>
+            </a:r>
+            <a:r>
+              <a:rPr lang="en-US" dirty="0" err="1"/>
+              <a:t>wifi</a:t>
+            </a:r>
+            <a:r>
+              <a:rPr lang="en-US" dirty="0"/>
+              <a:t> being decent, only sticks around for 3 hours at a time, and it takes around 5 or so minutes for the cluster to spin to life</a:t>
+            </a:r>
+          </a:p>
+          <a:p>
+            <a:endParaRPr lang="en-US" dirty="0"/>
           </a:p>
         </p:txBody>
       </p:sp>
@@ -1538,7 +1669,7 @@
     </p:spTree>
     <p:extLst>
       <p:ext uri="{BB962C8B-B14F-4D97-AF65-F5344CB8AC3E}">
-        <p14:creationId xmlns:p14="http://schemas.microsoft.com/office/powerpoint/2010/main" val="3390216368"/>
+        <p14:creationId xmlns:p14="http://schemas.microsoft.com/office/powerpoint/2010/main" val="1716529998"/>
       </p:ext>
     </p:extLst>
   </p:cSld>
@@ -1594,7 +1725,89 @@
           <a:p>
             <a:r>
               <a:rPr lang="en-US" dirty="0"/>
-              <a:t>I'm not going to teach you </a:t>
+              <a:t>Because we tagged</a:t>
+            </a:r>
+            <a:r>
+              <a:rPr lang="en-US" baseline="0" dirty="0"/>
+              <a:t> the version that we just loaded with couchbase:4.6.0 this should work.</a:t>
+            </a:r>
+          </a:p>
+          <a:p>
+            <a:r>
+              <a:rPr lang="en-US" baseline="0" dirty="0"/>
+              <a:t>Normally, when you are trying this at home, you can skip that previous slide and just do this.</a:t>
+            </a:r>
+          </a:p>
+          <a:p>
+            <a:endParaRPr lang="en-US" dirty="0"/>
+          </a:p>
+          <a:p>
+            <a:r>
+              <a:rPr lang="en-US" dirty="0"/>
+              <a:t>-d run detached so</a:t>
+            </a:r>
+            <a:r>
+              <a:rPr lang="en-US" baseline="0" dirty="0"/>
+              <a:t> we get returned to the command line</a:t>
+            </a:r>
+          </a:p>
+          <a:p>
+            <a:r>
+              <a:rPr lang="en-US" baseline="0" dirty="0"/>
+              <a:t>--name to give it a friendly name of “</a:t>
+            </a:r>
+            <a:r>
+              <a:rPr lang="en-US" baseline="0" dirty="0" err="1"/>
+              <a:t>db</a:t>
+            </a:r>
+            <a:r>
+              <a:rPr lang="en-US" baseline="0" dirty="0"/>
+              <a:t>”</a:t>
+            </a:r>
+          </a:p>
+          <a:p>
+            <a:r>
+              <a:rPr lang="en-US" baseline="0" dirty="0"/>
+              <a:t>-p to specify which ports to publish</a:t>
+            </a:r>
+          </a:p>
+          <a:p>
+            <a:r>
+              <a:rPr lang="en-US" baseline="0" dirty="0"/>
+              <a:t>And finally ‘</a:t>
+            </a:r>
+            <a:r>
+              <a:rPr lang="en-US" baseline="0" dirty="0" err="1"/>
+              <a:t>couchbase</a:t>
+            </a:r>
+            <a:r>
+              <a:rPr lang="en-US" baseline="0" dirty="0"/>
+              <a:t>’ to pull the </a:t>
+            </a:r>
+            <a:r>
+              <a:rPr lang="en-US" baseline="0" dirty="0" err="1"/>
+              <a:t>couchbase</a:t>
+            </a:r>
+            <a:r>
+              <a:rPr lang="en-US" baseline="0" dirty="0"/>
+              <a:t> image from </a:t>
+            </a:r>
+            <a:r>
+              <a:rPr lang="en-US" baseline="0" dirty="0" err="1"/>
+              <a:t>docker</a:t>
+            </a:r>
+            <a:r>
+              <a:rPr lang="en-US" baseline="0" dirty="0"/>
+              <a:t> hub</a:t>
+            </a:r>
+          </a:p>
+          <a:p>
+            <a:endParaRPr lang="en-US" dirty="0"/>
+          </a:p>
+          <a:p>
+            <a:r>
+              <a:rPr lang="en-US" dirty="0"/>
+              <a:t>You can use </a:t>
             </a:r>
             <a:r>
               <a:rPr lang="en-US" dirty="0" err="1"/>
@@ -1602,108 +1815,12 @@
             </a:r>
             <a:r>
               <a:rPr lang="en-US" dirty="0"/>
-              <a:t> in this workshop, but using </a:t>
-            </a:r>
-            <a:r>
-              <a:rPr lang="en-US" dirty="0" err="1"/>
-              <a:t>docker</a:t>
-            </a:r>
-            <a:r>
-              <a:rPr lang="en-US" dirty="0"/>
-              <a:t> is an option.</a:t>
-            </a:r>
-          </a:p>
-          <a:p>
-            <a:endParaRPr lang="en-US" dirty="0"/>
-          </a:p>
-          <a:p>
-            <a:r>
-              <a:rPr lang="en-US" dirty="0"/>
-              <a:t>If you</a:t>
+              <a:t>-compose</a:t>
             </a:r>
             <a:r>
               <a:rPr lang="en-US" baseline="0" dirty="0"/>
-              <a:t> have not already installed </a:t>
-            </a:r>
-            <a:r>
-              <a:rPr lang="en-US" baseline="0" dirty="0" err="1"/>
-              <a:t>couchbase</a:t>
-            </a:r>
-            <a:r>
-              <a:rPr lang="en-US" baseline="0" dirty="0"/>
-              <a:t> with </a:t>
-            </a:r>
-            <a:r>
-              <a:rPr lang="en-US" baseline="0" dirty="0" err="1"/>
-              <a:t>docker</a:t>
-            </a:r>
-            <a:r>
-              <a:rPr lang="en-US" baseline="0" dirty="0"/>
-              <a:t>, I recommend that you do it this way</a:t>
-            </a:r>
-          </a:p>
-          <a:p>
-            <a:r>
-              <a:rPr lang="en-US" baseline="0" dirty="0"/>
-              <a:t>Normally, you don’t have to take these steps, and </a:t>
-            </a:r>
-            <a:r>
-              <a:rPr lang="en-US" baseline="0" dirty="0" err="1"/>
-              <a:t>docker</a:t>
-            </a:r>
-            <a:r>
-              <a:rPr lang="en-US" baseline="0" dirty="0"/>
-              <a:t> will find the image online at </a:t>
-            </a:r>
-            <a:r>
-              <a:rPr lang="en-US" baseline="0" dirty="0" err="1"/>
-              <a:t>docker</a:t>
-            </a:r>
-            <a:r>
-              <a:rPr lang="en-US" baseline="0" dirty="0"/>
-              <a:t> hub</a:t>
-            </a:r>
-          </a:p>
-          <a:p>
-            <a:r>
-              <a:rPr lang="en-US" baseline="0" dirty="0"/>
-              <a:t>But since we are all on hotel </a:t>
-            </a:r>
-            <a:r>
-              <a:rPr lang="en-US" baseline="0" dirty="0" err="1"/>
-              <a:t>wifi</a:t>
-            </a:r>
-            <a:r>
-              <a:rPr lang="en-US" baseline="0" dirty="0"/>
-              <a:t> at the same time, I recommend you do this (unless the </a:t>
-            </a:r>
-            <a:r>
-              <a:rPr lang="en-US" baseline="0" dirty="0" err="1"/>
-              <a:t>wifi</a:t>
-            </a:r>
-            <a:r>
-              <a:rPr lang="en-US" baseline="0" dirty="0"/>
-              <a:t> is really good)</a:t>
-            </a:r>
-          </a:p>
-          <a:p>
-            <a:endParaRPr lang="en-US" baseline="0" dirty="0"/>
-          </a:p>
-          <a:p>
-            <a:r>
-              <a:rPr lang="en-US" baseline="0" dirty="0"/>
-              <a:t>(I used </a:t>
-            </a:r>
-            <a:r>
-              <a:rPr lang="en-US" baseline="0" dirty="0" err="1"/>
-              <a:t>docker</a:t>
-            </a:r>
-            <a:r>
-              <a:rPr lang="en-US" baseline="0" dirty="0"/>
-              <a:t> save couchbase:4.6.1 –o couchbase461.tar to create the tar file)</a:t>
-            </a:r>
-          </a:p>
-          <a:p>
+              <a:t> to do this as well, but we’re just doing the one image so it doesn’t make much difference.</a:t>
+            </a:r>
             <a:endParaRPr lang="en-US" dirty="0"/>
           </a:p>
         </p:txBody>
@@ -1725,7 +1842,7 @@
           <a:p>
             <a:fld id="{F39351FC-18D6-4741-8EEB-9FDB1F020AAC}" type="slidenum">
               <a:rPr lang="en-US" smtClean="0"/>
-              <a:t>10</a:t>
+              <a:t>11</a:t>
             </a:fld>
             <a:endParaRPr lang="en-US"/>
           </a:p>
@@ -1734,7 +1851,7 @@
     </p:spTree>
     <p:extLst>
       <p:ext uri="{BB962C8B-B14F-4D97-AF65-F5344CB8AC3E}">
-        <p14:creationId xmlns:p14="http://schemas.microsoft.com/office/powerpoint/2010/main" val="409809660"/>
+        <p14:creationId xmlns:p14="http://schemas.microsoft.com/office/powerpoint/2010/main" val="2203849020"/>
       </p:ext>
     </p:extLst>
   </p:cSld>
@@ -1790,103 +1907,8 @@
           <a:p>
             <a:r>
               <a:rPr lang="en-US" dirty="0"/>
-              <a:t>Because we tagged</a:t>
-            </a:r>
-            <a:r>
-              <a:rPr lang="en-US" baseline="0" dirty="0"/>
-              <a:t> the version that we just loaded with couchbase:4.6.0 this should work.</a:t>
-            </a:r>
-          </a:p>
-          <a:p>
-            <a:r>
-              <a:rPr lang="en-US" baseline="0" dirty="0"/>
-              <a:t>Normally, when you are trying this at home, you can skip that previous slide and just do this.</a:t>
-            </a:r>
-          </a:p>
-          <a:p>
-            <a:endParaRPr lang="en-US" dirty="0"/>
-          </a:p>
-          <a:p>
-            <a:r>
-              <a:rPr lang="en-US" dirty="0"/>
-              <a:t>-d run detached so</a:t>
-            </a:r>
-            <a:r>
-              <a:rPr lang="en-US" baseline="0" dirty="0"/>
-              <a:t> we get returned to the command line</a:t>
-            </a:r>
-          </a:p>
-          <a:p>
-            <a:r>
-              <a:rPr lang="en-US" baseline="0" dirty="0"/>
-              <a:t>--name to give it a friendly name of “</a:t>
-            </a:r>
-            <a:r>
-              <a:rPr lang="en-US" baseline="0" dirty="0" err="1"/>
-              <a:t>db</a:t>
-            </a:r>
-            <a:r>
-              <a:rPr lang="en-US" baseline="0" dirty="0"/>
-              <a:t>”</a:t>
-            </a:r>
-          </a:p>
-          <a:p>
-            <a:r>
-              <a:rPr lang="en-US" baseline="0" dirty="0"/>
-              <a:t>-p to specify which ports to publish</a:t>
-            </a:r>
-          </a:p>
-          <a:p>
-            <a:r>
-              <a:rPr lang="en-US" baseline="0" dirty="0"/>
-              <a:t>And finally ‘</a:t>
-            </a:r>
-            <a:r>
-              <a:rPr lang="en-US" baseline="0" dirty="0" err="1"/>
-              <a:t>couchbase</a:t>
-            </a:r>
-            <a:r>
-              <a:rPr lang="en-US" baseline="0" dirty="0"/>
-              <a:t>’ to pull the </a:t>
-            </a:r>
-            <a:r>
-              <a:rPr lang="en-US" baseline="0" dirty="0" err="1"/>
-              <a:t>couchbase</a:t>
-            </a:r>
-            <a:r>
-              <a:rPr lang="en-US" baseline="0" dirty="0"/>
-              <a:t> image from </a:t>
-            </a:r>
-            <a:r>
-              <a:rPr lang="en-US" baseline="0" dirty="0" err="1"/>
-              <a:t>docker</a:t>
-            </a:r>
-            <a:r>
-              <a:rPr lang="en-US" baseline="0" dirty="0"/>
-              <a:t> hub</a:t>
-            </a:r>
-          </a:p>
-          <a:p>
-            <a:endParaRPr lang="en-US" dirty="0"/>
-          </a:p>
-          <a:p>
-            <a:r>
-              <a:rPr lang="en-US" dirty="0"/>
-              <a:t>You can use </a:t>
-            </a:r>
-            <a:r>
-              <a:rPr lang="en-US" dirty="0" err="1"/>
-              <a:t>docker</a:t>
-            </a:r>
-            <a:r>
-              <a:rPr lang="en-US" dirty="0"/>
-              <a:t>-compose</a:t>
-            </a:r>
-            <a:r>
-              <a:rPr lang="en-US" baseline="0" dirty="0"/>
-              <a:t> to do this as well, but we’re just doing the one image so it doesn’t make much difference.</a:t>
-            </a:r>
-            <a:endParaRPr lang="en-US" dirty="0"/>
+              <a:t>If you see this, then you've completed the first part of the lab!</a:t>
+            </a:r>
           </a:p>
         </p:txBody>
       </p:sp>
@@ -1907,7 +1929,7 @@
           <a:p>
             <a:fld id="{F39351FC-18D6-4741-8EEB-9FDB1F020AAC}" type="slidenum">
               <a:rPr lang="en-US" smtClean="0"/>
-              <a:t>11</a:t>
+              <a:t>12</a:t>
             </a:fld>
             <a:endParaRPr lang="en-US"/>
           </a:p>
@@ -1916,7 +1938,7 @@
     </p:spTree>
     <p:extLst>
       <p:ext uri="{BB962C8B-B14F-4D97-AF65-F5344CB8AC3E}">
-        <p14:creationId xmlns:p14="http://schemas.microsoft.com/office/powerpoint/2010/main" val="2203849020"/>
+        <p14:creationId xmlns:p14="http://schemas.microsoft.com/office/powerpoint/2010/main" val="865596325"/>
       </p:ext>
     </p:extLst>
   </p:cSld>
@@ -1972,7 +1994,19 @@
           <a:p>
             <a:r>
               <a:rPr lang="en-US" dirty="0"/>
-              <a:t>If you see this, then you've completed the first part of the lab!</a:t>
+              <a:t>Make sure to remember your login and password</a:t>
+            </a:r>
+          </a:p>
+          <a:p>
+            <a:r>
+              <a:rPr lang="en-US" dirty="0"/>
+              <a:t>Write it down for today's workshop if you have to</a:t>
+            </a:r>
+          </a:p>
+          <a:p>
+            <a:r>
+              <a:rPr lang="en-US" dirty="0"/>
+              <a:t>If you forget it, then you may have to reinstall at some point and no one wants that</a:t>
             </a:r>
           </a:p>
         </p:txBody>
@@ -1994,7 +2028,7 @@
           <a:p>
             <a:fld id="{F39351FC-18D6-4741-8EEB-9FDB1F020AAC}" type="slidenum">
               <a:rPr lang="en-US" smtClean="0"/>
-              <a:t>12</a:t>
+              <a:t>15</a:t>
             </a:fld>
             <a:endParaRPr lang="en-US"/>
           </a:p>
@@ -2003,7 +2037,7 @@
     </p:spTree>
     <p:extLst>
       <p:ext uri="{BB962C8B-B14F-4D97-AF65-F5344CB8AC3E}">
-        <p14:creationId xmlns:p14="http://schemas.microsoft.com/office/powerpoint/2010/main" val="865596325"/>
+        <p14:creationId xmlns:p14="http://schemas.microsoft.com/office/powerpoint/2010/main" val="980030005"/>
       </p:ext>
     </p:extLst>
   </p:cSld>
@@ -2059,35 +2093,16 @@
           <a:p>
             <a:r>
               <a:rPr lang="en-US" dirty="0"/>
-              <a:t>Full Text</a:t>
-            </a:r>
-            <a:r>
-              <a:rPr lang="en-US" baseline="0" dirty="0"/>
-              <a:t> is optional</a:t>
-            </a:r>
-          </a:p>
-          <a:p>
-            <a:r>
-              <a:rPr lang="en-US" baseline="0" dirty="0"/>
-              <a:t>Not using it in this workshop, but if you want to check it out later install it now</a:t>
-            </a:r>
-          </a:p>
-          <a:p>
-            <a:endParaRPr lang="en-US" baseline="0" dirty="0"/>
-          </a:p>
-          <a:p>
-            <a:r>
-              <a:rPr lang="en-US" baseline="0" dirty="0"/>
-              <a:t>The RAM available will vary; if you are on </a:t>
-            </a:r>
-            <a:r>
-              <a:rPr lang="en-US" baseline="0" dirty="0" err="1"/>
-              <a:t>docker</a:t>
-            </a:r>
-            <a:r>
-              <a:rPr lang="en-US" baseline="0" dirty="0"/>
-              <a:t> it will be low, but that's fine</a:t>
-            </a:r>
+              <a:t>We're going to click the blue button to look through configuration</a:t>
+            </a:r>
+          </a:p>
+          <a:p>
+            <a:r>
+              <a:rPr lang="en-US" dirty="0"/>
+              <a:t>Though we probably won't make any changes to it</a:t>
+            </a:r>
+          </a:p>
+          <a:p>
             <a:endParaRPr lang="en-US" dirty="0"/>
           </a:p>
         </p:txBody>
@@ -2109,7 +2124,7 @@
           <a:p>
             <a:fld id="{F39351FC-18D6-4741-8EEB-9FDB1F020AAC}" type="slidenum">
               <a:rPr lang="en-US" smtClean="0"/>
-              <a:t>15</a:t>
+              <a:t>16</a:t>
             </a:fld>
             <a:endParaRPr lang="en-US"/>
           </a:p>
@@ -2118,7 +2133,7 @@
     </p:spTree>
     <p:extLst>
       <p:ext uri="{BB962C8B-B14F-4D97-AF65-F5344CB8AC3E}">
-        <p14:creationId xmlns:p14="http://schemas.microsoft.com/office/powerpoint/2010/main" val="177541439"/>
+        <p14:creationId xmlns:p14="http://schemas.microsoft.com/office/powerpoint/2010/main" val="732004453"/>
       </p:ext>
     </p:extLst>
   </p:cSld>
@@ -2174,13 +2189,25 @@
           <a:p>
             <a:r>
               <a:rPr lang="en-US" dirty="0"/>
-              <a:t>Step 2 is sample data buckets</a:t>
+              <a:t>This is a little smooshed to fit it on a slide</a:t>
             </a:r>
           </a:p>
           <a:p>
             <a:r>
               <a:rPr lang="en-US" dirty="0"/>
-              <a:t>We aren't using them, and they can be installed later, so just hit next</a:t>
+              <a:t>Configure which services and how much ram to give them</a:t>
+            </a:r>
+          </a:p>
+          <a:p>
+            <a:r>
+              <a:rPr lang="en-US" dirty="0"/>
+              <a:t>We won't be using the "Search Service" today, so you can uncheck that if you want</a:t>
+            </a:r>
+          </a:p>
+          <a:p>
+            <a:r>
+              <a:rPr lang="en-US" dirty="0"/>
+              <a:t>We don't need a huge amount of RAM, so you can set Data Service to 512 or even 256</a:t>
             </a:r>
           </a:p>
           <a:p>
@@ -2205,7 +2232,7 @@
           <a:p>
             <a:fld id="{F39351FC-18D6-4741-8EEB-9FDB1F020AAC}" type="slidenum">
               <a:rPr lang="en-US" smtClean="0"/>
-              <a:t>16</a:t>
+              <a:t>17</a:t>
             </a:fld>
             <a:endParaRPr lang="en-US"/>
           </a:p>
@@ -2214,7 +2241,7 @@
     </p:spTree>
     <p:extLst>
       <p:ext uri="{BB962C8B-B14F-4D97-AF65-F5344CB8AC3E}">
-        <p14:creationId xmlns:p14="http://schemas.microsoft.com/office/powerpoint/2010/main" val="2160737452"/>
+        <p14:creationId xmlns:p14="http://schemas.microsoft.com/office/powerpoint/2010/main" val="695164244"/>
       </p:ext>
     </p:extLst>
   </p:cSld>
@@ -8066,8 +8093,8 @@
         </p:nvSpPr>
         <p:spPr>
           <a:xfrm>
-            <a:off x="685800" y="925974"/>
-            <a:ext cx="7772400" cy="2338001"/>
+            <a:off x="685800" y="1253878"/>
+            <a:ext cx="7772400" cy="1489929"/>
           </a:xfrm>
         </p:spPr>
         <p:txBody>
@@ -8076,13 +8103,8 @@
           <a:p>
             <a:r>
               <a:rPr lang="en-US" sz="3600" dirty="0"/>
-              <a:t>Workshop 1 – Setting up </a:t>
-            </a:r>
-            <a:r>
-              <a:rPr lang="en-US" sz="3600" dirty="0" err="1"/>
-              <a:t>Couchbase</a:t>
-            </a:r>
-            <a:endParaRPr lang="en-US" sz="3600" dirty="0"/>
+              <a:t>ASP.NET with NoSQL Workshop</a:t>
+            </a:r>
           </a:p>
         </p:txBody>
       </p:sp>
@@ -8101,14 +8123,25 @@
           <a:bodyPr/>
           <a:lstStyle/>
           <a:p>
-            <a:endParaRPr lang="en-US"/>
+            <a:r>
+              <a:rPr lang="en-US" dirty="0"/>
+              <a:t>Matthew D. Groves (@</a:t>
+            </a:r>
+            <a:r>
+              <a:rPr lang="en-US" dirty="0" err="1"/>
+              <a:t>mgroves</a:t>
+            </a:r>
+            <a:r>
+              <a:rPr lang="en-US" dirty="0"/>
+              <a:t>)</a:t>
+            </a:r>
           </a:p>
         </p:txBody>
       </p:sp>
     </p:spTree>
     <p:extLst>
       <p:ext uri="{BB962C8B-B14F-4D97-AF65-F5344CB8AC3E}">
-        <p14:creationId xmlns:p14="http://schemas.microsoft.com/office/powerpoint/2010/main" val="1678903537"/>
+        <p14:creationId xmlns:p14="http://schemas.microsoft.com/office/powerpoint/2010/main" val="2338523872"/>
       </p:ext>
     </p:extLst>
   </p:cSld>
@@ -8135,30 +8168,6 @@
           <a:chExt cx="0" cy="0"/>
         </a:xfrm>
       </p:grpSpPr>
-      <p:pic>
-        <p:nvPicPr>
-          <p:cNvPr id="8" name="Picture 7"/>
-          <p:cNvPicPr>
-            <a:picLocks noChangeAspect="1"/>
-          </p:cNvPicPr>
-          <p:nvPr/>
-        </p:nvPicPr>
-        <p:blipFill>
-          <a:blip r:embed="rId3"/>
-          <a:stretch>
-            <a:fillRect/>
-          </a:stretch>
-        </p:blipFill>
-        <p:spPr>
-          <a:xfrm>
-            <a:off x="300877" y="1481137"/>
-            <a:ext cx="8504005" cy="3181527"/>
-          </a:xfrm>
-          <a:prstGeom prst="rect">
-            <a:avLst/>
-          </a:prstGeom>
-        </p:spPr>
-      </p:pic>
       <p:sp>
         <p:nvSpPr>
           <p:cNvPr id="2" name="Title 1"/>
@@ -8176,14 +8185,14 @@
           <a:p>
             <a:r>
               <a:rPr lang="en-US" dirty="0"/>
-              <a:t>Install with Docker (offline)</a:t>
+              <a:t>Install on Cloud: Amazon</a:t>
             </a:r>
           </a:p>
         </p:txBody>
       </p:sp>
       <p:sp>
         <p:nvSpPr>
-          <p:cNvPr id="3" name="Content Placeholder 2"/>
+          <p:cNvPr id="4" name="Content Placeholder 2"/>
           <p:cNvSpPr txBox="1">
             <a:spLocks/>
           </p:cNvSpPr>
@@ -8192,7 +8201,7 @@
         <p:spPr>
           <a:xfrm>
             <a:off x="457200" y="685800"/>
-            <a:ext cx="8543925" cy="1590675"/>
+            <a:ext cx="8007739" cy="3394472"/>
           </a:xfrm>
           <a:prstGeom prst="rect">
             <a:avLst/>
@@ -8357,60 +8366,210 @@
               <a:buFont typeface="Arial" charset="0"/>
               <a:buChar char="•"/>
             </a:pPr>
-            <a:r>
-              <a:rPr lang="en-US" dirty="0">
-                <a:cs typeface="Courier New" panose="02070309020205020404" pitchFamily="49" charset="0"/>
-              </a:rPr>
-              <a:t>couchbase460.tar </a:t>
-            </a:r>
-            <a:r>
-              <a:rPr lang="en-US" dirty="0"/>
-              <a:t>available on USB drives</a:t>
-            </a:r>
-          </a:p>
+            <a:endParaRPr lang="en-US" dirty="0"/>
+          </a:p>
+          <a:p>
+            <a:endParaRPr lang="en-US" dirty="0"/>
+          </a:p>
+        </p:txBody>
+      </p:sp>
+      <p:sp>
+        <p:nvSpPr>
+          <p:cNvPr id="5" name="Content Placeholder 2"/>
+          <p:cNvSpPr txBox="1">
+            <a:spLocks/>
+          </p:cNvSpPr>
+          <p:nvPr/>
+        </p:nvSpPr>
+        <p:spPr>
+          <a:xfrm>
+            <a:off x="198158" y="685800"/>
+            <a:ext cx="8307668" cy="1295400"/>
+          </a:xfrm>
+          <a:prstGeom prst="rect">
+            <a:avLst/>
+          </a:prstGeom>
+        </p:spPr>
+        <p:txBody>
+          <a:bodyPr/>
+          <a:lstStyle>
+            <a:lvl1pPr marL="228600" indent="-228600" algn="l" defTabSz="457200" rtl="0" eaLnBrk="1" latinLnBrk="0" hangingPunct="1">
+              <a:spcBef>
+                <a:spcPts val="0"/>
+              </a:spcBef>
+              <a:buClr>
+                <a:schemeClr val="accent1"/>
+              </a:buClr>
+              <a:buFont typeface="Wingdings" charset="2"/>
+              <a:buChar char="§"/>
+              <a:defRPr sz="2400" kern="1200">
+                <a:solidFill>
+                  <a:schemeClr val="tx1"/>
+                </a:solidFill>
+                <a:latin typeface="+mn-lt"/>
+                <a:ea typeface="+mn-ea"/>
+                <a:cs typeface="+mn-cs"/>
+              </a:defRPr>
+            </a:lvl1pPr>
+            <a:lvl2pPr marL="455613" indent="-227013" algn="l" defTabSz="457200" rtl="0" eaLnBrk="1" latinLnBrk="0" hangingPunct="1">
+              <a:spcBef>
+                <a:spcPts val="0"/>
+              </a:spcBef>
+              <a:buClr>
+                <a:srgbClr val="262626"/>
+              </a:buClr>
+              <a:buFont typeface="Wingdings" charset="2"/>
+              <a:buChar char="§"/>
+              <a:defRPr sz="2000" kern="1200">
+                <a:solidFill>
+                  <a:schemeClr val="tx1"/>
+                </a:solidFill>
+                <a:latin typeface="+mn-lt"/>
+                <a:ea typeface="+mn-ea"/>
+                <a:cs typeface="+mn-cs"/>
+              </a:defRPr>
+            </a:lvl2pPr>
+            <a:lvl3pPr marL="455613" indent="-228600" algn="l" defTabSz="457200" rtl="0" eaLnBrk="1" latinLnBrk="0" hangingPunct="1">
+              <a:spcBef>
+                <a:spcPts val="0"/>
+              </a:spcBef>
+              <a:buClr>
+                <a:srgbClr val="262626"/>
+              </a:buClr>
+              <a:buFont typeface="Wingdings" charset="2"/>
+              <a:buChar char="§"/>
+              <a:defRPr sz="2000" kern="1200">
+                <a:solidFill>
+                  <a:schemeClr val="tx1"/>
+                </a:solidFill>
+                <a:latin typeface="+mn-lt"/>
+                <a:ea typeface="+mn-ea"/>
+                <a:cs typeface="+mn-cs"/>
+              </a:defRPr>
+            </a:lvl3pPr>
+            <a:lvl4pPr marL="455613" indent="-228600" algn="l" defTabSz="457200" rtl="0" eaLnBrk="1" latinLnBrk="0" hangingPunct="1">
+              <a:spcBef>
+                <a:spcPts val="0"/>
+              </a:spcBef>
+              <a:buClr>
+                <a:srgbClr val="262626"/>
+              </a:buClr>
+              <a:buFont typeface="Wingdings" charset="2"/>
+              <a:buChar char="§"/>
+              <a:defRPr sz="2000" kern="1200">
+                <a:solidFill>
+                  <a:schemeClr val="tx1"/>
+                </a:solidFill>
+                <a:latin typeface="+mn-lt"/>
+                <a:ea typeface="+mn-ea"/>
+                <a:cs typeface="+mn-cs"/>
+              </a:defRPr>
+            </a:lvl4pPr>
+            <a:lvl5pPr marL="455613" indent="-228600" algn="l" defTabSz="457200" rtl="0" eaLnBrk="1" latinLnBrk="0" hangingPunct="1">
+              <a:spcBef>
+                <a:spcPts val="200"/>
+              </a:spcBef>
+              <a:buClr>
+                <a:srgbClr val="262626"/>
+              </a:buClr>
+              <a:buFont typeface="Wingdings" charset="2"/>
+              <a:buChar char="§"/>
+              <a:defRPr sz="2000" kern="1200">
+                <a:solidFill>
+                  <a:schemeClr val="tx1"/>
+                </a:solidFill>
+                <a:latin typeface="+mn-lt"/>
+                <a:ea typeface="+mn-ea"/>
+                <a:cs typeface="+mn-cs"/>
+              </a:defRPr>
+            </a:lvl5pPr>
+            <a:lvl6pPr marL="2514600" indent="-228600" algn="l" defTabSz="457200" rtl="0" eaLnBrk="1" latinLnBrk="0" hangingPunct="1">
+              <a:spcBef>
+                <a:spcPct val="20000"/>
+              </a:spcBef>
+              <a:buFont typeface="Arial"/>
+              <a:buChar char="•"/>
+              <a:defRPr sz="2000" kern="1200">
+                <a:solidFill>
+                  <a:schemeClr val="tx1"/>
+                </a:solidFill>
+                <a:latin typeface="+mn-lt"/>
+                <a:ea typeface="+mn-ea"/>
+                <a:cs typeface="+mn-cs"/>
+              </a:defRPr>
+            </a:lvl6pPr>
+            <a:lvl7pPr marL="2971800" indent="-228600" algn="l" defTabSz="457200" rtl="0" eaLnBrk="1" latinLnBrk="0" hangingPunct="1">
+              <a:spcBef>
+                <a:spcPct val="20000"/>
+              </a:spcBef>
+              <a:buFont typeface="Arial"/>
+              <a:buChar char="•"/>
+              <a:defRPr sz="2000" kern="1200">
+                <a:solidFill>
+                  <a:schemeClr val="tx1"/>
+                </a:solidFill>
+                <a:latin typeface="+mn-lt"/>
+                <a:ea typeface="+mn-ea"/>
+                <a:cs typeface="+mn-cs"/>
+              </a:defRPr>
+            </a:lvl7pPr>
+            <a:lvl8pPr marL="3429000" indent="-228600" algn="l" defTabSz="457200" rtl="0" eaLnBrk="1" latinLnBrk="0" hangingPunct="1">
+              <a:spcBef>
+                <a:spcPct val="20000"/>
+              </a:spcBef>
+              <a:buFont typeface="Arial"/>
+              <a:buChar char="•"/>
+              <a:defRPr sz="2000" kern="1200">
+                <a:solidFill>
+                  <a:schemeClr val="tx1"/>
+                </a:solidFill>
+                <a:latin typeface="+mn-lt"/>
+                <a:ea typeface="+mn-ea"/>
+                <a:cs typeface="+mn-cs"/>
+              </a:defRPr>
+            </a:lvl8pPr>
+            <a:lvl9pPr marL="3886200" indent="-228600" algn="l" defTabSz="457200" rtl="0" eaLnBrk="1" latinLnBrk="0" hangingPunct="1">
+              <a:spcBef>
+                <a:spcPct val="20000"/>
+              </a:spcBef>
+              <a:buFont typeface="Arial"/>
+              <a:buChar char="•"/>
+              <a:defRPr sz="2000" kern="1200">
+                <a:solidFill>
+                  <a:schemeClr val="tx1"/>
+                </a:solidFill>
+                <a:latin typeface="+mn-lt"/>
+                <a:ea typeface="+mn-ea"/>
+                <a:cs typeface="+mn-cs"/>
+              </a:defRPr>
+            </a:lvl9pPr>
+          </a:lstStyle>
           <a:p>
             <a:pPr marL="342900" indent="-342900">
               <a:buFont typeface="Arial" charset="0"/>
               <a:buChar char="•"/>
             </a:pPr>
             <a:r>
-              <a:rPr lang="en-US" sz="2000" dirty="0" err="1">
-                <a:latin typeface="Courier New" panose="02070309020205020404" pitchFamily="49" charset="0"/>
-                <a:cs typeface="Courier New" panose="02070309020205020404" pitchFamily="49" charset="0"/>
+              <a:rPr lang="en-US" sz="2000" dirty="0">
+                <a:hlinkClick r:id="rId2"/>
               </a:rPr>
-              <a:t>docker</a:t>
-            </a:r>
-            <a:r>
-              <a:rPr lang="en-US" sz="2000" dirty="0">
-                <a:latin typeface="Courier New" panose="02070309020205020404" pitchFamily="49" charset="0"/>
-                <a:cs typeface="Courier New" panose="02070309020205020404" pitchFamily="49" charset="0"/>
-              </a:rPr>
-              <a:t> load –</a:t>
-            </a:r>
-            <a:r>
-              <a:rPr lang="en-US" sz="2000" dirty="0" err="1">
-                <a:latin typeface="Courier New" panose="02070309020205020404" pitchFamily="49" charset="0"/>
-                <a:cs typeface="Courier New" panose="02070309020205020404" pitchFamily="49" charset="0"/>
-              </a:rPr>
-              <a:t>i</a:t>
-            </a:r>
-            <a:r>
-              <a:rPr lang="en-US" sz="2000" dirty="0">
-                <a:latin typeface="Courier New" panose="02070309020205020404" pitchFamily="49" charset="0"/>
-                <a:cs typeface="Courier New" panose="02070309020205020404" pitchFamily="49" charset="0"/>
-              </a:rPr>
-              <a:t> /the/path/to/couchbase461.tar</a:t>
-            </a:r>
+              <a:t>https://aws.amazon.com/marketplace</a:t>
+            </a:r>
+            <a:endParaRPr lang="en-US" sz="2000" dirty="0"/>
           </a:p>
           <a:p>
             <a:pPr marL="342900" indent="-342900">
               <a:buFont typeface="Arial" charset="0"/>
               <a:buChar char="•"/>
             </a:pPr>
-            <a:endParaRPr lang="en-US" sz="2000" dirty="0">
-              <a:latin typeface="Courier New" panose="02070309020205020404" pitchFamily="49" charset="0"/>
-              <a:cs typeface="Courier New" panose="02070309020205020404" pitchFamily="49" charset="0"/>
-            </a:endParaRPr>
+            <a:endParaRPr lang="en-US" sz="2000" dirty="0"/>
+          </a:p>
+          <a:p>
+            <a:pPr marL="342900" indent="-342900">
+              <a:buFont typeface="Arial" charset="0"/>
+              <a:buChar char="•"/>
+            </a:pPr>
+            <a:endParaRPr lang="en-US" sz="2000" dirty="0"/>
           </a:p>
           <a:p>
             <a:pPr marL="342900" indent="-342900">
@@ -8424,100 +8583,34 @@
           </a:p>
         </p:txBody>
       </p:sp>
-      <p:sp>
-        <p:nvSpPr>
-          <p:cNvPr id="6" name="Rectangle 5"/>
-          <p:cNvSpPr/>
+      <p:pic>
+        <p:nvPicPr>
+          <p:cNvPr id="6" name="Picture 5"/>
+          <p:cNvPicPr>
+            <a:picLocks noChangeAspect="1"/>
+          </p:cNvPicPr>
           <p:nvPr/>
-        </p:nvSpPr>
+        </p:nvPicPr>
+        <p:blipFill>
+          <a:blip r:embed="rId3"/>
+          <a:stretch>
+            <a:fillRect/>
+          </a:stretch>
+        </p:blipFill>
         <p:spPr>
           <a:xfrm>
-            <a:off x="3154456" y="1784817"/>
-            <a:ext cx="2913529" cy="213192"/>
+            <a:off x="1942229" y="1182670"/>
+            <a:ext cx="4911057" cy="3834026"/>
           </a:xfrm>
           <a:prstGeom prst="rect">
             <a:avLst/>
           </a:prstGeom>
-          <a:noFill/>
-          <a:ln w="50800">
-            <a:solidFill>
-              <a:schemeClr val="accent2"/>
-            </a:solidFill>
-          </a:ln>
-          <a:effectLst/>
         </p:spPr>
-        <p:style>
-          <a:lnRef idx="1">
-            <a:schemeClr val="accent1"/>
-          </a:lnRef>
-          <a:fillRef idx="3">
-            <a:schemeClr val="accent1"/>
-          </a:fillRef>
-          <a:effectRef idx="2">
-            <a:schemeClr val="accent1"/>
-          </a:effectRef>
-          <a:fontRef idx="minor">
-            <a:schemeClr val="lt1"/>
-          </a:fontRef>
-        </p:style>
-        <p:txBody>
-          <a:bodyPr rtlCol="0" anchor="ctr"/>
-          <a:lstStyle/>
-          <a:p>
-            <a:pPr algn="ctr"/>
-            <a:endParaRPr lang="en-US"/>
-          </a:p>
-        </p:txBody>
-      </p:sp>
-      <p:sp>
-        <p:nvSpPr>
-          <p:cNvPr id="7" name="Rectangle 6"/>
-          <p:cNvSpPr/>
-          <p:nvPr/>
-        </p:nvSpPr>
-        <p:spPr>
-          <a:xfrm>
-            <a:off x="272303" y="4215426"/>
-            <a:ext cx="4433047" cy="213192"/>
-          </a:xfrm>
-          <a:prstGeom prst="rect">
-            <a:avLst/>
-          </a:prstGeom>
-          <a:noFill/>
-          <a:ln w="50800">
-            <a:solidFill>
-              <a:schemeClr val="accent2"/>
-            </a:solidFill>
-          </a:ln>
-          <a:effectLst/>
-        </p:spPr>
-        <p:style>
-          <a:lnRef idx="1">
-            <a:schemeClr val="accent1"/>
-          </a:lnRef>
-          <a:fillRef idx="3">
-            <a:schemeClr val="accent1"/>
-          </a:fillRef>
-          <a:effectRef idx="2">
-            <a:schemeClr val="accent1"/>
-          </a:effectRef>
-          <a:fontRef idx="minor">
-            <a:schemeClr val="lt1"/>
-          </a:fontRef>
-        </p:style>
-        <p:txBody>
-          <a:bodyPr rtlCol="0" anchor="ctr"/>
-          <a:lstStyle/>
-          <a:p>
-            <a:pPr algn="ctr"/>
-            <a:endParaRPr lang="en-US"/>
-          </a:p>
-        </p:txBody>
-      </p:sp>
+      </p:pic>
     </p:spTree>
     <p:extLst>
       <p:ext uri="{BB962C8B-B14F-4D97-AF65-F5344CB8AC3E}">
-        <p14:creationId xmlns:p14="http://schemas.microsoft.com/office/powerpoint/2010/main" val="3690117380"/>
+        <p14:creationId xmlns:p14="http://schemas.microsoft.com/office/powerpoint/2010/main" val="84375709"/>
       </p:ext>
     </p:extLst>
   </p:cSld>
@@ -8760,7 +8853,7 @@
                 <a:latin typeface="Courier New" panose="02070309020205020404" pitchFamily="49" charset="0"/>
                 <a:cs typeface="Courier New" panose="02070309020205020404" pitchFamily="49" charset="0"/>
               </a:rPr>
-              <a:t>couchbase:4.6.1</a:t>
+              <a:t>couchbase:enterprise-5.0.0</a:t>
             </a:r>
           </a:p>
           <a:p>
@@ -8769,18 +8862,11 @@
               <a:buChar char="•"/>
             </a:pPr>
             <a:r>
-              <a:rPr lang="en-US" dirty="0" err="1">
-                <a:latin typeface="Courier New" panose="02070309020205020404" pitchFamily="49" charset="0"/>
-                <a:cs typeface="Courier New" panose="02070309020205020404" pitchFamily="49" charset="0"/>
-              </a:rPr>
-              <a:t>docker</a:t>
-            </a:r>
-            <a:r>
               <a:rPr lang="en-US" dirty="0">
                 <a:latin typeface="Courier New" panose="02070309020205020404" pitchFamily="49" charset="0"/>
                 <a:cs typeface="Courier New" panose="02070309020205020404" pitchFamily="49" charset="0"/>
               </a:rPr>
-              <a:t> run -d −−name </a:t>
+              <a:t>docker run -d −−name </a:t>
             </a:r>
             <a:r>
               <a:rPr lang="en-US" dirty="0" err="1">
@@ -8794,27 +8880,21 @@
                 <a:latin typeface="Courier New" panose="02070309020205020404" pitchFamily="49" charset="0"/>
                 <a:cs typeface="Courier New" panose="02070309020205020404" pitchFamily="49" charset="0"/>
               </a:rPr>
-              <a:t> -p 8091-8094:8091-8094 –p 11210:11210 couchbase:4.6.1</a:t>
-            </a:r>
-          </a:p>
-          <a:p>
-            <a:pPr marL="342900" indent="-342900">
-              <a:buFont typeface="Arial" charset="0"/>
-              <a:buChar char="•"/>
-            </a:pPr>
+              <a:t> -p 8091-8094:8091-8094 –p 11210:11210 </a:t>
+            </a:r>
             <a:r>
               <a:rPr lang="en-US" dirty="0" err="1">
                 <a:latin typeface="Courier New" panose="02070309020205020404" pitchFamily="49" charset="0"/>
                 <a:cs typeface="Courier New" panose="02070309020205020404" pitchFamily="49" charset="0"/>
               </a:rPr>
-              <a:t>docker</a:t>
+              <a:t>couchbase</a:t>
             </a:r>
             <a:r>
               <a:rPr lang="en-US" dirty="0">
                 <a:latin typeface="Courier New" panose="02070309020205020404" pitchFamily="49" charset="0"/>
                 <a:cs typeface="Courier New" panose="02070309020205020404" pitchFamily="49" charset="0"/>
               </a:rPr>
-              <a:t> </a:t>
+              <a:t>: enterprise-5.0.0 docker </a:t>
             </a:r>
             <a:r>
               <a:rPr lang="en-US" dirty="0" err="1">
@@ -8963,7 +9043,13 @@
       </p:sp>
       <p:pic>
         <p:nvPicPr>
-          <p:cNvPr id="4" name="Picture 3"/>
+          <p:cNvPr id="5" name="Picture 4">
+            <a:extLst>
+              <a:ext uri="{FF2B5EF4-FFF2-40B4-BE49-F238E27FC236}">
+                <a16:creationId xmlns:a16="http://schemas.microsoft.com/office/drawing/2014/main" id="{EAC4474D-7B75-431A-9807-55306B94FB67}"/>
+              </a:ext>
+            </a:extLst>
+          </p:cNvPr>
           <p:cNvPicPr>
             <a:picLocks noChangeAspect="1"/>
           </p:cNvPicPr>
@@ -8977,8 +9063,8 @@
         </p:blipFill>
         <p:spPr>
           <a:xfrm>
-            <a:off x="2422799" y="1060737"/>
-            <a:ext cx="4149452" cy="3977987"/>
+            <a:off x="2136631" y="949963"/>
+            <a:ext cx="4526190" cy="3947558"/>
           </a:xfrm>
           <a:prstGeom prst="rect">
             <a:avLst/>
@@ -9146,7 +9232,13 @@
       </p:sp>
       <p:pic>
         <p:nvPicPr>
-          <p:cNvPr id="5" name="Picture 4"/>
+          <p:cNvPr id="6" name="Picture 5">
+            <a:extLst>
+              <a:ext uri="{FF2B5EF4-FFF2-40B4-BE49-F238E27FC236}">
+                <a16:creationId xmlns:a16="http://schemas.microsoft.com/office/drawing/2014/main" id="{EF319BA4-2ACC-4443-BA32-ECE697B1BB6B}"/>
+              </a:ext>
+            </a:extLst>
+          </p:cNvPr>
           <p:cNvPicPr>
             <a:picLocks noChangeAspect="1"/>
           </p:cNvPicPr>
@@ -9160,8 +9252,8 @@
         </p:blipFill>
         <p:spPr>
           <a:xfrm>
-            <a:off x="2422799" y="1060737"/>
-            <a:ext cx="4149452" cy="3977987"/>
+            <a:off x="2136631" y="949963"/>
+            <a:ext cx="4526190" cy="3947558"/>
           </a:xfrm>
           <a:prstGeom prst="rect">
             <a:avLst/>
@@ -9200,7 +9292,13 @@
       </p:grpSpPr>
       <p:sp>
         <p:nvSpPr>
-          <p:cNvPr id="2" name="Title 1"/>
+          <p:cNvPr id="2" name="Title 1">
+            <a:extLst>
+              <a:ext uri="{FF2B5EF4-FFF2-40B4-BE49-F238E27FC236}">
+                <a16:creationId xmlns:a16="http://schemas.microsoft.com/office/drawing/2014/main" id="{D0432293-5B26-4F70-AB8F-58B36D5C2BAD}"/>
+              </a:ext>
+            </a:extLst>
+          </p:cNvPr>
           <p:cNvSpPr>
             <a:spLocks noGrp="1"/>
           </p:cNvSpPr>
@@ -9222,49 +9320,38 @@
       </p:sp>
       <p:pic>
         <p:nvPicPr>
-          <p:cNvPr id="3074" name="Picture 2" descr="Couchbase Server Setup Wizard"/>
+          <p:cNvPr id="3" name="Picture 2">
+            <a:extLst>
+              <a:ext uri="{FF2B5EF4-FFF2-40B4-BE49-F238E27FC236}">
+                <a16:creationId xmlns:a16="http://schemas.microsoft.com/office/drawing/2014/main" id="{6EB0461A-E796-47D7-91E5-7A681CA0A7FA}"/>
+              </a:ext>
+            </a:extLst>
+          </p:cNvPr>
           <p:cNvPicPr>
-            <a:picLocks noChangeAspect="1" noChangeArrowheads="1"/>
+            <a:picLocks noChangeAspect="1"/>
           </p:cNvPicPr>
           <p:nvPr/>
         </p:nvPicPr>
         <p:blipFill>
-          <a:blip r:embed="rId3">
-            <a:extLst>
-              <a:ext uri="{28A0092B-C50C-407E-A947-70E740481C1C}">
-                <a14:useLocalDpi xmlns:a14="http://schemas.microsoft.com/office/drawing/2010/main" val="0"/>
-              </a:ext>
-            </a:extLst>
-          </a:blip>
-          <a:srcRect/>
+          <a:blip r:embed="rId3"/>
           <a:stretch>
             <a:fillRect/>
           </a:stretch>
         </p:blipFill>
-        <p:spPr bwMode="auto">
+        <p:spPr>
           <a:xfrm>
-            <a:off x="1343025" y="1385888"/>
-            <a:ext cx="6457950" cy="2371725"/>
+            <a:off x="2003293" y="834935"/>
+            <a:ext cx="5137414" cy="3473629"/>
           </a:xfrm>
           <a:prstGeom prst="rect">
             <a:avLst/>
           </a:prstGeom>
-          <a:noFill/>
-          <a:extLst>
-            <a:ext uri="{909E8E84-426E-40DD-AFC4-6F175D3DCCD1}">
-              <a14:hiddenFill xmlns:a14="http://schemas.microsoft.com/office/drawing/2010/main">
-                <a:solidFill>
-                  <a:srgbClr val="FFFFFF"/>
-                </a:solidFill>
-              </a14:hiddenFill>
-            </a:ext>
-          </a:extLst>
         </p:spPr>
       </p:pic>
     </p:spTree>
     <p:extLst>
       <p:ext uri="{BB962C8B-B14F-4D97-AF65-F5344CB8AC3E}">
-        <p14:creationId xmlns:p14="http://schemas.microsoft.com/office/powerpoint/2010/main" val="2210796310"/>
+        <p14:creationId xmlns:p14="http://schemas.microsoft.com/office/powerpoint/2010/main" val="759108975"/>
       </p:ext>
     </p:extLst>
   </p:cSld>
@@ -9293,7 +9380,13 @@
       </p:grpSpPr>
       <p:sp>
         <p:nvSpPr>
-          <p:cNvPr id="2" name="Title 1"/>
+          <p:cNvPr id="2" name="Title 1">
+            <a:extLst>
+              <a:ext uri="{FF2B5EF4-FFF2-40B4-BE49-F238E27FC236}">
+                <a16:creationId xmlns:a16="http://schemas.microsoft.com/office/drawing/2014/main" id="{72FBAEE1-19FB-49FA-A571-1C4C481DB7C5}"/>
+              </a:ext>
+            </a:extLst>
+          </p:cNvPr>
           <p:cNvSpPr>
             <a:spLocks noGrp="1"/>
           </p:cNvSpPr>
@@ -9315,49 +9408,38 @@
       </p:sp>
       <p:pic>
         <p:nvPicPr>
-          <p:cNvPr id="4098" name="Picture 2" descr="Couchbase Server Setup Wizard Sample Buckets"/>
+          <p:cNvPr id="3" name="Picture 2">
+            <a:extLst>
+              <a:ext uri="{FF2B5EF4-FFF2-40B4-BE49-F238E27FC236}">
+                <a16:creationId xmlns:a16="http://schemas.microsoft.com/office/drawing/2014/main" id="{5BB19415-77B0-40A2-8AEA-9833B11F3679}"/>
+              </a:ext>
+            </a:extLst>
+          </p:cNvPr>
           <p:cNvPicPr>
-            <a:picLocks noChangeAspect="1" noChangeArrowheads="1"/>
+            <a:picLocks noChangeAspect="1"/>
           </p:cNvPicPr>
           <p:nvPr/>
         </p:nvPicPr>
         <p:blipFill>
-          <a:blip r:embed="rId3">
-            <a:extLst>
-              <a:ext uri="{28A0092B-C50C-407E-A947-70E740481C1C}">
-                <a14:useLocalDpi xmlns:a14="http://schemas.microsoft.com/office/drawing/2010/main" val="0"/>
-              </a:ext>
-            </a:extLst>
-          </a:blip>
-          <a:srcRect/>
+          <a:blip r:embed="rId3"/>
           <a:stretch>
             <a:fillRect/>
           </a:stretch>
         </p:blipFill>
-        <p:spPr bwMode="auto">
+        <p:spPr>
           <a:xfrm>
-            <a:off x="1257300" y="1012009"/>
-            <a:ext cx="6819900" cy="3588566"/>
+            <a:off x="1993767" y="693378"/>
+            <a:ext cx="5156465" cy="4216617"/>
           </a:xfrm>
           <a:prstGeom prst="rect">
             <a:avLst/>
           </a:prstGeom>
-          <a:noFill/>
-          <a:extLst>
-            <a:ext uri="{909E8E84-426E-40DD-AFC4-6F175D3DCCD1}">
-              <a14:hiddenFill xmlns:a14="http://schemas.microsoft.com/office/drawing/2010/main">
-                <a:solidFill>
-                  <a:srgbClr val="FFFFFF"/>
-                </a:solidFill>
-              </a14:hiddenFill>
-            </a:ext>
-          </a:extLst>
         </p:spPr>
       </p:pic>
     </p:spTree>
     <p:extLst>
       <p:ext uri="{BB962C8B-B14F-4D97-AF65-F5344CB8AC3E}">
-        <p14:creationId xmlns:p14="http://schemas.microsoft.com/office/powerpoint/2010/main" val="3171604176"/>
+        <p14:creationId xmlns:p14="http://schemas.microsoft.com/office/powerpoint/2010/main" val="3102493705"/>
       </p:ext>
     </p:extLst>
   </p:cSld>
@@ -9386,7 +9468,13 @@
       </p:grpSpPr>
       <p:sp>
         <p:nvSpPr>
-          <p:cNvPr id="2" name="Title 1"/>
+          <p:cNvPr id="2" name="Title 1">
+            <a:extLst>
+              <a:ext uri="{FF2B5EF4-FFF2-40B4-BE49-F238E27FC236}">
+                <a16:creationId xmlns:a16="http://schemas.microsoft.com/office/drawing/2014/main" id="{BA9A1DBE-44BC-4A18-8FD2-AABAE204F015}"/>
+              </a:ext>
+            </a:extLst>
+          </p:cNvPr>
           <p:cNvSpPr>
             <a:spLocks noGrp="1"/>
           </p:cNvSpPr>
@@ -9408,49 +9496,38 @@
       </p:sp>
       <p:pic>
         <p:nvPicPr>
-          <p:cNvPr id="5122" name="Picture 2" descr="Couchbase Server Setup Wizard Default Bucket"/>
+          <p:cNvPr id="3" name="Picture 2">
+            <a:extLst>
+              <a:ext uri="{FF2B5EF4-FFF2-40B4-BE49-F238E27FC236}">
+                <a16:creationId xmlns:a16="http://schemas.microsoft.com/office/drawing/2014/main" id="{AD21BE22-281C-46AC-95B9-27398D185D87}"/>
+              </a:ext>
+            </a:extLst>
+          </p:cNvPr>
           <p:cNvPicPr>
-            <a:picLocks noChangeAspect="1" noChangeArrowheads="1"/>
+            <a:picLocks noChangeAspect="1"/>
           </p:cNvPicPr>
           <p:nvPr/>
         </p:nvPicPr>
         <p:blipFill>
-          <a:blip r:embed="rId3">
-            <a:extLst>
-              <a:ext uri="{28A0092B-C50C-407E-A947-70E740481C1C}">
-                <a14:useLocalDpi xmlns:a14="http://schemas.microsoft.com/office/drawing/2010/main" val="0"/>
-              </a:ext>
-            </a:extLst>
-          </a:blip>
-          <a:srcRect/>
+          <a:blip r:embed="rId3"/>
           <a:stretch>
             <a:fillRect/>
           </a:stretch>
         </p:blipFill>
-        <p:spPr bwMode="auto">
+        <p:spPr>
           <a:xfrm>
-            <a:off x="998992" y="1000125"/>
-            <a:ext cx="7197760" cy="3586163"/>
+            <a:off x="2837812" y="630989"/>
+            <a:ext cx="3179618" cy="4389521"/>
           </a:xfrm>
           <a:prstGeom prst="rect">
             <a:avLst/>
           </a:prstGeom>
-          <a:noFill/>
-          <a:extLst>
-            <a:ext uri="{909E8E84-426E-40DD-AFC4-6F175D3DCCD1}">
-              <a14:hiddenFill xmlns:a14="http://schemas.microsoft.com/office/drawing/2010/main">
-                <a:solidFill>
-                  <a:srgbClr val="FFFFFF"/>
-                </a:solidFill>
-              </a14:hiddenFill>
-            </a:ext>
-          </a:extLst>
         </p:spPr>
       </p:pic>
     </p:spTree>
     <p:extLst>
       <p:ext uri="{BB962C8B-B14F-4D97-AF65-F5344CB8AC3E}">
-        <p14:creationId xmlns:p14="http://schemas.microsoft.com/office/powerpoint/2010/main" val="1983472153"/>
+        <p14:creationId xmlns:p14="http://schemas.microsoft.com/office/powerpoint/2010/main" val="124325697"/>
       </p:ext>
     </p:extLst>
   </p:cSld>
@@ -9501,7 +9578,13 @@
       </p:sp>
       <p:pic>
         <p:nvPicPr>
-          <p:cNvPr id="3" name="Picture 2"/>
+          <p:cNvPr id="4" name="Picture 3">
+            <a:extLst>
+              <a:ext uri="{FF2B5EF4-FFF2-40B4-BE49-F238E27FC236}">
+                <a16:creationId xmlns:a16="http://schemas.microsoft.com/office/drawing/2014/main" id="{89145334-2A0B-467B-BDB2-3AF596541AC8}"/>
+              </a:ext>
+            </a:extLst>
+          </p:cNvPr>
           <p:cNvPicPr>
             <a:picLocks noChangeAspect="1"/>
           </p:cNvPicPr>
@@ -9515,8 +9598,8 @@
         </p:blipFill>
         <p:spPr>
           <a:xfrm>
-            <a:off x="1706523" y="721187"/>
-            <a:ext cx="5684877" cy="4184187"/>
+            <a:off x="818147" y="831336"/>
+            <a:ext cx="7438189" cy="4030930"/>
           </a:xfrm>
           <a:prstGeom prst="rect">
             <a:avLst/>
@@ -9526,7 +9609,7 @@
     </p:spTree>
     <p:extLst>
       <p:ext uri="{BB962C8B-B14F-4D97-AF65-F5344CB8AC3E}">
-        <p14:creationId xmlns:p14="http://schemas.microsoft.com/office/powerpoint/2010/main" val="1638936398"/>
+        <p14:creationId xmlns:p14="http://schemas.microsoft.com/office/powerpoint/2010/main" val="4099160036"/>
       </p:ext>
     </p:extLst>
   </p:cSld>
@@ -9560,66 +9643,30 @@
             <a:spLocks noGrp="1"/>
           </p:cNvSpPr>
           <p:nvPr>
-            <p:ph type="title"/>
+            <p:ph type="ctrTitle"/>
           </p:nvPr>
         </p:nvSpPr>
-        <p:spPr/>
+        <p:spPr>
+          <a:xfrm>
+            <a:off x="685800" y="925974"/>
+            <a:ext cx="7772400" cy="2338001"/>
+          </a:xfrm>
+        </p:spPr>
         <p:txBody>
           <a:bodyPr/>
           <a:lstStyle/>
           <a:p>
             <a:r>
-              <a:rPr lang="en-US" dirty="0"/>
-              <a:t>Configuration</a:t>
+              <a:rPr lang="en-US" sz="3600" dirty="0"/>
+              <a:t>Demo</a:t>
             </a:r>
           </a:p>
         </p:txBody>
       </p:sp>
-      <p:pic>
-        <p:nvPicPr>
-          <p:cNvPr id="6146" name="Picture 2" descr="Couchbase Server Setup Wizard Admin Credentials"/>
-          <p:cNvPicPr>
-            <a:picLocks noChangeAspect="1" noChangeArrowheads="1"/>
-          </p:cNvPicPr>
-          <p:nvPr/>
-        </p:nvPicPr>
-        <p:blipFill>
-          <a:blip r:embed="rId3">
-            <a:extLst>
-              <a:ext uri="{28A0092B-C50C-407E-A947-70E740481C1C}">
-                <a14:useLocalDpi xmlns:a14="http://schemas.microsoft.com/office/drawing/2010/main" val="0"/>
-              </a:ext>
-            </a:extLst>
-          </a:blip>
-          <a:srcRect/>
-          <a:stretch>
-            <a:fillRect/>
-          </a:stretch>
-        </p:blipFill>
-        <p:spPr bwMode="auto">
-          <a:xfrm>
-            <a:off x="852489" y="943485"/>
-            <a:ext cx="7110412" cy="3728528"/>
-          </a:xfrm>
-          <a:prstGeom prst="rect">
-            <a:avLst/>
-          </a:prstGeom>
-          <a:noFill/>
-          <a:extLst>
-            <a:ext uri="{909E8E84-426E-40DD-AFC4-6F175D3DCCD1}">
-              <a14:hiddenFill xmlns:a14="http://schemas.microsoft.com/office/drawing/2010/main">
-                <a:solidFill>
-                  <a:srgbClr val="FFFFFF"/>
-                </a:solidFill>
-              </a14:hiddenFill>
-            </a:ext>
-          </a:extLst>
-        </p:spPr>
-      </p:pic>
     </p:spTree>
     <p:extLst>
       <p:ext uri="{BB962C8B-B14F-4D97-AF65-F5344CB8AC3E}">
-        <p14:creationId xmlns:p14="http://schemas.microsoft.com/office/powerpoint/2010/main" val="4101536371"/>
+        <p14:creationId xmlns:p14="http://schemas.microsoft.com/office/powerpoint/2010/main" val="33453890"/>
       </p:ext>
     </p:extLst>
   </p:cSld>
@@ -9630,6 +9677,436 @@
 </file>
 
 <file path=ppt/slides/slide2.xml><?xml version="1.0" encoding="utf-8"?>
+<p:sld xmlns:a="http://schemas.openxmlformats.org/drawingml/2006/main" xmlns:r="http://schemas.openxmlformats.org/officeDocument/2006/relationships" xmlns:p="http://schemas.openxmlformats.org/presentationml/2006/main">
+  <p:cSld>
+    <p:spTree>
+      <p:nvGrpSpPr>
+        <p:cNvPr id="1" name=""/>
+        <p:cNvGrpSpPr/>
+        <p:nvPr/>
+      </p:nvGrpSpPr>
+      <p:grpSpPr>
+        <a:xfrm>
+          <a:off x="0" y="0"/>
+          <a:ext cx="0" cy="0"/>
+          <a:chOff x="0" y="0"/>
+          <a:chExt cx="0" cy="0"/>
+        </a:xfrm>
+      </p:grpSpPr>
+      <p:sp>
+        <p:nvSpPr>
+          <p:cNvPr id="2" name="Title 1"/>
+          <p:cNvSpPr>
+            <a:spLocks noGrp="1"/>
+          </p:cNvSpPr>
+          <p:nvPr>
+            <p:ph type="title"/>
+          </p:nvPr>
+        </p:nvSpPr>
+        <p:spPr/>
+        <p:txBody>
+          <a:bodyPr/>
+          <a:lstStyle/>
+          <a:p>
+            <a:r>
+              <a:rPr lang="en-US" dirty="0"/>
+              <a:t>Workshop Agenda</a:t>
+            </a:r>
+          </a:p>
+        </p:txBody>
+      </p:sp>
+      <p:sp>
+        <p:nvSpPr>
+          <p:cNvPr id="3" name="Content Placeholder 2"/>
+          <p:cNvSpPr>
+            <a:spLocks noGrp="1"/>
+          </p:cNvSpPr>
+          <p:nvPr>
+            <p:ph idx="1"/>
+          </p:nvPr>
+        </p:nvSpPr>
+        <p:spPr/>
+        <p:txBody>
+          <a:bodyPr/>
+          <a:lstStyle/>
+          <a:p>
+            <a:pPr marL="342900" indent="-342900">
+              <a:buFont typeface="Arial" charset="0"/>
+              <a:buChar char="•"/>
+            </a:pPr>
+            <a:r>
+              <a:rPr lang="en-US" sz="3600" dirty="0"/>
+              <a:t>Install database (</a:t>
+            </a:r>
+            <a:r>
+              <a:rPr lang="en-US" sz="3600" dirty="0" err="1"/>
+              <a:t>Couchbase</a:t>
+            </a:r>
+            <a:r>
+              <a:rPr lang="en-US" sz="3600" dirty="0"/>
+              <a:t>)</a:t>
+            </a:r>
+          </a:p>
+          <a:p>
+            <a:pPr marL="342900" indent="-342900">
+              <a:buFont typeface="Arial" charset="0"/>
+              <a:buChar char="•"/>
+            </a:pPr>
+            <a:r>
+              <a:rPr lang="en-US" sz="3600" dirty="0"/>
+              <a:t>Hello, world .NET console application</a:t>
+            </a:r>
+          </a:p>
+          <a:p>
+            <a:pPr marL="342900" indent="-342900">
+              <a:buFont typeface="Arial" charset="0"/>
+              <a:buChar char="•"/>
+            </a:pPr>
+            <a:r>
+              <a:rPr lang="en-US" sz="3600" dirty="0"/>
+              <a:t>ASP.NET </a:t>
+            </a:r>
+            <a:r>
+              <a:rPr lang="en-US" sz="3600" dirty="0" err="1"/>
+              <a:t>WebAPI</a:t>
+            </a:r>
+            <a:r>
+              <a:rPr lang="en-US" sz="3600" dirty="0"/>
+              <a:t> RESTful services</a:t>
+            </a:r>
+          </a:p>
+          <a:p>
+            <a:pPr marL="342900" indent="-342900">
+              <a:buFont typeface="Arial" charset="0"/>
+              <a:buChar char="•"/>
+            </a:pPr>
+            <a:r>
+              <a:rPr lang="en-US" sz="3600" dirty="0"/>
+              <a:t>Angular UI</a:t>
+            </a:r>
+          </a:p>
+          <a:p>
+            <a:endParaRPr lang="en-US" sz="3600" dirty="0"/>
+          </a:p>
+        </p:txBody>
+      </p:sp>
+    </p:spTree>
+    <p:extLst>
+      <p:ext uri="{BB962C8B-B14F-4D97-AF65-F5344CB8AC3E}">
+        <p14:creationId xmlns:p14="http://schemas.microsoft.com/office/powerpoint/2010/main" val="2006587344"/>
+      </p:ext>
+    </p:extLst>
+  </p:cSld>
+  <p:clrMapOvr>
+    <a:masterClrMapping/>
+  </p:clrMapOvr>
+  <mc:AlternateContent xmlns:mc="http://schemas.openxmlformats.org/markup-compatibility/2006" xmlns:p14="http://schemas.microsoft.com/office/powerpoint/2010/main">
+    <mc:Choice Requires="p14">
+      <p:transition p14:dur="10"/>
+    </mc:Choice>
+    <mc:Fallback xmlns="">
+      <p:transition/>
+    </mc:Fallback>
+  </mc:AlternateContent>
+</p:sld>
+</file>
+
+<file path=ppt/slides/slide20.xml><?xml version="1.0" encoding="utf-8"?>
+<p:sld xmlns:a="http://schemas.openxmlformats.org/drawingml/2006/main" xmlns:r="http://schemas.openxmlformats.org/officeDocument/2006/relationships" xmlns:p="http://schemas.openxmlformats.org/presentationml/2006/main">
+  <p:cSld>
+    <p:spTree>
+      <p:nvGrpSpPr>
+        <p:cNvPr id="1" name=""/>
+        <p:cNvGrpSpPr/>
+        <p:nvPr/>
+      </p:nvGrpSpPr>
+      <p:grpSpPr>
+        <a:xfrm>
+          <a:off x="0" y="0"/>
+          <a:ext cx="0" cy="0"/>
+          <a:chOff x="0" y="0"/>
+          <a:chExt cx="0" cy="0"/>
+        </a:xfrm>
+      </p:grpSpPr>
+      <p:sp>
+        <p:nvSpPr>
+          <p:cNvPr id="2" name="Title 1"/>
+          <p:cNvSpPr>
+            <a:spLocks noGrp="1"/>
+          </p:cNvSpPr>
+          <p:nvPr>
+            <p:ph type="ctrTitle"/>
+          </p:nvPr>
+        </p:nvSpPr>
+        <p:spPr>
+          <a:xfrm>
+            <a:off x="685800" y="925974"/>
+            <a:ext cx="7772400" cy="2338001"/>
+          </a:xfrm>
+        </p:spPr>
+        <p:txBody>
+          <a:bodyPr/>
+          <a:lstStyle/>
+          <a:p>
+            <a:r>
+              <a:rPr lang="en-US" sz="3600" dirty="0"/>
+              <a:t>Questions</a:t>
+            </a:r>
+          </a:p>
+        </p:txBody>
+      </p:sp>
+    </p:spTree>
+    <p:extLst>
+      <p:ext uri="{BB962C8B-B14F-4D97-AF65-F5344CB8AC3E}">
+        <p14:creationId xmlns:p14="http://schemas.microsoft.com/office/powerpoint/2010/main" val="3620921753"/>
+      </p:ext>
+    </p:extLst>
+  </p:cSld>
+  <p:clrMapOvr>
+    <a:masterClrMapping/>
+  </p:clrMapOvr>
+</p:sld>
+</file>
+
+<file path=ppt/slides/slide3.xml><?xml version="1.0" encoding="utf-8"?>
+<p:sld xmlns:a="http://schemas.openxmlformats.org/drawingml/2006/main" xmlns:r="http://schemas.openxmlformats.org/officeDocument/2006/relationships" xmlns:p="http://schemas.openxmlformats.org/presentationml/2006/main">
+  <p:cSld>
+    <p:spTree>
+      <p:nvGrpSpPr>
+        <p:cNvPr id="1" name=""/>
+        <p:cNvGrpSpPr/>
+        <p:nvPr/>
+      </p:nvGrpSpPr>
+      <p:grpSpPr>
+        <a:xfrm>
+          <a:off x="0" y="0"/>
+          <a:ext cx="0" cy="0"/>
+          <a:chOff x="0" y="0"/>
+          <a:chExt cx="0" cy="0"/>
+        </a:xfrm>
+      </p:grpSpPr>
+      <p:sp>
+        <p:nvSpPr>
+          <p:cNvPr id="2" name="Title 1"/>
+          <p:cNvSpPr>
+            <a:spLocks noGrp="1"/>
+          </p:cNvSpPr>
+          <p:nvPr>
+            <p:ph type="title"/>
+          </p:nvPr>
+        </p:nvSpPr>
+        <p:spPr/>
+        <p:txBody>
+          <a:bodyPr/>
+          <a:lstStyle/>
+          <a:p>
+            <a:r>
+              <a:rPr lang="en-US" dirty="0" err="1"/>
+              <a:t>Prereqs</a:t>
+            </a:r>
+            <a:endParaRPr lang="en-US" dirty="0"/>
+          </a:p>
+        </p:txBody>
+      </p:sp>
+      <p:sp>
+        <p:nvSpPr>
+          <p:cNvPr id="3" name="Content Placeholder 2"/>
+          <p:cNvSpPr>
+            <a:spLocks noGrp="1"/>
+          </p:cNvSpPr>
+          <p:nvPr>
+            <p:ph idx="1"/>
+          </p:nvPr>
+        </p:nvSpPr>
+        <p:spPr/>
+        <p:txBody>
+          <a:bodyPr/>
+          <a:lstStyle/>
+          <a:p>
+            <a:pPr marL="342900" indent="-342900">
+              <a:buFont typeface="Arial" charset="0"/>
+              <a:buChar char="•"/>
+            </a:pPr>
+            <a:r>
+              <a:rPr lang="en-US" sz="3600" dirty="0"/>
+              <a:t>Visual Studio 2017</a:t>
+            </a:r>
+          </a:p>
+          <a:p>
+            <a:pPr marL="342900" indent="-342900">
+              <a:buFont typeface="Arial" charset="0"/>
+              <a:buChar char="•"/>
+            </a:pPr>
+            <a:r>
+              <a:rPr lang="en-US" sz="3600" dirty="0"/>
+              <a:t>Couchbase Server 5.x</a:t>
+            </a:r>
+          </a:p>
+          <a:p>
+            <a:pPr marL="342900" indent="-342900">
+              <a:buFont typeface="Arial" charset="0"/>
+              <a:buChar char="•"/>
+            </a:pPr>
+            <a:r>
+              <a:rPr lang="en-US" sz="3600" dirty="0"/>
+              <a:t>node/</a:t>
+            </a:r>
+            <a:r>
+              <a:rPr lang="en-US" sz="3600" dirty="0" err="1"/>
+              <a:t>npm</a:t>
+            </a:r>
+            <a:r>
+              <a:rPr lang="en-US" sz="3600" dirty="0"/>
+              <a:t>/angular-cli</a:t>
+            </a:r>
+          </a:p>
+          <a:p>
+            <a:pPr marL="573088" lvl="3" indent="-342900">
+              <a:buFont typeface="Arial" charset="0"/>
+              <a:buChar char="•"/>
+            </a:pPr>
+            <a:r>
+              <a:rPr lang="en-US" sz="2400" dirty="0"/>
+              <a:t>(or Postman / Fiddler / </a:t>
+            </a:r>
+            <a:r>
+              <a:rPr lang="en-US" sz="2400" dirty="0" err="1"/>
+              <a:t>etc</a:t>
+            </a:r>
+            <a:r>
+              <a:rPr lang="en-US" sz="2400" dirty="0"/>
+              <a:t>?)</a:t>
+            </a:r>
+          </a:p>
+          <a:p>
+            <a:pPr marL="342900" indent="-342900">
+              <a:buFont typeface="Arial" charset="0"/>
+              <a:buChar char="•"/>
+            </a:pPr>
+            <a:r>
+              <a:rPr lang="en-US" sz="3600" dirty="0"/>
+              <a:t>Source code</a:t>
+            </a:r>
+          </a:p>
+          <a:p>
+            <a:pPr marL="573088" lvl="1" indent="-342900">
+              <a:buFont typeface="Arial" charset="0"/>
+              <a:buChar char="•"/>
+            </a:pPr>
+            <a:r>
+              <a:rPr lang="en-US" sz="2400" dirty="0"/>
+              <a:t>(or you can follow along and build from scratch)</a:t>
+            </a:r>
+            <a:endParaRPr lang="en-US" sz="3200" dirty="0"/>
+          </a:p>
+          <a:p>
+            <a:endParaRPr lang="en-US" sz="3600" dirty="0"/>
+          </a:p>
+        </p:txBody>
+      </p:sp>
+    </p:spTree>
+    <p:extLst>
+      <p:ext uri="{BB962C8B-B14F-4D97-AF65-F5344CB8AC3E}">
+        <p14:creationId xmlns:p14="http://schemas.microsoft.com/office/powerpoint/2010/main" val="1322150755"/>
+      </p:ext>
+    </p:extLst>
+  </p:cSld>
+  <p:clrMapOvr>
+    <a:masterClrMapping/>
+  </p:clrMapOvr>
+  <mc:AlternateContent xmlns:mc="http://schemas.openxmlformats.org/markup-compatibility/2006" xmlns:p14="http://schemas.microsoft.com/office/powerpoint/2010/main">
+    <mc:Choice Requires="p14">
+      <p:transition p14:dur="10"/>
+    </mc:Choice>
+    <mc:Fallback xmlns="">
+      <p:transition/>
+    </mc:Fallback>
+  </mc:AlternateContent>
+</p:sld>
+</file>
+
+<file path=ppt/slides/slide4.xml><?xml version="1.0" encoding="utf-8"?>
+<p:sld xmlns:a="http://schemas.openxmlformats.org/drawingml/2006/main" xmlns:r="http://schemas.openxmlformats.org/officeDocument/2006/relationships" xmlns:p="http://schemas.openxmlformats.org/presentationml/2006/main">
+  <p:cSld>
+    <p:spTree>
+      <p:nvGrpSpPr>
+        <p:cNvPr id="1" name=""/>
+        <p:cNvGrpSpPr/>
+        <p:nvPr/>
+      </p:nvGrpSpPr>
+      <p:grpSpPr>
+        <a:xfrm>
+          <a:off x="0" y="0"/>
+          <a:ext cx="0" cy="0"/>
+          <a:chOff x="0" y="0"/>
+          <a:chExt cx="0" cy="0"/>
+        </a:xfrm>
+      </p:grpSpPr>
+      <p:sp>
+        <p:nvSpPr>
+          <p:cNvPr id="2" name="Title 1"/>
+          <p:cNvSpPr>
+            <a:spLocks noGrp="1"/>
+          </p:cNvSpPr>
+          <p:nvPr>
+            <p:ph type="ctrTitle"/>
+          </p:nvPr>
+        </p:nvSpPr>
+        <p:spPr>
+          <a:xfrm>
+            <a:off x="685800" y="925974"/>
+            <a:ext cx="7772400" cy="2338001"/>
+          </a:xfrm>
+        </p:spPr>
+        <p:txBody>
+          <a:bodyPr/>
+          <a:lstStyle/>
+          <a:p>
+            <a:r>
+              <a:rPr lang="en-US" sz="3600" dirty="0"/>
+              <a:t>Workshop 1 – Setting up </a:t>
+            </a:r>
+            <a:r>
+              <a:rPr lang="en-US" sz="3600" dirty="0" err="1"/>
+              <a:t>Couchbase</a:t>
+            </a:r>
+            <a:endParaRPr lang="en-US" sz="3600" dirty="0"/>
+          </a:p>
+        </p:txBody>
+      </p:sp>
+      <p:sp>
+        <p:nvSpPr>
+          <p:cNvPr id="4" name="Subtitle 3"/>
+          <p:cNvSpPr>
+            <a:spLocks noGrp="1"/>
+          </p:cNvSpPr>
+          <p:nvPr>
+            <p:ph type="subTitle" idx="1"/>
+          </p:nvPr>
+        </p:nvSpPr>
+        <p:spPr/>
+        <p:txBody>
+          <a:bodyPr/>
+          <a:lstStyle/>
+          <a:p>
+            <a:endParaRPr lang="en-US"/>
+          </a:p>
+        </p:txBody>
+      </p:sp>
+    </p:spTree>
+    <p:extLst>
+      <p:ext uri="{BB962C8B-B14F-4D97-AF65-F5344CB8AC3E}">
+        <p14:creationId xmlns:p14="http://schemas.microsoft.com/office/powerpoint/2010/main" val="1678903537"/>
+      </p:ext>
+    </p:extLst>
+  </p:cSld>
+  <p:clrMapOvr>
+    <a:masterClrMapping/>
+  </p:clrMapOvr>
+</p:sld>
+</file>
+
+<file path=ppt/slides/slide5.xml><?xml version="1.0" encoding="utf-8"?>
 <p:sld xmlns:a="http://schemas.openxmlformats.org/drawingml/2006/main" xmlns:r="http://schemas.openxmlformats.org/officeDocument/2006/relationships" xmlns:p="http://schemas.openxmlformats.org/presentationml/2006/main">
   <p:cSld>
     <p:spTree>
@@ -9772,592 +10249,6 @@
 </p:sld>
 </file>
 
-<file path=ppt/slides/slide20.xml><?xml version="1.0" encoding="utf-8"?>
-<p:sld xmlns:a="http://schemas.openxmlformats.org/drawingml/2006/main" xmlns:r="http://schemas.openxmlformats.org/officeDocument/2006/relationships" xmlns:p="http://schemas.openxmlformats.org/presentationml/2006/main">
-  <p:cSld>
-    <p:spTree>
-      <p:nvGrpSpPr>
-        <p:cNvPr id="1" name=""/>
-        <p:cNvGrpSpPr/>
-        <p:nvPr/>
-      </p:nvGrpSpPr>
-      <p:grpSpPr>
-        <a:xfrm>
-          <a:off x="0" y="0"/>
-          <a:ext cx="0" cy="0"/>
-          <a:chOff x="0" y="0"/>
-          <a:chExt cx="0" cy="0"/>
-        </a:xfrm>
-      </p:grpSpPr>
-      <p:sp>
-        <p:nvSpPr>
-          <p:cNvPr id="2" name="Title 1"/>
-          <p:cNvSpPr>
-            <a:spLocks noGrp="1"/>
-          </p:cNvSpPr>
-          <p:nvPr>
-            <p:ph type="title"/>
-          </p:nvPr>
-        </p:nvSpPr>
-        <p:spPr/>
-        <p:txBody>
-          <a:bodyPr/>
-          <a:lstStyle/>
-          <a:p>
-            <a:r>
-              <a:rPr lang="en-US" dirty="0"/>
-              <a:t>Configuration</a:t>
-            </a:r>
-          </a:p>
-        </p:txBody>
-      </p:sp>
-      <p:pic>
-        <p:nvPicPr>
-          <p:cNvPr id="3" name="Picture 2"/>
-          <p:cNvPicPr>
-            <a:picLocks noChangeAspect="1"/>
-          </p:cNvPicPr>
-          <p:nvPr/>
-        </p:nvPicPr>
-        <p:blipFill>
-          <a:blip r:embed="rId3"/>
-          <a:stretch>
-            <a:fillRect/>
-          </a:stretch>
-        </p:blipFill>
-        <p:spPr>
-          <a:xfrm>
-            <a:off x="2009764" y="666634"/>
-            <a:ext cx="4991111" cy="4305416"/>
-          </a:xfrm>
-          <a:prstGeom prst="rect">
-            <a:avLst/>
-          </a:prstGeom>
-        </p:spPr>
-      </p:pic>
-    </p:spTree>
-    <p:extLst>
-      <p:ext uri="{BB962C8B-B14F-4D97-AF65-F5344CB8AC3E}">
-        <p14:creationId xmlns:p14="http://schemas.microsoft.com/office/powerpoint/2010/main" val="4099160036"/>
-      </p:ext>
-    </p:extLst>
-  </p:cSld>
-  <p:clrMapOvr>
-    <a:masterClrMapping/>
-  </p:clrMapOvr>
-</p:sld>
-</file>
-
-<file path=ppt/slides/slide21.xml><?xml version="1.0" encoding="utf-8"?>
-<p:sld xmlns:a="http://schemas.openxmlformats.org/drawingml/2006/main" xmlns:r="http://schemas.openxmlformats.org/officeDocument/2006/relationships" xmlns:p="http://schemas.openxmlformats.org/presentationml/2006/main">
-  <p:cSld>
-    <p:spTree>
-      <p:nvGrpSpPr>
-        <p:cNvPr id="1" name=""/>
-        <p:cNvGrpSpPr/>
-        <p:nvPr/>
-      </p:nvGrpSpPr>
-      <p:grpSpPr>
-        <a:xfrm>
-          <a:off x="0" y="0"/>
-          <a:ext cx="0" cy="0"/>
-          <a:chOff x="0" y="0"/>
-          <a:chExt cx="0" cy="0"/>
-        </a:xfrm>
-      </p:grpSpPr>
-      <p:sp>
-        <p:nvSpPr>
-          <p:cNvPr id="2" name="Title 1"/>
-          <p:cNvSpPr>
-            <a:spLocks noGrp="1"/>
-          </p:cNvSpPr>
-          <p:nvPr>
-            <p:ph type="ctrTitle"/>
-          </p:nvPr>
-        </p:nvSpPr>
-        <p:spPr>
-          <a:xfrm>
-            <a:off x="685800" y="925974"/>
-            <a:ext cx="7772400" cy="2338001"/>
-          </a:xfrm>
-        </p:spPr>
-        <p:txBody>
-          <a:bodyPr/>
-          <a:lstStyle/>
-          <a:p>
-            <a:r>
-              <a:rPr lang="en-US" sz="3600" dirty="0"/>
-              <a:t>Questions</a:t>
-            </a:r>
-          </a:p>
-        </p:txBody>
-      </p:sp>
-    </p:spTree>
-    <p:extLst>
-      <p:ext uri="{BB962C8B-B14F-4D97-AF65-F5344CB8AC3E}">
-        <p14:creationId xmlns:p14="http://schemas.microsoft.com/office/powerpoint/2010/main" val="3620921753"/>
-      </p:ext>
-    </p:extLst>
-  </p:cSld>
-  <p:clrMapOvr>
-    <a:masterClrMapping/>
-  </p:clrMapOvr>
-</p:sld>
-</file>
-
-<file path=ppt/slides/slide3.xml><?xml version="1.0" encoding="utf-8"?>
-<p:sld xmlns:a="http://schemas.openxmlformats.org/drawingml/2006/main" xmlns:r="http://schemas.openxmlformats.org/officeDocument/2006/relationships" xmlns:p="http://schemas.openxmlformats.org/presentationml/2006/main">
-  <p:cSld>
-    <p:spTree>
-      <p:nvGrpSpPr>
-        <p:cNvPr id="1" name=""/>
-        <p:cNvGrpSpPr/>
-        <p:nvPr/>
-      </p:nvGrpSpPr>
-      <p:grpSpPr>
-        <a:xfrm>
-          <a:off x="0" y="0"/>
-          <a:ext cx="0" cy="0"/>
-          <a:chOff x="0" y="0"/>
-          <a:chExt cx="0" cy="0"/>
-        </a:xfrm>
-      </p:grpSpPr>
-      <p:sp>
-        <p:nvSpPr>
-          <p:cNvPr id="2" name="Title 1"/>
-          <p:cNvSpPr>
-            <a:spLocks noGrp="1"/>
-          </p:cNvSpPr>
-          <p:nvPr>
-            <p:ph type="ctrTitle"/>
-          </p:nvPr>
-        </p:nvSpPr>
-        <p:spPr>
-          <a:xfrm>
-            <a:off x="685800" y="459249"/>
-            <a:ext cx="7772400" cy="2338001"/>
-          </a:xfrm>
-        </p:spPr>
-        <p:txBody>
-          <a:bodyPr/>
-          <a:lstStyle/>
-          <a:p>
-            <a:r>
-              <a:rPr lang="en-US" sz="3600" dirty="0"/>
-              <a:t>1.1 – Installing </a:t>
-            </a:r>
-            <a:r>
-              <a:rPr lang="en-US" sz="3600" dirty="0" err="1"/>
-              <a:t>Couchbase</a:t>
-            </a:r>
-            <a:r>
-              <a:rPr lang="en-US" sz="3600" dirty="0"/>
-              <a:t> Server</a:t>
-            </a:r>
-          </a:p>
-        </p:txBody>
-      </p:sp>
-    </p:spTree>
-    <p:extLst>
-      <p:ext uri="{BB962C8B-B14F-4D97-AF65-F5344CB8AC3E}">
-        <p14:creationId xmlns:p14="http://schemas.microsoft.com/office/powerpoint/2010/main" val="311991916"/>
-      </p:ext>
-    </p:extLst>
-  </p:cSld>
-  <p:clrMapOvr>
-    <a:masterClrMapping/>
-  </p:clrMapOvr>
-</p:sld>
-</file>
-
-<file path=ppt/slides/slide4.xml><?xml version="1.0" encoding="utf-8"?>
-<p:sld xmlns:a="http://schemas.openxmlformats.org/drawingml/2006/main" xmlns:r="http://schemas.openxmlformats.org/officeDocument/2006/relationships" xmlns:p="http://schemas.openxmlformats.org/presentationml/2006/main">
-  <p:cSld>
-    <p:spTree>
-      <p:nvGrpSpPr>
-        <p:cNvPr id="1" name=""/>
-        <p:cNvGrpSpPr/>
-        <p:nvPr/>
-      </p:nvGrpSpPr>
-      <p:grpSpPr>
-        <a:xfrm>
-          <a:off x="0" y="0"/>
-          <a:ext cx="0" cy="0"/>
-          <a:chOff x="0" y="0"/>
-          <a:chExt cx="0" cy="0"/>
-        </a:xfrm>
-      </p:grpSpPr>
-      <p:sp>
-        <p:nvSpPr>
-          <p:cNvPr id="2" name="Title 1"/>
-          <p:cNvSpPr>
-            <a:spLocks noGrp="1"/>
-          </p:cNvSpPr>
-          <p:nvPr>
-            <p:ph type="title"/>
-          </p:nvPr>
-        </p:nvSpPr>
-        <p:spPr/>
-        <p:txBody>
-          <a:bodyPr/>
-          <a:lstStyle/>
-          <a:p>
-            <a:r>
-              <a:rPr lang="en-US" dirty="0"/>
-              <a:t>Install Locally: Windows/Mac/Ubuntu</a:t>
-            </a:r>
-          </a:p>
-        </p:txBody>
-      </p:sp>
-      <p:sp>
-        <p:nvSpPr>
-          <p:cNvPr id="5" name="Content Placeholder 2"/>
-          <p:cNvSpPr txBox="1">
-            <a:spLocks/>
-          </p:cNvSpPr>
-          <p:nvPr/>
-        </p:nvSpPr>
-        <p:spPr>
-          <a:xfrm>
-            <a:off x="457200" y="685800"/>
-            <a:ext cx="8007739" cy="3394472"/>
-          </a:xfrm>
-          <a:prstGeom prst="rect">
-            <a:avLst/>
-          </a:prstGeom>
-        </p:spPr>
-        <p:txBody>
-          <a:bodyPr/>
-          <a:lstStyle>
-            <a:lvl1pPr marL="228600" indent="-228600" algn="l" defTabSz="457200" rtl="0" eaLnBrk="1" latinLnBrk="0" hangingPunct="1">
-              <a:spcBef>
-                <a:spcPts val="0"/>
-              </a:spcBef>
-              <a:buClr>
-                <a:schemeClr val="accent1"/>
-              </a:buClr>
-              <a:buFont typeface="Wingdings" charset="2"/>
-              <a:buChar char="§"/>
-              <a:defRPr sz="2400" kern="1200">
-                <a:solidFill>
-                  <a:schemeClr val="tx1"/>
-                </a:solidFill>
-                <a:latin typeface="+mn-lt"/>
-                <a:ea typeface="+mn-ea"/>
-                <a:cs typeface="+mn-cs"/>
-              </a:defRPr>
-            </a:lvl1pPr>
-            <a:lvl2pPr marL="455613" indent="-227013" algn="l" defTabSz="457200" rtl="0" eaLnBrk="1" latinLnBrk="0" hangingPunct="1">
-              <a:spcBef>
-                <a:spcPts val="0"/>
-              </a:spcBef>
-              <a:buClr>
-                <a:srgbClr val="262626"/>
-              </a:buClr>
-              <a:buFont typeface="Wingdings" charset="2"/>
-              <a:buChar char="§"/>
-              <a:defRPr sz="2000" kern="1200">
-                <a:solidFill>
-                  <a:schemeClr val="tx1"/>
-                </a:solidFill>
-                <a:latin typeface="+mn-lt"/>
-                <a:ea typeface="+mn-ea"/>
-                <a:cs typeface="+mn-cs"/>
-              </a:defRPr>
-            </a:lvl2pPr>
-            <a:lvl3pPr marL="455613" indent="-228600" algn="l" defTabSz="457200" rtl="0" eaLnBrk="1" latinLnBrk="0" hangingPunct="1">
-              <a:spcBef>
-                <a:spcPts val="0"/>
-              </a:spcBef>
-              <a:buClr>
-                <a:srgbClr val="262626"/>
-              </a:buClr>
-              <a:buFont typeface="Wingdings" charset="2"/>
-              <a:buChar char="§"/>
-              <a:defRPr sz="2000" kern="1200">
-                <a:solidFill>
-                  <a:schemeClr val="tx1"/>
-                </a:solidFill>
-                <a:latin typeface="+mn-lt"/>
-                <a:ea typeface="+mn-ea"/>
-                <a:cs typeface="+mn-cs"/>
-              </a:defRPr>
-            </a:lvl3pPr>
-            <a:lvl4pPr marL="455613" indent="-228600" algn="l" defTabSz="457200" rtl="0" eaLnBrk="1" latinLnBrk="0" hangingPunct="1">
-              <a:spcBef>
-                <a:spcPts val="0"/>
-              </a:spcBef>
-              <a:buClr>
-                <a:srgbClr val="262626"/>
-              </a:buClr>
-              <a:buFont typeface="Wingdings" charset="2"/>
-              <a:buChar char="§"/>
-              <a:defRPr sz="2000" kern="1200">
-                <a:solidFill>
-                  <a:schemeClr val="tx1"/>
-                </a:solidFill>
-                <a:latin typeface="+mn-lt"/>
-                <a:ea typeface="+mn-ea"/>
-                <a:cs typeface="+mn-cs"/>
-              </a:defRPr>
-            </a:lvl4pPr>
-            <a:lvl5pPr marL="455613" indent="-228600" algn="l" defTabSz="457200" rtl="0" eaLnBrk="1" latinLnBrk="0" hangingPunct="1">
-              <a:spcBef>
-                <a:spcPts val="200"/>
-              </a:spcBef>
-              <a:buClr>
-                <a:srgbClr val="262626"/>
-              </a:buClr>
-              <a:buFont typeface="Wingdings" charset="2"/>
-              <a:buChar char="§"/>
-              <a:defRPr sz="2000" kern="1200">
-                <a:solidFill>
-                  <a:schemeClr val="tx1"/>
-                </a:solidFill>
-                <a:latin typeface="+mn-lt"/>
-                <a:ea typeface="+mn-ea"/>
-                <a:cs typeface="+mn-cs"/>
-              </a:defRPr>
-            </a:lvl5pPr>
-            <a:lvl6pPr marL="2514600" indent="-228600" algn="l" defTabSz="457200" rtl="0" eaLnBrk="1" latinLnBrk="0" hangingPunct="1">
-              <a:spcBef>
-                <a:spcPct val="20000"/>
-              </a:spcBef>
-              <a:buFont typeface="Arial"/>
-              <a:buChar char="•"/>
-              <a:defRPr sz="2000" kern="1200">
-                <a:solidFill>
-                  <a:schemeClr val="tx1"/>
-                </a:solidFill>
-                <a:latin typeface="+mn-lt"/>
-                <a:ea typeface="+mn-ea"/>
-                <a:cs typeface="+mn-cs"/>
-              </a:defRPr>
-            </a:lvl6pPr>
-            <a:lvl7pPr marL="2971800" indent="-228600" algn="l" defTabSz="457200" rtl="0" eaLnBrk="1" latinLnBrk="0" hangingPunct="1">
-              <a:spcBef>
-                <a:spcPct val="20000"/>
-              </a:spcBef>
-              <a:buFont typeface="Arial"/>
-              <a:buChar char="•"/>
-              <a:defRPr sz="2000" kern="1200">
-                <a:solidFill>
-                  <a:schemeClr val="tx1"/>
-                </a:solidFill>
-                <a:latin typeface="+mn-lt"/>
-                <a:ea typeface="+mn-ea"/>
-                <a:cs typeface="+mn-cs"/>
-              </a:defRPr>
-            </a:lvl7pPr>
-            <a:lvl8pPr marL="3429000" indent="-228600" algn="l" defTabSz="457200" rtl="0" eaLnBrk="1" latinLnBrk="0" hangingPunct="1">
-              <a:spcBef>
-                <a:spcPct val="20000"/>
-              </a:spcBef>
-              <a:buFont typeface="Arial"/>
-              <a:buChar char="•"/>
-              <a:defRPr sz="2000" kern="1200">
-                <a:solidFill>
-                  <a:schemeClr val="tx1"/>
-                </a:solidFill>
-                <a:latin typeface="+mn-lt"/>
-                <a:ea typeface="+mn-ea"/>
-                <a:cs typeface="+mn-cs"/>
-              </a:defRPr>
-            </a:lvl8pPr>
-            <a:lvl9pPr marL="3886200" indent="-228600" algn="l" defTabSz="457200" rtl="0" eaLnBrk="1" latinLnBrk="0" hangingPunct="1">
-              <a:spcBef>
-                <a:spcPct val="20000"/>
-              </a:spcBef>
-              <a:buFont typeface="Arial"/>
-              <a:buChar char="•"/>
-              <a:defRPr sz="2000" kern="1200">
-                <a:solidFill>
-                  <a:schemeClr val="tx1"/>
-                </a:solidFill>
-                <a:latin typeface="+mn-lt"/>
-                <a:ea typeface="+mn-ea"/>
-                <a:cs typeface="+mn-cs"/>
-              </a:defRPr>
-            </a:lvl9pPr>
-          </a:lstStyle>
-          <a:p>
-            <a:pPr marL="342900" indent="-342900">
-              <a:buFont typeface="Arial" charset="0"/>
-              <a:buChar char="•"/>
-            </a:pPr>
-            <a:r>
-              <a:rPr lang="en-US" dirty="0">
-                <a:hlinkClick r:id="rId3"/>
-              </a:rPr>
-              <a:t>http://couchbase.com/nosql-databases/downloads</a:t>
-            </a:r>
-            <a:endParaRPr lang="en-US" dirty="0"/>
-          </a:p>
-          <a:p>
-            <a:pPr marL="342900" indent="-342900">
-              <a:buFont typeface="Arial" charset="0"/>
-              <a:buChar char="•"/>
-            </a:pPr>
-            <a:r>
-              <a:rPr lang="en-US" dirty="0"/>
-              <a:t>USB thumb drives are available</a:t>
-            </a:r>
-          </a:p>
-          <a:p>
-            <a:pPr marL="342900" indent="-342900">
-              <a:buFont typeface="Arial" charset="0"/>
-              <a:buChar char="•"/>
-            </a:pPr>
-            <a:endParaRPr lang="en-US" dirty="0"/>
-          </a:p>
-          <a:p>
-            <a:endParaRPr lang="en-US" dirty="0"/>
-          </a:p>
-        </p:txBody>
-      </p:sp>
-      <p:pic>
-        <p:nvPicPr>
-          <p:cNvPr id="3" name="Picture 2"/>
-          <p:cNvPicPr>
-            <a:picLocks noChangeAspect="1"/>
-          </p:cNvPicPr>
-          <p:nvPr/>
-        </p:nvPicPr>
-        <p:blipFill>
-          <a:blip r:embed="rId4"/>
-          <a:stretch>
-            <a:fillRect/>
-          </a:stretch>
-        </p:blipFill>
-        <p:spPr>
-          <a:xfrm>
-            <a:off x="2037463" y="1721259"/>
-            <a:ext cx="4847211" cy="3117441"/>
-          </a:xfrm>
-          <a:prstGeom prst="rect">
-            <a:avLst/>
-          </a:prstGeom>
-          <a:ln>
-            <a:solidFill>
-              <a:schemeClr val="accent1"/>
-            </a:solidFill>
-          </a:ln>
-        </p:spPr>
-      </p:pic>
-    </p:spTree>
-    <p:extLst>
-      <p:ext uri="{BB962C8B-B14F-4D97-AF65-F5344CB8AC3E}">
-        <p14:creationId xmlns:p14="http://schemas.microsoft.com/office/powerpoint/2010/main" val="4008062327"/>
-      </p:ext>
-    </p:extLst>
-  </p:cSld>
-  <p:clrMapOvr>
-    <a:masterClrMapping/>
-  </p:clrMapOvr>
-  <mc:AlternateContent xmlns:mc="http://schemas.openxmlformats.org/markup-compatibility/2006" xmlns:p14="http://schemas.microsoft.com/office/powerpoint/2010/main">
-    <mc:Choice Requires="p14">
-      <p:transition p14:dur="10"/>
-    </mc:Choice>
-    <mc:Fallback xmlns="">
-      <p:transition/>
-    </mc:Fallback>
-  </mc:AlternateContent>
-</p:sld>
-</file>
-
-<file path=ppt/slides/slide5.xml><?xml version="1.0" encoding="utf-8"?>
-<p:sld xmlns:a="http://schemas.openxmlformats.org/drawingml/2006/main" xmlns:r="http://schemas.openxmlformats.org/officeDocument/2006/relationships" xmlns:p="http://schemas.openxmlformats.org/presentationml/2006/main">
-  <p:cSld>
-    <p:spTree>
-      <p:nvGrpSpPr>
-        <p:cNvPr id="1" name=""/>
-        <p:cNvGrpSpPr/>
-        <p:nvPr/>
-      </p:nvGrpSpPr>
-      <p:grpSpPr>
-        <a:xfrm>
-          <a:off x="0" y="0"/>
-          <a:ext cx="0" cy="0"/>
-          <a:chOff x="0" y="0"/>
-          <a:chExt cx="0" cy="0"/>
-        </a:xfrm>
-      </p:grpSpPr>
-      <p:sp>
-        <p:nvSpPr>
-          <p:cNvPr id="2" name="Title 1"/>
-          <p:cNvSpPr>
-            <a:spLocks noGrp="1"/>
-          </p:cNvSpPr>
-          <p:nvPr>
-            <p:ph type="title"/>
-          </p:nvPr>
-        </p:nvSpPr>
-        <p:spPr/>
-        <p:txBody>
-          <a:bodyPr/>
-          <a:lstStyle/>
-          <a:p>
-            <a:r>
-              <a:rPr lang="en-US" dirty="0"/>
-              <a:t>Install</a:t>
-            </a:r>
-          </a:p>
-        </p:txBody>
-      </p:sp>
-      <p:pic>
-        <p:nvPicPr>
-          <p:cNvPr id="1026" name="Picture 2" descr="Couchbase Server Install Wizard 1"/>
-          <p:cNvPicPr>
-            <a:picLocks noChangeAspect="1" noChangeArrowheads="1"/>
-          </p:cNvPicPr>
-          <p:nvPr/>
-        </p:nvPicPr>
-        <p:blipFill>
-          <a:blip r:embed="rId2">
-            <a:extLst>
-              <a:ext uri="{28A0092B-C50C-407E-A947-70E740481C1C}">
-                <a14:useLocalDpi xmlns:a14="http://schemas.microsoft.com/office/drawing/2010/main" val="0"/>
-              </a:ext>
-            </a:extLst>
-          </a:blip>
-          <a:srcRect/>
-          <a:stretch>
-            <a:fillRect/>
-          </a:stretch>
-        </p:blipFill>
-        <p:spPr bwMode="auto">
-          <a:xfrm>
-            <a:off x="2195513" y="762000"/>
-            <a:ext cx="4752975" cy="3619500"/>
-          </a:xfrm>
-          <a:prstGeom prst="rect">
-            <a:avLst/>
-          </a:prstGeom>
-          <a:noFill/>
-          <a:extLst>
-            <a:ext uri="{909E8E84-426E-40DD-AFC4-6F175D3DCCD1}">
-              <a14:hiddenFill xmlns:a14="http://schemas.microsoft.com/office/drawing/2010/main">
-                <a:solidFill>
-                  <a:srgbClr val="FFFFFF"/>
-                </a:solidFill>
-              </a14:hiddenFill>
-            </a:ext>
-          </a:extLst>
-        </p:spPr>
-      </p:pic>
-    </p:spTree>
-    <p:extLst>
-      <p:ext uri="{BB962C8B-B14F-4D97-AF65-F5344CB8AC3E}">
-        <p14:creationId xmlns:p14="http://schemas.microsoft.com/office/powerpoint/2010/main" val="2934162958"/>
-      </p:ext>
-    </p:extLst>
-  </p:cSld>
-  <p:clrMapOvr>
-    <a:masterClrMapping/>
-  </p:clrMapOvr>
-</p:sld>
-</file>
-
 <file path=ppt/slides/slide6.xml><?xml version="1.0" encoding="utf-8"?>
 <p:sld xmlns:a="http://schemas.openxmlformats.org/drawingml/2006/main" xmlns:r="http://schemas.openxmlformats.org/officeDocument/2006/relationships" xmlns:p="http://schemas.openxmlformats.org/presentationml/2006/main">
   <p:cSld>
@@ -10382,252 +10273,38 @@
             <a:spLocks noGrp="1"/>
           </p:cNvSpPr>
           <p:nvPr>
-            <p:ph type="title"/>
+            <p:ph type="ctrTitle"/>
           </p:nvPr>
         </p:nvSpPr>
-        <p:spPr/>
+        <p:spPr>
+          <a:xfrm>
+            <a:off x="685800" y="459249"/>
+            <a:ext cx="7772400" cy="2338001"/>
+          </a:xfrm>
+        </p:spPr>
         <p:txBody>
           <a:bodyPr/>
           <a:lstStyle/>
           <a:p>
             <a:r>
-              <a:rPr lang="en-US" dirty="0"/>
-              <a:t>Install on Cloud: Azure</a:t>
+              <a:rPr lang="en-US" sz="3600" dirty="0"/>
+              <a:t>1.1 – Installing </a:t>
+            </a:r>
+            <a:r>
+              <a:rPr lang="en-US" sz="3600" dirty="0" err="1"/>
+              <a:t>Couchbase</a:t>
+            </a:r>
+            <a:r>
+              <a:rPr lang="en-US" sz="3600" dirty="0"/>
+              <a:t> Server</a:t>
             </a:r>
           </a:p>
         </p:txBody>
       </p:sp>
-      <p:sp>
-        <p:nvSpPr>
-          <p:cNvPr id="4" name="Content Placeholder 2"/>
-          <p:cNvSpPr txBox="1">
-            <a:spLocks/>
-          </p:cNvSpPr>
-          <p:nvPr/>
-        </p:nvSpPr>
-        <p:spPr>
-          <a:xfrm>
-            <a:off x="198158" y="685800"/>
-            <a:ext cx="8307668" cy="1295400"/>
-          </a:xfrm>
-          <a:prstGeom prst="rect">
-            <a:avLst/>
-          </a:prstGeom>
-        </p:spPr>
-        <p:txBody>
-          <a:bodyPr/>
-          <a:lstStyle>
-            <a:lvl1pPr marL="228600" indent="-228600" algn="l" defTabSz="457200" rtl="0" eaLnBrk="1" latinLnBrk="0" hangingPunct="1">
-              <a:spcBef>
-                <a:spcPts val="0"/>
-              </a:spcBef>
-              <a:buClr>
-                <a:schemeClr val="accent1"/>
-              </a:buClr>
-              <a:buFont typeface="Wingdings" charset="2"/>
-              <a:buChar char="§"/>
-              <a:defRPr sz="2400" kern="1200">
-                <a:solidFill>
-                  <a:schemeClr val="tx1"/>
-                </a:solidFill>
-                <a:latin typeface="+mn-lt"/>
-                <a:ea typeface="+mn-ea"/>
-                <a:cs typeface="+mn-cs"/>
-              </a:defRPr>
-            </a:lvl1pPr>
-            <a:lvl2pPr marL="455613" indent="-227013" algn="l" defTabSz="457200" rtl="0" eaLnBrk="1" latinLnBrk="0" hangingPunct="1">
-              <a:spcBef>
-                <a:spcPts val="0"/>
-              </a:spcBef>
-              <a:buClr>
-                <a:srgbClr val="262626"/>
-              </a:buClr>
-              <a:buFont typeface="Wingdings" charset="2"/>
-              <a:buChar char="§"/>
-              <a:defRPr sz="2000" kern="1200">
-                <a:solidFill>
-                  <a:schemeClr val="tx1"/>
-                </a:solidFill>
-                <a:latin typeface="+mn-lt"/>
-                <a:ea typeface="+mn-ea"/>
-                <a:cs typeface="+mn-cs"/>
-              </a:defRPr>
-            </a:lvl2pPr>
-            <a:lvl3pPr marL="455613" indent="-228600" algn="l" defTabSz="457200" rtl="0" eaLnBrk="1" latinLnBrk="0" hangingPunct="1">
-              <a:spcBef>
-                <a:spcPts val="0"/>
-              </a:spcBef>
-              <a:buClr>
-                <a:srgbClr val="262626"/>
-              </a:buClr>
-              <a:buFont typeface="Wingdings" charset="2"/>
-              <a:buChar char="§"/>
-              <a:defRPr sz="2000" kern="1200">
-                <a:solidFill>
-                  <a:schemeClr val="tx1"/>
-                </a:solidFill>
-                <a:latin typeface="+mn-lt"/>
-                <a:ea typeface="+mn-ea"/>
-                <a:cs typeface="+mn-cs"/>
-              </a:defRPr>
-            </a:lvl3pPr>
-            <a:lvl4pPr marL="455613" indent="-228600" algn="l" defTabSz="457200" rtl="0" eaLnBrk="1" latinLnBrk="0" hangingPunct="1">
-              <a:spcBef>
-                <a:spcPts val="0"/>
-              </a:spcBef>
-              <a:buClr>
-                <a:srgbClr val="262626"/>
-              </a:buClr>
-              <a:buFont typeface="Wingdings" charset="2"/>
-              <a:buChar char="§"/>
-              <a:defRPr sz="2000" kern="1200">
-                <a:solidFill>
-                  <a:schemeClr val="tx1"/>
-                </a:solidFill>
-                <a:latin typeface="+mn-lt"/>
-                <a:ea typeface="+mn-ea"/>
-                <a:cs typeface="+mn-cs"/>
-              </a:defRPr>
-            </a:lvl4pPr>
-            <a:lvl5pPr marL="455613" indent="-228600" algn="l" defTabSz="457200" rtl="0" eaLnBrk="1" latinLnBrk="0" hangingPunct="1">
-              <a:spcBef>
-                <a:spcPts val="200"/>
-              </a:spcBef>
-              <a:buClr>
-                <a:srgbClr val="262626"/>
-              </a:buClr>
-              <a:buFont typeface="Wingdings" charset="2"/>
-              <a:buChar char="§"/>
-              <a:defRPr sz="2000" kern="1200">
-                <a:solidFill>
-                  <a:schemeClr val="tx1"/>
-                </a:solidFill>
-                <a:latin typeface="+mn-lt"/>
-                <a:ea typeface="+mn-ea"/>
-                <a:cs typeface="+mn-cs"/>
-              </a:defRPr>
-            </a:lvl5pPr>
-            <a:lvl6pPr marL="2514600" indent="-228600" algn="l" defTabSz="457200" rtl="0" eaLnBrk="1" latinLnBrk="0" hangingPunct="1">
-              <a:spcBef>
-                <a:spcPct val="20000"/>
-              </a:spcBef>
-              <a:buFont typeface="Arial"/>
-              <a:buChar char="•"/>
-              <a:defRPr sz="2000" kern="1200">
-                <a:solidFill>
-                  <a:schemeClr val="tx1"/>
-                </a:solidFill>
-                <a:latin typeface="+mn-lt"/>
-                <a:ea typeface="+mn-ea"/>
-                <a:cs typeface="+mn-cs"/>
-              </a:defRPr>
-            </a:lvl6pPr>
-            <a:lvl7pPr marL="2971800" indent="-228600" algn="l" defTabSz="457200" rtl="0" eaLnBrk="1" latinLnBrk="0" hangingPunct="1">
-              <a:spcBef>
-                <a:spcPct val="20000"/>
-              </a:spcBef>
-              <a:buFont typeface="Arial"/>
-              <a:buChar char="•"/>
-              <a:defRPr sz="2000" kern="1200">
-                <a:solidFill>
-                  <a:schemeClr val="tx1"/>
-                </a:solidFill>
-                <a:latin typeface="+mn-lt"/>
-                <a:ea typeface="+mn-ea"/>
-                <a:cs typeface="+mn-cs"/>
-              </a:defRPr>
-            </a:lvl7pPr>
-            <a:lvl8pPr marL="3429000" indent="-228600" algn="l" defTabSz="457200" rtl="0" eaLnBrk="1" latinLnBrk="0" hangingPunct="1">
-              <a:spcBef>
-                <a:spcPct val="20000"/>
-              </a:spcBef>
-              <a:buFont typeface="Arial"/>
-              <a:buChar char="•"/>
-              <a:defRPr sz="2000" kern="1200">
-                <a:solidFill>
-                  <a:schemeClr val="tx1"/>
-                </a:solidFill>
-                <a:latin typeface="+mn-lt"/>
-                <a:ea typeface="+mn-ea"/>
-                <a:cs typeface="+mn-cs"/>
-              </a:defRPr>
-            </a:lvl8pPr>
-            <a:lvl9pPr marL="3886200" indent="-228600" algn="l" defTabSz="457200" rtl="0" eaLnBrk="1" latinLnBrk="0" hangingPunct="1">
-              <a:spcBef>
-                <a:spcPct val="20000"/>
-              </a:spcBef>
-              <a:buFont typeface="Arial"/>
-              <a:buChar char="•"/>
-              <a:defRPr sz="2000" kern="1200">
-                <a:solidFill>
-                  <a:schemeClr val="tx1"/>
-                </a:solidFill>
-                <a:latin typeface="+mn-lt"/>
-                <a:ea typeface="+mn-ea"/>
-                <a:cs typeface="+mn-cs"/>
-              </a:defRPr>
-            </a:lvl9pPr>
-          </a:lstStyle>
-          <a:p>
-            <a:pPr marL="342900" indent="-342900">
-              <a:buFont typeface="Arial" charset="0"/>
-              <a:buChar char="•"/>
-            </a:pPr>
-            <a:r>
-              <a:rPr lang="en-US" sz="2000" dirty="0">
-                <a:hlinkClick r:id="rId3"/>
-              </a:rPr>
-              <a:t>https://portal.azure.com</a:t>
-            </a:r>
-            <a:endParaRPr lang="en-US" sz="2000" dirty="0"/>
-          </a:p>
-          <a:p>
-            <a:pPr marL="342900" indent="-342900">
-              <a:buFont typeface="Arial" charset="0"/>
-              <a:buChar char="•"/>
-            </a:pPr>
-            <a:endParaRPr lang="en-US" sz="2000" dirty="0"/>
-          </a:p>
-          <a:p>
-            <a:pPr marL="342900" indent="-342900">
-              <a:buFont typeface="Arial" charset="0"/>
-              <a:buChar char="•"/>
-            </a:pPr>
-            <a:endParaRPr lang="en-US" dirty="0"/>
-          </a:p>
-          <a:p>
-            <a:endParaRPr lang="en-US" dirty="0"/>
-          </a:p>
-        </p:txBody>
-      </p:sp>
-      <p:pic>
-        <p:nvPicPr>
-          <p:cNvPr id="3" name="Picture 2"/>
-          <p:cNvPicPr>
-            <a:picLocks noChangeAspect="1"/>
-          </p:cNvPicPr>
-          <p:nvPr/>
-        </p:nvPicPr>
-        <p:blipFill>
-          <a:blip r:embed="rId4"/>
-          <a:stretch>
-            <a:fillRect/>
-          </a:stretch>
-        </p:blipFill>
-        <p:spPr>
-          <a:xfrm>
-            <a:off x="323850" y="1228725"/>
-            <a:ext cx="8679754" cy="3260490"/>
-          </a:xfrm>
-          <a:prstGeom prst="rect">
-            <a:avLst/>
-          </a:prstGeom>
-        </p:spPr>
-      </p:pic>
     </p:spTree>
     <p:extLst>
       <p:ext uri="{BB962C8B-B14F-4D97-AF65-F5344CB8AC3E}">
-        <p14:creationId xmlns:p14="http://schemas.microsoft.com/office/powerpoint/2010/main" val="1148363434"/>
+        <p14:creationId xmlns:p14="http://schemas.microsoft.com/office/powerpoint/2010/main" val="311991916"/>
       </p:ext>
     </p:extLst>
   </p:cSld>
@@ -10671,421 +10348,14 @@
           <a:p>
             <a:r>
               <a:rPr lang="en-US" dirty="0"/>
-              <a:t>Install on Cloud: Azure</a:t>
+              <a:t>Install Locally: Windows/Mac/Ubuntu</a:t>
             </a:r>
           </a:p>
         </p:txBody>
       </p:sp>
       <p:sp>
         <p:nvSpPr>
-          <p:cNvPr id="3" name="Content Placeholder 2"/>
-          <p:cNvSpPr txBox="1">
-            <a:spLocks/>
-          </p:cNvSpPr>
-          <p:nvPr/>
-        </p:nvSpPr>
-        <p:spPr>
-          <a:xfrm>
-            <a:off x="198158" y="685800"/>
-            <a:ext cx="8307668" cy="1295400"/>
-          </a:xfrm>
-          <a:prstGeom prst="rect">
-            <a:avLst/>
-          </a:prstGeom>
-        </p:spPr>
-        <p:txBody>
-          <a:bodyPr/>
-          <a:lstStyle>
-            <a:lvl1pPr marL="228600" indent="-228600" algn="l" defTabSz="457200" rtl="0" eaLnBrk="1" latinLnBrk="0" hangingPunct="1">
-              <a:spcBef>
-                <a:spcPts val="0"/>
-              </a:spcBef>
-              <a:buClr>
-                <a:schemeClr val="accent1"/>
-              </a:buClr>
-              <a:buFont typeface="Wingdings" charset="2"/>
-              <a:buChar char="§"/>
-              <a:defRPr sz="2400" kern="1200">
-                <a:solidFill>
-                  <a:schemeClr val="tx1"/>
-                </a:solidFill>
-                <a:latin typeface="+mn-lt"/>
-                <a:ea typeface="+mn-ea"/>
-                <a:cs typeface="+mn-cs"/>
-              </a:defRPr>
-            </a:lvl1pPr>
-            <a:lvl2pPr marL="455613" indent="-227013" algn="l" defTabSz="457200" rtl="0" eaLnBrk="1" latinLnBrk="0" hangingPunct="1">
-              <a:spcBef>
-                <a:spcPts val="0"/>
-              </a:spcBef>
-              <a:buClr>
-                <a:srgbClr val="262626"/>
-              </a:buClr>
-              <a:buFont typeface="Wingdings" charset="2"/>
-              <a:buChar char="§"/>
-              <a:defRPr sz="2000" kern="1200">
-                <a:solidFill>
-                  <a:schemeClr val="tx1"/>
-                </a:solidFill>
-                <a:latin typeface="+mn-lt"/>
-                <a:ea typeface="+mn-ea"/>
-                <a:cs typeface="+mn-cs"/>
-              </a:defRPr>
-            </a:lvl2pPr>
-            <a:lvl3pPr marL="455613" indent="-228600" algn="l" defTabSz="457200" rtl="0" eaLnBrk="1" latinLnBrk="0" hangingPunct="1">
-              <a:spcBef>
-                <a:spcPts val="0"/>
-              </a:spcBef>
-              <a:buClr>
-                <a:srgbClr val="262626"/>
-              </a:buClr>
-              <a:buFont typeface="Wingdings" charset="2"/>
-              <a:buChar char="§"/>
-              <a:defRPr sz="2000" kern="1200">
-                <a:solidFill>
-                  <a:schemeClr val="tx1"/>
-                </a:solidFill>
-                <a:latin typeface="+mn-lt"/>
-                <a:ea typeface="+mn-ea"/>
-                <a:cs typeface="+mn-cs"/>
-              </a:defRPr>
-            </a:lvl3pPr>
-            <a:lvl4pPr marL="455613" indent="-228600" algn="l" defTabSz="457200" rtl="0" eaLnBrk="1" latinLnBrk="0" hangingPunct="1">
-              <a:spcBef>
-                <a:spcPts val="0"/>
-              </a:spcBef>
-              <a:buClr>
-                <a:srgbClr val="262626"/>
-              </a:buClr>
-              <a:buFont typeface="Wingdings" charset="2"/>
-              <a:buChar char="§"/>
-              <a:defRPr sz="2000" kern="1200">
-                <a:solidFill>
-                  <a:schemeClr val="tx1"/>
-                </a:solidFill>
-                <a:latin typeface="+mn-lt"/>
-                <a:ea typeface="+mn-ea"/>
-                <a:cs typeface="+mn-cs"/>
-              </a:defRPr>
-            </a:lvl4pPr>
-            <a:lvl5pPr marL="455613" indent="-228600" algn="l" defTabSz="457200" rtl="0" eaLnBrk="1" latinLnBrk="0" hangingPunct="1">
-              <a:spcBef>
-                <a:spcPts val="200"/>
-              </a:spcBef>
-              <a:buClr>
-                <a:srgbClr val="262626"/>
-              </a:buClr>
-              <a:buFont typeface="Wingdings" charset="2"/>
-              <a:buChar char="§"/>
-              <a:defRPr sz="2000" kern="1200">
-                <a:solidFill>
-                  <a:schemeClr val="tx1"/>
-                </a:solidFill>
-                <a:latin typeface="+mn-lt"/>
-                <a:ea typeface="+mn-ea"/>
-                <a:cs typeface="+mn-cs"/>
-              </a:defRPr>
-            </a:lvl5pPr>
-            <a:lvl6pPr marL="2514600" indent="-228600" algn="l" defTabSz="457200" rtl="0" eaLnBrk="1" latinLnBrk="0" hangingPunct="1">
-              <a:spcBef>
-                <a:spcPct val="20000"/>
-              </a:spcBef>
-              <a:buFont typeface="Arial"/>
-              <a:buChar char="•"/>
-              <a:defRPr sz="2000" kern="1200">
-                <a:solidFill>
-                  <a:schemeClr val="tx1"/>
-                </a:solidFill>
-                <a:latin typeface="+mn-lt"/>
-                <a:ea typeface="+mn-ea"/>
-                <a:cs typeface="+mn-cs"/>
-              </a:defRPr>
-            </a:lvl6pPr>
-            <a:lvl7pPr marL="2971800" indent="-228600" algn="l" defTabSz="457200" rtl="0" eaLnBrk="1" latinLnBrk="0" hangingPunct="1">
-              <a:spcBef>
-                <a:spcPct val="20000"/>
-              </a:spcBef>
-              <a:buFont typeface="Arial"/>
-              <a:buChar char="•"/>
-              <a:defRPr sz="2000" kern="1200">
-                <a:solidFill>
-                  <a:schemeClr val="tx1"/>
-                </a:solidFill>
-                <a:latin typeface="+mn-lt"/>
-                <a:ea typeface="+mn-ea"/>
-                <a:cs typeface="+mn-cs"/>
-              </a:defRPr>
-            </a:lvl7pPr>
-            <a:lvl8pPr marL="3429000" indent="-228600" algn="l" defTabSz="457200" rtl="0" eaLnBrk="1" latinLnBrk="0" hangingPunct="1">
-              <a:spcBef>
-                <a:spcPct val="20000"/>
-              </a:spcBef>
-              <a:buFont typeface="Arial"/>
-              <a:buChar char="•"/>
-              <a:defRPr sz="2000" kern="1200">
-                <a:solidFill>
-                  <a:schemeClr val="tx1"/>
-                </a:solidFill>
-                <a:latin typeface="+mn-lt"/>
-                <a:ea typeface="+mn-ea"/>
-                <a:cs typeface="+mn-cs"/>
-              </a:defRPr>
-            </a:lvl8pPr>
-            <a:lvl9pPr marL="3886200" indent="-228600" algn="l" defTabSz="457200" rtl="0" eaLnBrk="1" latinLnBrk="0" hangingPunct="1">
-              <a:spcBef>
-                <a:spcPct val="20000"/>
-              </a:spcBef>
-              <a:buFont typeface="Arial"/>
-              <a:buChar char="•"/>
-              <a:defRPr sz="2000" kern="1200">
-                <a:solidFill>
-                  <a:schemeClr val="tx1"/>
-                </a:solidFill>
-                <a:latin typeface="+mn-lt"/>
-                <a:ea typeface="+mn-ea"/>
-                <a:cs typeface="+mn-cs"/>
-              </a:defRPr>
-            </a:lvl9pPr>
-          </a:lstStyle>
-          <a:p>
-            <a:pPr marL="342900" indent="-342900">
-              <a:buFont typeface="Arial" charset="0"/>
-              <a:buChar char="•"/>
-            </a:pPr>
-            <a:r>
-              <a:rPr lang="en-US" sz="1800" dirty="0"/>
-              <a:t>Select </a:t>
-            </a:r>
-            <a:r>
-              <a:rPr lang="en-US" sz="1800" dirty="0" err="1"/>
-              <a:t>Couchbase</a:t>
-            </a:r>
-            <a:r>
-              <a:rPr lang="en-US" sz="1800" dirty="0"/>
-              <a:t> Server, click Create</a:t>
-            </a:r>
-          </a:p>
-          <a:p>
-            <a:pPr marL="342900" indent="-342900">
-              <a:buFont typeface="Arial" charset="0"/>
-              <a:buChar char="•"/>
-            </a:pPr>
-            <a:r>
-              <a:rPr lang="en-US" sz="1800" dirty="0"/>
-              <a:t>Step 1 Basics: Name, user name, </a:t>
-            </a:r>
-            <a:r>
-              <a:rPr lang="en-US" sz="1800" dirty="0" err="1"/>
-              <a:t>Auth</a:t>
-            </a:r>
-            <a:r>
-              <a:rPr lang="en-US" sz="1800" dirty="0"/>
-              <a:t> type, Password, Subscription, Resource Group, Location</a:t>
-            </a:r>
-          </a:p>
-          <a:p>
-            <a:pPr marL="342900" indent="-342900">
-              <a:buFont typeface="Arial" charset="0"/>
-              <a:buChar char="•"/>
-            </a:pPr>
-            <a:r>
-              <a:rPr lang="en-US" sz="1800" dirty="0"/>
-              <a:t>Step 2 Size: Pick a size (4 cores, 4gb RAM recommended)</a:t>
-            </a:r>
-          </a:p>
-          <a:p>
-            <a:pPr marL="342900" indent="-342900">
-              <a:buFont typeface="Arial" charset="0"/>
-              <a:buChar char="•"/>
-            </a:pPr>
-            <a:r>
-              <a:rPr lang="en-US" sz="1800" dirty="0"/>
-              <a:t>Step 3 Settings: </a:t>
-            </a:r>
-          </a:p>
-          <a:p>
-            <a:pPr marL="569913" lvl="1" indent="-342900">
-              <a:buFont typeface="Arial" charset="0"/>
-              <a:buChar char="•"/>
-            </a:pPr>
-            <a:r>
-              <a:rPr lang="en-US" sz="1400" dirty="0"/>
-              <a:t>Virtual network -&gt; subnet name</a:t>
-            </a:r>
-          </a:p>
-          <a:p>
-            <a:pPr marL="569913" lvl="1" indent="-342900">
-              <a:buFont typeface="Arial" charset="0"/>
-              <a:buChar char="•"/>
-            </a:pPr>
-            <a:r>
-              <a:rPr lang="en-US" sz="1400" dirty="0"/>
-              <a:t>Network security group -&gt; add inbound rule (TCP, source port *, destination port *)</a:t>
-            </a:r>
-          </a:p>
-          <a:p>
-            <a:pPr marL="569913" lvl="1" indent="-342900">
-              <a:buFont typeface="Arial" charset="0"/>
-              <a:buChar char="•"/>
-            </a:pPr>
-            <a:r>
-              <a:rPr lang="en-US" sz="1400" dirty="0"/>
-              <a:t>Network security group -&gt; add outbound rule (TCP, destination port *, source port *)</a:t>
-            </a:r>
-          </a:p>
-          <a:p>
-            <a:pPr marL="342900" indent="-342900">
-              <a:buFont typeface="Arial" charset="0"/>
-              <a:buChar char="•"/>
-            </a:pPr>
-            <a:r>
-              <a:rPr lang="en-US" sz="1800" dirty="0"/>
-              <a:t>Step 4 Summary</a:t>
-            </a:r>
-          </a:p>
-          <a:p>
-            <a:pPr marL="342900" indent="-342900">
-              <a:buFont typeface="Arial" charset="0"/>
-              <a:buChar char="•"/>
-            </a:pPr>
-            <a:r>
-              <a:rPr lang="en-US" sz="1800" dirty="0"/>
-              <a:t>Step 5 Buy</a:t>
-            </a:r>
-          </a:p>
-          <a:p>
-            <a:pPr marL="342900" indent="-342900">
-              <a:buFont typeface="Arial" charset="0"/>
-              <a:buChar char="•"/>
-            </a:pPr>
-            <a:r>
-              <a:rPr lang="en-US" sz="1800" dirty="0"/>
-              <a:t>Wait for deployment</a:t>
-            </a:r>
-          </a:p>
-          <a:p>
-            <a:pPr marL="342900" indent="-342900">
-              <a:buFont typeface="Arial" charset="0"/>
-              <a:buChar char="•"/>
-            </a:pPr>
-            <a:r>
-              <a:rPr lang="en-US" sz="1800" dirty="0"/>
-              <a:t>Access </a:t>
-            </a:r>
-            <a:r>
-              <a:rPr lang="en-US" sz="1800" dirty="0" err="1"/>
-              <a:t>Couchbase</a:t>
-            </a:r>
-            <a:r>
-              <a:rPr lang="en-US" sz="1800" dirty="0"/>
-              <a:t> Console via the Public IP address, port 8091 (e.g. http://168.1.2.3:8091)</a:t>
-            </a:r>
-          </a:p>
-          <a:p>
-            <a:pPr marL="342900" indent="-342900">
-              <a:buFont typeface="Arial" charset="0"/>
-              <a:buChar char="•"/>
-            </a:pPr>
-            <a:r>
-              <a:rPr lang="en-US" sz="1800" dirty="0"/>
-              <a:t>Video: </a:t>
-            </a:r>
-            <a:r>
-              <a:rPr lang="en-US" sz="1800" dirty="0">
-                <a:hlinkClick r:id="rId3"/>
-              </a:rPr>
-              <a:t>http://blog.couchbase.com/2017/june/couchbase-on-the-microsoft-azure-marketplace-video</a:t>
-            </a:r>
-            <a:endParaRPr lang="en-US" sz="1800" dirty="0"/>
-          </a:p>
-          <a:p>
-            <a:pPr marL="342900" indent="-342900">
-              <a:buFont typeface="Arial" charset="0"/>
-              <a:buChar char="•"/>
-            </a:pPr>
-            <a:endParaRPr lang="en-US" sz="1800" dirty="0"/>
-          </a:p>
-          <a:p>
-            <a:pPr marL="342900" indent="-342900">
-              <a:buFont typeface="Arial" charset="0"/>
-              <a:buChar char="•"/>
-            </a:pPr>
-            <a:endParaRPr lang="en-US" sz="1800" dirty="0"/>
-          </a:p>
-          <a:p>
-            <a:pPr marL="342900" indent="-342900">
-              <a:buFont typeface="Arial" charset="0"/>
-              <a:buChar char="•"/>
-            </a:pPr>
-            <a:endParaRPr lang="en-US" sz="1800" dirty="0"/>
-          </a:p>
-          <a:p>
-            <a:pPr marL="342900" indent="-342900">
-              <a:buFont typeface="Arial" charset="0"/>
-              <a:buChar char="•"/>
-            </a:pPr>
-            <a:endParaRPr lang="en-US" sz="2000" dirty="0"/>
-          </a:p>
-          <a:p>
-            <a:endParaRPr lang="en-US" sz="2000" dirty="0"/>
-          </a:p>
-        </p:txBody>
-      </p:sp>
-    </p:spTree>
-    <p:extLst>
-      <p:ext uri="{BB962C8B-B14F-4D97-AF65-F5344CB8AC3E}">
-        <p14:creationId xmlns:p14="http://schemas.microsoft.com/office/powerpoint/2010/main" val="3543248798"/>
-      </p:ext>
-    </p:extLst>
-  </p:cSld>
-  <p:clrMapOvr>
-    <a:masterClrMapping/>
-  </p:clrMapOvr>
-</p:sld>
-</file>
-
-<file path=ppt/slides/slide8.xml><?xml version="1.0" encoding="utf-8"?>
-<p:sld xmlns:a="http://schemas.openxmlformats.org/drawingml/2006/main" xmlns:r="http://schemas.openxmlformats.org/officeDocument/2006/relationships" xmlns:p="http://schemas.openxmlformats.org/presentationml/2006/main">
-  <p:cSld>
-    <p:spTree>
-      <p:nvGrpSpPr>
-        <p:cNvPr id="1" name=""/>
-        <p:cNvGrpSpPr/>
-        <p:nvPr/>
-      </p:nvGrpSpPr>
-      <p:grpSpPr>
-        <a:xfrm>
-          <a:off x="0" y="0"/>
-          <a:ext cx="0" cy="0"/>
-          <a:chOff x="0" y="0"/>
-          <a:chExt cx="0" cy="0"/>
-        </a:xfrm>
-      </p:grpSpPr>
-      <p:sp>
-        <p:nvSpPr>
-          <p:cNvPr id="2" name="Title 1"/>
-          <p:cNvSpPr>
-            <a:spLocks noGrp="1"/>
-          </p:cNvSpPr>
-          <p:nvPr>
-            <p:ph type="title"/>
-          </p:nvPr>
-        </p:nvSpPr>
-        <p:spPr/>
-        <p:txBody>
-          <a:bodyPr/>
-          <a:lstStyle/>
-          <a:p>
-            <a:r>
-              <a:rPr lang="en-US" dirty="0"/>
-              <a:t>Install on Cloud: Amazon</a:t>
-            </a:r>
-          </a:p>
-        </p:txBody>
-      </p:sp>
-      <p:sp>
-        <p:nvSpPr>
-          <p:cNvPr id="4" name="Content Placeholder 2"/>
+          <p:cNvPr id="5" name="Content Placeholder 2"/>
           <p:cNvSpPr txBox="1">
             <a:spLocks/>
           </p:cNvSpPr>
@@ -11259,210 +10529,23 @@
               <a:buFont typeface="Arial" charset="0"/>
               <a:buChar char="•"/>
             </a:pPr>
+            <a:r>
+              <a:rPr lang="en-US" dirty="0">
+                <a:hlinkClick r:id="rId3"/>
+              </a:rPr>
+              <a:t>http://couchbase.com/downloads</a:t>
+            </a:r>
             <a:endParaRPr lang="en-US" dirty="0"/>
           </a:p>
-          <a:p>
-            <a:endParaRPr lang="en-US" dirty="0"/>
-          </a:p>
-        </p:txBody>
-      </p:sp>
-      <p:sp>
-        <p:nvSpPr>
-          <p:cNvPr id="5" name="Content Placeholder 2"/>
-          <p:cNvSpPr txBox="1">
-            <a:spLocks/>
-          </p:cNvSpPr>
-          <p:nvPr/>
-        </p:nvSpPr>
-        <p:spPr>
-          <a:xfrm>
-            <a:off x="198158" y="685800"/>
-            <a:ext cx="8307668" cy="1295400"/>
-          </a:xfrm>
-          <a:prstGeom prst="rect">
-            <a:avLst/>
-          </a:prstGeom>
-        </p:spPr>
-        <p:txBody>
-          <a:bodyPr/>
-          <a:lstStyle>
-            <a:lvl1pPr marL="228600" indent="-228600" algn="l" defTabSz="457200" rtl="0" eaLnBrk="1" latinLnBrk="0" hangingPunct="1">
-              <a:spcBef>
-                <a:spcPts val="0"/>
-              </a:spcBef>
-              <a:buClr>
-                <a:schemeClr val="accent1"/>
-              </a:buClr>
-              <a:buFont typeface="Wingdings" charset="2"/>
-              <a:buChar char="§"/>
-              <a:defRPr sz="2400" kern="1200">
-                <a:solidFill>
-                  <a:schemeClr val="tx1"/>
-                </a:solidFill>
-                <a:latin typeface="+mn-lt"/>
-                <a:ea typeface="+mn-ea"/>
-                <a:cs typeface="+mn-cs"/>
-              </a:defRPr>
-            </a:lvl1pPr>
-            <a:lvl2pPr marL="455613" indent="-227013" algn="l" defTabSz="457200" rtl="0" eaLnBrk="1" latinLnBrk="0" hangingPunct="1">
-              <a:spcBef>
-                <a:spcPts val="0"/>
-              </a:spcBef>
-              <a:buClr>
-                <a:srgbClr val="262626"/>
-              </a:buClr>
-              <a:buFont typeface="Wingdings" charset="2"/>
-              <a:buChar char="§"/>
-              <a:defRPr sz="2000" kern="1200">
-                <a:solidFill>
-                  <a:schemeClr val="tx1"/>
-                </a:solidFill>
-                <a:latin typeface="+mn-lt"/>
-                <a:ea typeface="+mn-ea"/>
-                <a:cs typeface="+mn-cs"/>
-              </a:defRPr>
-            </a:lvl2pPr>
-            <a:lvl3pPr marL="455613" indent="-228600" algn="l" defTabSz="457200" rtl="0" eaLnBrk="1" latinLnBrk="0" hangingPunct="1">
-              <a:spcBef>
-                <a:spcPts val="0"/>
-              </a:spcBef>
-              <a:buClr>
-                <a:srgbClr val="262626"/>
-              </a:buClr>
-              <a:buFont typeface="Wingdings" charset="2"/>
-              <a:buChar char="§"/>
-              <a:defRPr sz="2000" kern="1200">
-                <a:solidFill>
-                  <a:schemeClr val="tx1"/>
-                </a:solidFill>
-                <a:latin typeface="+mn-lt"/>
-                <a:ea typeface="+mn-ea"/>
-                <a:cs typeface="+mn-cs"/>
-              </a:defRPr>
-            </a:lvl3pPr>
-            <a:lvl4pPr marL="455613" indent="-228600" algn="l" defTabSz="457200" rtl="0" eaLnBrk="1" latinLnBrk="0" hangingPunct="1">
-              <a:spcBef>
-                <a:spcPts val="0"/>
-              </a:spcBef>
-              <a:buClr>
-                <a:srgbClr val="262626"/>
-              </a:buClr>
-              <a:buFont typeface="Wingdings" charset="2"/>
-              <a:buChar char="§"/>
-              <a:defRPr sz="2000" kern="1200">
-                <a:solidFill>
-                  <a:schemeClr val="tx1"/>
-                </a:solidFill>
-                <a:latin typeface="+mn-lt"/>
-                <a:ea typeface="+mn-ea"/>
-                <a:cs typeface="+mn-cs"/>
-              </a:defRPr>
-            </a:lvl4pPr>
-            <a:lvl5pPr marL="455613" indent="-228600" algn="l" defTabSz="457200" rtl="0" eaLnBrk="1" latinLnBrk="0" hangingPunct="1">
-              <a:spcBef>
-                <a:spcPts val="200"/>
-              </a:spcBef>
-              <a:buClr>
-                <a:srgbClr val="262626"/>
-              </a:buClr>
-              <a:buFont typeface="Wingdings" charset="2"/>
-              <a:buChar char="§"/>
-              <a:defRPr sz="2000" kern="1200">
-                <a:solidFill>
-                  <a:schemeClr val="tx1"/>
-                </a:solidFill>
-                <a:latin typeface="+mn-lt"/>
-                <a:ea typeface="+mn-ea"/>
-                <a:cs typeface="+mn-cs"/>
-              </a:defRPr>
-            </a:lvl5pPr>
-            <a:lvl6pPr marL="2514600" indent="-228600" algn="l" defTabSz="457200" rtl="0" eaLnBrk="1" latinLnBrk="0" hangingPunct="1">
-              <a:spcBef>
-                <a:spcPct val="20000"/>
-              </a:spcBef>
-              <a:buFont typeface="Arial"/>
-              <a:buChar char="•"/>
-              <a:defRPr sz="2000" kern="1200">
-                <a:solidFill>
-                  <a:schemeClr val="tx1"/>
-                </a:solidFill>
-                <a:latin typeface="+mn-lt"/>
-                <a:ea typeface="+mn-ea"/>
-                <a:cs typeface="+mn-cs"/>
-              </a:defRPr>
-            </a:lvl6pPr>
-            <a:lvl7pPr marL="2971800" indent="-228600" algn="l" defTabSz="457200" rtl="0" eaLnBrk="1" latinLnBrk="0" hangingPunct="1">
-              <a:spcBef>
-                <a:spcPct val="20000"/>
-              </a:spcBef>
-              <a:buFont typeface="Arial"/>
-              <a:buChar char="•"/>
-              <a:defRPr sz="2000" kern="1200">
-                <a:solidFill>
-                  <a:schemeClr val="tx1"/>
-                </a:solidFill>
-                <a:latin typeface="+mn-lt"/>
-                <a:ea typeface="+mn-ea"/>
-                <a:cs typeface="+mn-cs"/>
-              </a:defRPr>
-            </a:lvl7pPr>
-            <a:lvl8pPr marL="3429000" indent="-228600" algn="l" defTabSz="457200" rtl="0" eaLnBrk="1" latinLnBrk="0" hangingPunct="1">
-              <a:spcBef>
-                <a:spcPct val="20000"/>
-              </a:spcBef>
-              <a:buFont typeface="Arial"/>
-              <a:buChar char="•"/>
-              <a:defRPr sz="2000" kern="1200">
-                <a:solidFill>
-                  <a:schemeClr val="tx1"/>
-                </a:solidFill>
-                <a:latin typeface="+mn-lt"/>
-                <a:ea typeface="+mn-ea"/>
-                <a:cs typeface="+mn-cs"/>
-              </a:defRPr>
-            </a:lvl8pPr>
-            <a:lvl9pPr marL="3886200" indent="-228600" algn="l" defTabSz="457200" rtl="0" eaLnBrk="1" latinLnBrk="0" hangingPunct="1">
-              <a:spcBef>
-                <a:spcPct val="20000"/>
-              </a:spcBef>
-              <a:buFont typeface="Arial"/>
-              <a:buChar char="•"/>
-              <a:defRPr sz="2000" kern="1200">
-                <a:solidFill>
-                  <a:schemeClr val="tx1"/>
-                </a:solidFill>
-                <a:latin typeface="+mn-lt"/>
-                <a:ea typeface="+mn-ea"/>
-                <a:cs typeface="+mn-cs"/>
-              </a:defRPr>
-            </a:lvl9pPr>
-          </a:lstStyle>
           <a:p>
             <a:pPr marL="342900" indent="-342900">
               <a:buFont typeface="Arial" charset="0"/>
               <a:buChar char="•"/>
             </a:pPr>
             <a:r>
-              <a:rPr lang="en-US" sz="2000" dirty="0">
-                <a:hlinkClick r:id="rId2"/>
-              </a:rPr>
-              <a:t>https://aws.amazon.com/marketplace</a:t>
-            </a:r>
-            <a:endParaRPr lang="en-US" sz="2000" dirty="0"/>
-          </a:p>
-          <a:p>
-            <a:pPr marL="342900" indent="-342900">
-              <a:buFont typeface="Arial" charset="0"/>
-              <a:buChar char="•"/>
-            </a:pPr>
-            <a:endParaRPr lang="en-US" sz="2000" dirty="0"/>
-          </a:p>
-          <a:p>
-            <a:pPr marL="342900" indent="-342900">
-              <a:buFont typeface="Arial" charset="0"/>
-              <a:buChar char="•"/>
-            </a:pPr>
-            <a:endParaRPr lang="en-US" sz="2000" dirty="0"/>
+              <a:rPr lang="en-US" dirty="0"/>
+              <a:t>USB thumb drive available</a:t>
+            </a:r>
           </a:p>
           <a:p>
             <a:pPr marL="342900" indent="-342900">
@@ -11478,22 +10561,28 @@
       </p:sp>
       <p:pic>
         <p:nvPicPr>
-          <p:cNvPr id="6" name="Picture 5"/>
+          <p:cNvPr id="4" name="Picture 3">
+            <a:extLst>
+              <a:ext uri="{FF2B5EF4-FFF2-40B4-BE49-F238E27FC236}">
+                <a16:creationId xmlns:a16="http://schemas.microsoft.com/office/drawing/2014/main" id="{C2073BA6-FC4C-4A9D-9F7B-58428772165F}"/>
+              </a:ext>
+            </a:extLst>
+          </p:cNvPr>
           <p:cNvPicPr>
             <a:picLocks noChangeAspect="1"/>
           </p:cNvPicPr>
           <p:nvPr/>
         </p:nvPicPr>
         <p:blipFill>
-          <a:blip r:embed="rId3"/>
+          <a:blip r:embed="rId4"/>
           <a:stretch>
             <a:fillRect/>
           </a:stretch>
         </p:blipFill>
         <p:spPr>
           <a:xfrm>
-            <a:off x="1942229" y="1182670"/>
-            <a:ext cx="4911057" cy="3834026"/>
+            <a:off x="1538522" y="1594077"/>
+            <a:ext cx="5974531" cy="3431780"/>
           </a:xfrm>
           <a:prstGeom prst="rect">
             <a:avLst/>
@@ -11503,7 +10592,97 @@
     </p:spTree>
     <p:extLst>
       <p:ext uri="{BB962C8B-B14F-4D97-AF65-F5344CB8AC3E}">
-        <p14:creationId xmlns:p14="http://schemas.microsoft.com/office/powerpoint/2010/main" val="84375709"/>
+        <p14:creationId xmlns:p14="http://schemas.microsoft.com/office/powerpoint/2010/main" val="4008062327"/>
+      </p:ext>
+    </p:extLst>
+  </p:cSld>
+  <p:clrMapOvr>
+    <a:masterClrMapping/>
+  </p:clrMapOvr>
+  <mc:AlternateContent xmlns:mc="http://schemas.openxmlformats.org/markup-compatibility/2006" xmlns:p14="http://schemas.microsoft.com/office/powerpoint/2010/main">
+    <mc:Choice Requires="p14">
+      <p:transition p14:dur="10"/>
+    </mc:Choice>
+    <mc:Fallback xmlns="">
+      <p:transition/>
+    </mc:Fallback>
+  </mc:AlternateContent>
+</p:sld>
+</file>
+
+<file path=ppt/slides/slide8.xml><?xml version="1.0" encoding="utf-8"?>
+<p:sld xmlns:a="http://schemas.openxmlformats.org/drawingml/2006/main" xmlns:r="http://schemas.openxmlformats.org/officeDocument/2006/relationships" xmlns:p="http://schemas.openxmlformats.org/presentationml/2006/main">
+  <p:cSld>
+    <p:spTree>
+      <p:nvGrpSpPr>
+        <p:cNvPr id="1" name=""/>
+        <p:cNvGrpSpPr/>
+        <p:nvPr/>
+      </p:nvGrpSpPr>
+      <p:grpSpPr>
+        <a:xfrm>
+          <a:off x="0" y="0"/>
+          <a:ext cx="0" cy="0"/>
+          <a:chOff x="0" y="0"/>
+          <a:chExt cx="0" cy="0"/>
+        </a:xfrm>
+      </p:grpSpPr>
+      <p:sp>
+        <p:nvSpPr>
+          <p:cNvPr id="2" name="Title 1"/>
+          <p:cNvSpPr>
+            <a:spLocks noGrp="1"/>
+          </p:cNvSpPr>
+          <p:nvPr>
+            <p:ph type="title"/>
+          </p:nvPr>
+        </p:nvSpPr>
+        <p:spPr/>
+        <p:txBody>
+          <a:bodyPr/>
+          <a:lstStyle/>
+          <a:p>
+            <a:r>
+              <a:rPr lang="en-US" dirty="0"/>
+              <a:t>Install</a:t>
+            </a:r>
+          </a:p>
+        </p:txBody>
+      </p:sp>
+      <p:pic>
+        <p:nvPicPr>
+          <p:cNvPr id="3" name="Picture 2">
+            <a:extLst>
+              <a:ext uri="{FF2B5EF4-FFF2-40B4-BE49-F238E27FC236}">
+                <a16:creationId xmlns:a16="http://schemas.microsoft.com/office/drawing/2014/main" id="{7AD4D6C0-991E-413E-8D9F-FA49BBDD029D}"/>
+              </a:ext>
+            </a:extLst>
+          </p:cNvPr>
+          <p:cNvPicPr>
+            <a:picLocks noChangeAspect="1"/>
+          </p:cNvPicPr>
+          <p:nvPr/>
+        </p:nvPicPr>
+        <p:blipFill>
+          <a:blip r:embed="rId2"/>
+          <a:stretch>
+            <a:fillRect/>
+          </a:stretch>
+        </p:blipFill>
+        <p:spPr>
+          <a:xfrm>
+            <a:off x="1952833" y="673002"/>
+            <a:ext cx="5335630" cy="4138400"/>
+          </a:xfrm>
+          <a:prstGeom prst="rect">
+            <a:avLst/>
+          </a:prstGeom>
+        </p:spPr>
+      </p:pic>
+    </p:spTree>
+    <p:extLst>
+      <p:ext uri="{BB962C8B-B14F-4D97-AF65-F5344CB8AC3E}">
+        <p14:creationId xmlns:p14="http://schemas.microsoft.com/office/powerpoint/2010/main" val="2934162958"/>
       </p:ext>
     </p:extLst>
   </p:cSld>
@@ -11547,14 +10726,14 @@
           <a:p>
             <a:r>
               <a:rPr lang="en-US" dirty="0"/>
-              <a:t>Install on Cloud: Amazon</a:t>
+              <a:t>Install on Cloud: Azure</a:t>
             </a:r>
           </a:p>
         </p:txBody>
       </p:sp>
       <p:sp>
         <p:nvSpPr>
-          <p:cNvPr id="3" name="Content Placeholder 2"/>
+          <p:cNvPr id="4" name="Content Placeholder 2"/>
           <p:cNvSpPr txBox="1">
             <a:spLocks/>
           </p:cNvSpPr>
@@ -11563,7 +10742,7 @@
         <p:spPr>
           <a:xfrm>
             <a:off x="198158" y="685800"/>
-            <a:ext cx="8307668" cy="1295400"/>
+            <a:ext cx="8945842" cy="1295400"/>
           </a:xfrm>
           <a:prstGeom prst="rect">
             <a:avLst/>
@@ -11729,17 +10908,12 @@
               <a:buChar char="•"/>
             </a:pPr>
             <a:r>
-              <a:rPr lang="en-US" sz="1800" dirty="0"/>
-              <a:t>Select </a:t>
-            </a:r>
-            <a:r>
-              <a:rPr lang="en-US" sz="1800" dirty="0" err="1"/>
-              <a:t>Couchbase</a:t>
-            </a:r>
-            <a:r>
-              <a:rPr lang="en-US" sz="1800" dirty="0"/>
-              <a:t> Server, click Continue</a:t>
-            </a:r>
+              <a:rPr lang="en-US" sz="1600" dirty="0">
+                <a:hlinkClick r:id="rId3"/>
+              </a:rPr>
+              <a:t>https://portal.azure.com</a:t>
+            </a:r>
+            <a:endParaRPr lang="en-US" sz="1600" dirty="0"/>
           </a:p>
           <a:p>
             <a:pPr marL="342900" indent="-342900">
@@ -11747,77 +10921,26 @@
               <a:buChar char="•"/>
             </a:pPr>
             <a:r>
-              <a:rPr lang="en-US" sz="1800" dirty="0"/>
-              <a:t>Choose pricing (4 cores, 4gb RAM recommended)</a:t>
-            </a:r>
+              <a:rPr lang="en-US" sz="1600" dirty="0">
+                <a:hlinkClick r:id="rId4"/>
+              </a:rPr>
+              <a:t>https://azuremarketplace.microsoft.com/en-us/marketplace/apps/couchbase.couchbase-enterprise</a:t>
+            </a:r>
+            <a:endParaRPr lang="en-US" sz="1600" dirty="0"/>
           </a:p>
           <a:p>
             <a:pPr marL="342900" indent="-342900">
               <a:buFont typeface="Arial" charset="0"/>
               <a:buChar char="•"/>
             </a:pPr>
-            <a:r>
-              <a:rPr lang="en-US" sz="1800" dirty="0"/>
-              <a:t>Select VPC (or create new VPC)</a:t>
-            </a:r>
+            <a:endParaRPr lang="en-US" sz="1600" dirty="0"/>
           </a:p>
           <a:p>
             <a:pPr marL="342900" indent="-342900">
               <a:buFont typeface="Arial" charset="0"/>
               <a:buChar char="•"/>
             </a:pPr>
-            <a:r>
-              <a:rPr lang="en-US" sz="1800" dirty="0"/>
-              <a:t>Select Security Group (or create new security group based on seller settings)</a:t>
-            </a:r>
-          </a:p>
-          <a:p>
-            <a:pPr marL="342900" indent="-342900">
-              <a:buFont typeface="Arial" charset="0"/>
-              <a:buChar char="•"/>
-            </a:pPr>
-            <a:r>
-              <a:rPr lang="en-US" sz="1800" dirty="0"/>
-              <a:t>Click “Accept”</a:t>
-            </a:r>
-          </a:p>
-          <a:p>
-            <a:pPr marL="342900" indent="-342900">
-              <a:buFont typeface="Arial" charset="0"/>
-              <a:buChar char="•"/>
-            </a:pPr>
-            <a:r>
-              <a:rPr lang="en-US" sz="1800" dirty="0"/>
-              <a:t>Wait for initialization (EC2 console)</a:t>
-            </a:r>
-          </a:p>
-          <a:p>
-            <a:pPr marL="342900" indent="-342900">
-              <a:buFont typeface="Arial" charset="0"/>
-              <a:buChar char="•"/>
-            </a:pPr>
-            <a:r>
-              <a:rPr lang="en-US" sz="1800" dirty="0"/>
-              <a:t>Access </a:t>
-            </a:r>
-            <a:r>
-              <a:rPr lang="en-US" sz="1800" dirty="0" err="1"/>
-              <a:t>Couchbase</a:t>
-            </a:r>
-            <a:r>
-              <a:rPr lang="en-US" sz="1800" dirty="0"/>
-              <a:t> Console via Public DNS port 8091 (e.g. </a:t>
-            </a:r>
-            <a:r>
-              <a:rPr lang="en-US" sz="1800" dirty="0">
-                <a:hlinkClick r:id="rId3"/>
-              </a:rPr>
-              <a:t>http://ec2-52-1-3-4.compute-1.amazonaws.com:8091</a:t>
-            </a:r>
-            <a:r>
-              <a:rPr lang="en-US" sz="1800" dirty="0"/>
-              <a:t>)</a:t>
-            </a:r>
+            <a:endParaRPr lang="en-US" sz="1600" dirty="0"/>
           </a:p>
           <a:p>
             <a:pPr marL="342900" indent="-342900">
@@ -11827,25 +10950,44 @@
             <a:endParaRPr lang="en-US" sz="1800" dirty="0"/>
           </a:p>
           <a:p>
-            <a:pPr marL="342900" indent="-342900">
-              <a:buFont typeface="Arial" charset="0"/>
-              <a:buChar char="•"/>
-            </a:pPr>
             <a:endParaRPr lang="en-US" sz="1800" dirty="0"/>
           </a:p>
-          <a:p>
-            <a:pPr marL="342900" indent="-342900">
-              <a:buFont typeface="Arial" charset="0"/>
-              <a:buChar char="•"/>
-            </a:pPr>
-            <a:endParaRPr lang="en-US" sz="1800" dirty="0"/>
-          </a:p>
         </p:txBody>
       </p:sp>
+      <p:pic>
+        <p:nvPicPr>
+          <p:cNvPr id="5" name="Picture 4">
+            <a:extLst>
+              <a:ext uri="{FF2B5EF4-FFF2-40B4-BE49-F238E27FC236}">
+                <a16:creationId xmlns:a16="http://schemas.microsoft.com/office/drawing/2014/main" id="{8E36B667-D5DB-4469-BFAB-2400D6309AFB}"/>
+              </a:ext>
+            </a:extLst>
+          </p:cNvPr>
+          <p:cNvPicPr>
+            <a:picLocks noChangeAspect="1"/>
+          </p:cNvPicPr>
+          <p:nvPr/>
+        </p:nvPicPr>
+        <p:blipFill>
+          <a:blip r:embed="rId5"/>
+          <a:stretch>
+            <a:fillRect/>
+          </a:stretch>
+        </p:blipFill>
+        <p:spPr>
+          <a:xfrm>
+            <a:off x="2248590" y="1305347"/>
+            <a:ext cx="4339367" cy="3582797"/>
+          </a:xfrm>
+          <a:prstGeom prst="rect">
+            <a:avLst/>
+          </a:prstGeom>
+        </p:spPr>
+      </p:pic>
     </p:spTree>
     <p:extLst>
       <p:ext uri="{BB962C8B-B14F-4D97-AF65-F5344CB8AC3E}">
-        <p14:creationId xmlns:p14="http://schemas.microsoft.com/office/powerpoint/2010/main" val="342985838"/>
+        <p14:creationId xmlns:p14="http://schemas.microsoft.com/office/powerpoint/2010/main" val="1148363434"/>
       </p:ext>
     </p:extLst>
   </p:cSld>

</xml_diff>